<commit_message>
Some more progress with the presentation.
</commit_message>
<xml_diff>
--- a/presentation/Asynchronous web apps with Play Framework 2.0.pptx
+++ b/presentation/Asynchronous web apps with Play Framework 2.0.pptx
@@ -7,7 +7,7 @@
     <p:sldMasterId id="2147483672" r:id="rId3"/>
   </p:sldMasterIdLst>
   <p:notesMasterIdLst>
-    <p:notesMasterId r:id="rId38"/>
+    <p:notesMasterId r:id="rId40"/>
   </p:notesMasterIdLst>
   <p:sldIdLst>
     <p:sldId id="259" r:id="rId4"/>
@@ -42,8 +42,10 @@
     <p:sldId id="275" r:id="rId33"/>
     <p:sldId id="265" r:id="rId34"/>
     <p:sldId id="295" r:id="rId35"/>
-    <p:sldId id="286" r:id="rId36"/>
-    <p:sldId id="287" r:id="rId37"/>
+    <p:sldId id="298" r:id="rId36"/>
+    <p:sldId id="286" r:id="rId37"/>
+    <p:sldId id="299" r:id="rId38"/>
+    <p:sldId id="287" r:id="rId39"/>
   </p:sldIdLst>
   <p:sldSz cx="9144000" cy="6858000" type="screen4x3"/>
   <p:notesSz cx="6858000" cy="9144000"/>
@@ -844,49 +846,6 @@
           <a:bodyPr/>
           <a:lstStyle/>
           <a:p>
-            <a:r>
-              <a:rPr lang="en-US" dirty="0" smtClean="0"/>
-              <a:t>Can’t work with Play? No </a:t>
-            </a:r>
-            <a:r>
-              <a:rPr lang="en-US" dirty="0" smtClean="0"/>
-              <a:t>problem,</a:t>
-            </a:r>
-            <a:r>
-              <a:rPr lang="en-US" baseline="0" dirty="0" smtClean="0"/>
-              <a:t> other frameworks are catching up and eventually the development of asynchronous applications will be commonplace.</a:t>
-            </a:r>
-          </a:p>
-          <a:p>
-            <a:endParaRPr lang="en-US" baseline="0" dirty="0" smtClean="0"/>
-          </a:p>
-          <a:p>
-            <a:r>
-              <a:rPr lang="en-US" baseline="0" dirty="0" smtClean="0"/>
-              <a:t>One of the biggest enablers of asynchronous applications is the servlet 3.0 spec, which allows applications to mark certain requests as suspended and allow the app server to handle those in the background.</a:t>
-            </a:r>
-          </a:p>
-          <a:p>
-            <a:endParaRPr lang="en-US" baseline="0" dirty="0" smtClean="0"/>
-          </a:p>
-          <a:p>
-            <a:r>
-              <a:rPr lang="en-US" baseline="0" dirty="0" smtClean="0"/>
-              <a:t>The example above is based on Grails 2.0 </a:t>
-            </a:r>
-            <a:r>
-              <a:rPr lang="en-US" baseline="0" dirty="0" smtClean="0"/>
-              <a:t>+ a Servlet 3.0 server (such as Tomcat 7.0), just to see how it works. As you may have already noticed, it shows a bit too much of the low-level interface by forcing controller classes to handle asynchronous contexts… In my opinion Play’s API is more elegant but Groovy lends itself very nicely to internal DSLs so it’s likely that the Grails guys will work on some higher-level abstractions to make development easier.</a:t>
-            </a:r>
-          </a:p>
-          <a:p>
-            <a:endParaRPr lang="en-US" baseline="0" dirty="0" smtClean="0"/>
-          </a:p>
-          <a:p>
-            <a:r>
-              <a:rPr lang="en-US" baseline="0" dirty="0" smtClean="0"/>
-              <a:t>Note: the example is taken from the Grails 2.0 release notes.</a:t>
-            </a:r>
             <a:endParaRPr lang="en-US" dirty="0"/>
           </a:p>
         </p:txBody>
@@ -908,7 +867,7 @@
           <a:p>
             <a:fld id="{0C2B02A6-44A8-594C-8023-D31DDC0C2785}" type="slidenum">
               <a:rPr lang="en-US" smtClean="0"/>
-              <a:t>31</a:t>
+              <a:t>27</a:t>
             </a:fld>
             <a:endParaRPr lang="en-US"/>
           </a:p>
@@ -917,7 +876,7 @@
     </p:spTree>
     <p:extLst>
       <p:ext uri="{BB962C8B-B14F-4D97-AF65-F5344CB8AC3E}">
-        <p14:creationId xmlns:p14="http://schemas.microsoft.com/office/powerpoint/2010/main" val="2140312193"/>
+        <p14:creationId xmlns:p14="http://schemas.microsoft.com/office/powerpoint/2010/main" val="2679536641"/>
       </p:ext>
     </p:extLst>
   </p:cSld>
@@ -972,67 +931,47 @@
           <a:lstStyle/>
           <a:p>
             <a:r>
-              <a:rPr lang="en-US" dirty="0" err="1" smtClean="0"/>
-              <a:t>Vert.x</a:t>
-            </a:r>
-            <a:r>
               <a:rPr lang="en-US" dirty="0" smtClean="0"/>
-              <a:t> defines</a:t>
+              <a:t>Can’t work with Play? No </a:t>
+            </a:r>
+            <a:r>
+              <a:rPr lang="en-US" dirty="0" smtClean="0"/>
+              <a:t>problem,</a:t>
             </a:r>
             <a:r>
               <a:rPr lang="en-US" baseline="0" dirty="0" smtClean="0"/>
-              <a:t> itself as “Effortless asynchronous application development for the modern web and enterprise”. It’s not a coincidence that in their efforts to implement a high-performance asynchronous web framework, the </a:t>
-            </a:r>
-            <a:r>
-              <a:rPr lang="en-US" baseline="0" dirty="0" err="1" smtClean="0"/>
-              <a:t>Vert.x</a:t>
-            </a:r>
+              <a:t> other frameworks are catching up and eventually the development of asynchronous applications will be commonplace.</a:t>
+            </a:r>
+          </a:p>
+          <a:p>
+            <a:endParaRPr lang="en-US" baseline="0" dirty="0" smtClean="0"/>
+          </a:p>
+          <a:p>
             <a:r>
               <a:rPr lang="en-US" baseline="0" dirty="0" smtClean="0"/>
-              <a:t> development team also kept away from JEE </a:t>
-            </a:r>
-            <a:r>
-              <a:rPr lang="en-US" baseline="0" dirty="0" smtClean="0">
-                <a:sym typeface="Wingdings"/>
-              </a:rPr>
-              <a:t></a:t>
-            </a:r>
-          </a:p>
-          <a:p>
-            <a:endParaRPr lang="en-US" baseline="0" dirty="0" smtClean="0">
-              <a:sym typeface="Wingdings"/>
-            </a:endParaRPr>
-          </a:p>
-          <a:p>
-            <a:r>
-              <a:rPr lang="en-US" baseline="0" dirty="0" smtClean="0">
-                <a:sym typeface="Wingdings"/>
-              </a:rPr>
-              <a:t>However as opposed to Play, </a:t>
-            </a:r>
-            <a:r>
-              <a:rPr lang="en-US" baseline="0" dirty="0" err="1" smtClean="0">
-                <a:sym typeface="Wingdings"/>
-              </a:rPr>
-              <a:t>Vert.x’s</a:t>
-            </a:r>
-            <a:r>
-              <a:rPr lang="en-US" baseline="0" dirty="0" smtClean="0">
-                <a:sym typeface="Wingdings"/>
-              </a:rPr>
-              <a:t> architecture is based on the callback-style mechanism. While I have no direct experience developing large-scale applications or applications with complex logic on </a:t>
-            </a:r>
-            <a:r>
-              <a:rPr lang="en-US" baseline="0" dirty="0" err="1" smtClean="0">
-                <a:sym typeface="Wingdings"/>
-              </a:rPr>
-              <a:t>Vert.x</a:t>
-            </a:r>
-            <a:r>
-              <a:rPr lang="en-US" baseline="0" dirty="0" smtClean="0">
-                <a:sym typeface="Wingdings"/>
-              </a:rPr>
-              <a:t>, it remains to be seen how efficient this approach is in those cases.</a:t>
+              <a:t>One of the biggest enablers of asynchronous applications is the servlet 3.0 spec, which allows applications to mark certain requests as suspended and allow the app server to handle those in the background.</a:t>
+            </a:r>
+          </a:p>
+          <a:p>
+            <a:endParaRPr lang="en-US" baseline="0" dirty="0" smtClean="0"/>
+          </a:p>
+          <a:p>
+            <a:r>
+              <a:rPr lang="en-US" baseline="0" dirty="0" smtClean="0"/>
+              <a:t>The example above is based on Grails 2.0 </a:t>
+            </a:r>
+            <a:r>
+              <a:rPr lang="en-US" baseline="0" dirty="0" smtClean="0"/>
+              <a:t>+ a Servlet 3.0 server (such as Tomcat 7.0), just to see how it works. As you may have already noticed, it shows a bit too much of the low-level interface by forcing controller classes to handle asynchronous contexts… In my opinion Play’s API is more elegant but Groovy lends itself very nicely to internal DSLs so it’s likely that the Grails guys will work on some higher-level abstractions to make development easier.</a:t>
+            </a:r>
+          </a:p>
+          <a:p>
+            <a:endParaRPr lang="en-US" baseline="0" dirty="0" smtClean="0"/>
+          </a:p>
+          <a:p>
+            <a:r>
+              <a:rPr lang="en-US" baseline="0" dirty="0" smtClean="0"/>
+              <a:t>Note: the example is taken from the Grails 2.0 release notes.</a:t>
             </a:r>
             <a:endParaRPr lang="en-US" dirty="0"/>
           </a:p>
@@ -1055,7 +994,7 @@
           <a:p>
             <a:fld id="{0C2B02A6-44A8-594C-8023-D31DDC0C2785}" type="slidenum">
               <a:rPr lang="en-US" smtClean="0"/>
-              <a:t>32</a:t>
+              <a:t>31</a:t>
             </a:fld>
             <a:endParaRPr lang="en-US"/>
           </a:p>
@@ -1065,6 +1004,306 @@
     <p:extLst>
       <p:ext uri="{BB962C8B-B14F-4D97-AF65-F5344CB8AC3E}">
         <p14:creationId xmlns:p14="http://schemas.microsoft.com/office/powerpoint/2010/main" val="2140312193"/>
+      </p:ext>
+    </p:extLst>
+  </p:cSld>
+  <p:clrMapOvr>
+    <a:masterClrMapping/>
+  </p:clrMapOvr>
+</p:notes>
+</file>
+
+<file path=ppt/notesSlides/notesSlide13.xml><?xml version="1.0" encoding="utf-8"?>
+<p:notes xmlns:a="http://schemas.openxmlformats.org/drawingml/2006/main" xmlns:r="http://schemas.openxmlformats.org/officeDocument/2006/relationships" xmlns:p="http://schemas.openxmlformats.org/presentationml/2006/main">
+  <p:cSld>
+    <p:spTree>
+      <p:nvGrpSpPr>
+        <p:cNvPr id="1" name=""/>
+        <p:cNvGrpSpPr/>
+        <p:nvPr/>
+      </p:nvGrpSpPr>
+      <p:grpSpPr>
+        <a:xfrm>
+          <a:off x="0" y="0"/>
+          <a:ext cx="0" cy="0"/>
+          <a:chOff x="0" y="0"/>
+          <a:chExt cx="0" cy="0"/>
+        </a:xfrm>
+      </p:grpSpPr>
+      <p:sp>
+        <p:nvSpPr>
+          <p:cNvPr id="2" name="Slide Image Placeholder 1"/>
+          <p:cNvSpPr>
+            <a:spLocks noGrp="1" noRot="1" noChangeAspect="1"/>
+          </p:cNvSpPr>
+          <p:nvPr>
+            <p:ph type="sldImg"/>
+          </p:nvPr>
+        </p:nvSpPr>
+        <p:spPr/>
+      </p:sp>
+      <p:sp>
+        <p:nvSpPr>
+          <p:cNvPr id="3" name="Notes Placeholder 2"/>
+          <p:cNvSpPr>
+            <a:spLocks noGrp="1"/>
+          </p:cNvSpPr>
+          <p:nvPr>
+            <p:ph type="body" idx="1"/>
+          </p:nvPr>
+        </p:nvSpPr>
+        <p:spPr/>
+        <p:txBody>
+          <a:bodyPr/>
+          <a:lstStyle/>
+          <a:p>
+            <a:r>
+              <a:rPr lang="en-US" dirty="0" err="1" smtClean="0"/>
+              <a:t>Vert.x</a:t>
+            </a:r>
+            <a:r>
+              <a:rPr lang="en-US" dirty="0" smtClean="0"/>
+              <a:t> defines</a:t>
+            </a:r>
+            <a:r>
+              <a:rPr lang="en-US" baseline="0" dirty="0" smtClean="0"/>
+              <a:t> itself as “Effortless asynchronous application development for the modern web and enterprise”. It’s not a coincidence that in their efforts to implement a high-performance asynchronous web framework, the </a:t>
+            </a:r>
+            <a:r>
+              <a:rPr lang="en-US" baseline="0" dirty="0" err="1" smtClean="0"/>
+              <a:t>Vert.x</a:t>
+            </a:r>
+            <a:r>
+              <a:rPr lang="en-US" baseline="0" dirty="0" smtClean="0"/>
+              <a:t> development team also kept away from JEE </a:t>
+            </a:r>
+            <a:r>
+              <a:rPr lang="en-US" baseline="0" dirty="0" smtClean="0">
+                <a:sym typeface="Wingdings"/>
+              </a:rPr>
+              <a:t></a:t>
+            </a:r>
+          </a:p>
+          <a:p>
+            <a:endParaRPr lang="en-US" baseline="0" dirty="0" smtClean="0">
+              <a:sym typeface="Wingdings"/>
+            </a:endParaRPr>
+          </a:p>
+          <a:p>
+            <a:r>
+              <a:rPr lang="en-US" baseline="0" dirty="0" smtClean="0">
+                <a:sym typeface="Wingdings"/>
+              </a:rPr>
+              <a:t>However as opposed to Play, </a:t>
+            </a:r>
+            <a:r>
+              <a:rPr lang="en-US" baseline="0" dirty="0" err="1" smtClean="0">
+                <a:sym typeface="Wingdings"/>
+              </a:rPr>
+              <a:t>Vert.x’s</a:t>
+            </a:r>
+            <a:r>
+              <a:rPr lang="en-US" baseline="0" dirty="0" smtClean="0">
+                <a:sym typeface="Wingdings"/>
+              </a:rPr>
+              <a:t> architecture is based on the callback-style mechanism. While I have no direct experience developing large-scale applications or applications with complex logic on </a:t>
+            </a:r>
+            <a:r>
+              <a:rPr lang="en-US" baseline="0" dirty="0" err="1" smtClean="0">
+                <a:sym typeface="Wingdings"/>
+              </a:rPr>
+              <a:t>Vert.x</a:t>
+            </a:r>
+            <a:r>
+              <a:rPr lang="en-US" baseline="0" dirty="0" smtClean="0">
+                <a:sym typeface="Wingdings"/>
+              </a:rPr>
+              <a:t>, it remains to be seen how efficient this approach is in those cases.</a:t>
+            </a:r>
+            <a:endParaRPr lang="en-US" dirty="0"/>
+          </a:p>
+        </p:txBody>
+      </p:sp>
+      <p:sp>
+        <p:nvSpPr>
+          <p:cNvPr id="4" name="Slide Number Placeholder 3"/>
+          <p:cNvSpPr>
+            <a:spLocks noGrp="1"/>
+          </p:cNvSpPr>
+          <p:nvPr>
+            <p:ph type="sldNum" sz="quarter" idx="10"/>
+          </p:nvPr>
+        </p:nvSpPr>
+        <p:spPr/>
+        <p:txBody>
+          <a:bodyPr/>
+          <a:lstStyle/>
+          <a:p>
+            <a:fld id="{0C2B02A6-44A8-594C-8023-D31DDC0C2785}" type="slidenum">
+              <a:rPr lang="en-US" smtClean="0"/>
+              <a:t>32</a:t>
+            </a:fld>
+            <a:endParaRPr lang="en-US"/>
+          </a:p>
+        </p:txBody>
+      </p:sp>
+    </p:spTree>
+    <p:extLst>
+      <p:ext uri="{BB962C8B-B14F-4D97-AF65-F5344CB8AC3E}">
+        <p14:creationId xmlns:p14="http://schemas.microsoft.com/office/powerpoint/2010/main" val="2140312193"/>
+      </p:ext>
+    </p:extLst>
+  </p:cSld>
+  <p:clrMapOvr>
+    <a:masterClrMapping/>
+  </p:clrMapOvr>
+</p:notes>
+</file>
+
+<file path=ppt/notesSlides/notesSlide14.xml><?xml version="1.0" encoding="utf-8"?>
+<p:notes xmlns:a="http://schemas.openxmlformats.org/drawingml/2006/main" xmlns:r="http://schemas.openxmlformats.org/officeDocument/2006/relationships" xmlns:p="http://schemas.openxmlformats.org/presentationml/2006/main">
+  <p:cSld>
+    <p:spTree>
+      <p:nvGrpSpPr>
+        <p:cNvPr id="1" name=""/>
+        <p:cNvGrpSpPr/>
+        <p:nvPr/>
+      </p:nvGrpSpPr>
+      <p:grpSpPr>
+        <a:xfrm>
+          <a:off x="0" y="0"/>
+          <a:ext cx="0" cy="0"/>
+          <a:chOff x="0" y="0"/>
+          <a:chExt cx="0" cy="0"/>
+        </a:xfrm>
+      </p:grpSpPr>
+      <p:sp>
+        <p:nvSpPr>
+          <p:cNvPr id="2" name="Slide Image Placeholder 1"/>
+          <p:cNvSpPr>
+            <a:spLocks noGrp="1" noRot="1" noChangeAspect="1"/>
+          </p:cNvSpPr>
+          <p:nvPr>
+            <p:ph type="sldImg"/>
+          </p:nvPr>
+        </p:nvSpPr>
+        <p:spPr/>
+      </p:sp>
+      <p:sp>
+        <p:nvSpPr>
+          <p:cNvPr id="3" name="Notes Placeholder 2"/>
+          <p:cNvSpPr>
+            <a:spLocks noGrp="1"/>
+          </p:cNvSpPr>
+          <p:nvPr>
+            <p:ph type="body" idx="1"/>
+          </p:nvPr>
+        </p:nvSpPr>
+        <p:spPr/>
+        <p:txBody>
+          <a:bodyPr/>
+          <a:lstStyle/>
+          <a:p>
+            <a:r>
+              <a:rPr lang="en-US" dirty="0" smtClean="0"/>
+              <a:t>Shameless plug</a:t>
+            </a:r>
+            <a:r>
+              <a:rPr lang="en-US" baseline="0" dirty="0" smtClean="0"/>
+              <a:t> </a:t>
+            </a:r>
+            <a:r>
+              <a:rPr lang="en-US" baseline="0" dirty="0" smtClean="0">
+                <a:sym typeface="Wingdings"/>
+              </a:rPr>
+              <a:t></a:t>
+            </a:r>
+          </a:p>
+          <a:p>
+            <a:endParaRPr lang="en-US" baseline="0" dirty="0" smtClean="0">
+              <a:sym typeface="Wingdings"/>
+            </a:endParaRPr>
+          </a:p>
+          <a:p>
+            <a:r>
+              <a:rPr lang="en-US" baseline="0" dirty="0" smtClean="0">
+                <a:sym typeface="Wingdings"/>
+              </a:rPr>
+              <a:t>At Accenture we have also been training ourselves with Play 2.0 (both Java and </a:t>
+            </a:r>
+            <a:r>
+              <a:rPr lang="en-US" baseline="0" dirty="0" err="1" smtClean="0">
+                <a:sym typeface="Wingdings"/>
+              </a:rPr>
+              <a:t>Scala</a:t>
+            </a:r>
+            <a:r>
+              <a:rPr lang="en-US" baseline="0" dirty="0" smtClean="0">
+                <a:sym typeface="Wingdings"/>
+              </a:rPr>
+              <a:t>) and we are currently delivering an interesting project on </a:t>
+            </a:r>
+            <a:r>
+              <a:rPr lang="en-US" baseline="0" dirty="0" smtClean="0">
+                <a:sym typeface="Wingdings"/>
+              </a:rPr>
+              <a:t>Play Java and preparing to deliver an even more interesting one with Play </a:t>
+            </a:r>
+            <a:r>
+              <a:rPr lang="en-US" baseline="0" dirty="0" err="1" smtClean="0">
+                <a:sym typeface="Wingdings"/>
+              </a:rPr>
+              <a:t>Scala</a:t>
+            </a:r>
+            <a:r>
+              <a:rPr lang="en-US" baseline="0" dirty="0" smtClean="0">
+                <a:sym typeface="Wingdings"/>
+              </a:rPr>
+              <a:t> to implement a highly-scalable API so we are ready to help you and clients in general with these innovative technologies and frameworks (even if innovation and say, </a:t>
+            </a:r>
+            <a:r>
+              <a:rPr lang="en-US" baseline="0" dirty="0" err="1" smtClean="0">
+                <a:sym typeface="Wingdings"/>
+              </a:rPr>
+              <a:t>Scala</a:t>
+            </a:r>
+            <a:r>
+              <a:rPr lang="en-US" baseline="0" dirty="0" smtClean="0">
+                <a:sym typeface="Wingdings"/>
+              </a:rPr>
+              <a:t>, are not the first things that come to your minds when you think of Accenture)</a:t>
+            </a:r>
+            <a:endParaRPr lang="en-US" dirty="0"/>
+          </a:p>
+        </p:txBody>
+      </p:sp>
+      <p:sp>
+        <p:nvSpPr>
+          <p:cNvPr id="4" name="Slide Number Placeholder 3"/>
+          <p:cNvSpPr>
+            <a:spLocks noGrp="1"/>
+          </p:cNvSpPr>
+          <p:nvPr>
+            <p:ph type="sldNum" sz="quarter" idx="10"/>
+          </p:nvPr>
+        </p:nvSpPr>
+        <p:spPr/>
+        <p:txBody>
+          <a:bodyPr/>
+          <a:lstStyle/>
+          <a:p>
+            <a:fld id="{0C2B02A6-44A8-594C-8023-D31DDC0C2785}" type="slidenum">
+              <a:rPr lang="en-US" smtClean="0"/>
+              <a:t>33</a:t>
+            </a:fld>
+            <a:endParaRPr lang="en-US"/>
+          </a:p>
+        </p:txBody>
+      </p:sp>
+    </p:spTree>
+    <p:extLst>
+      <p:ext uri="{BB962C8B-B14F-4D97-AF65-F5344CB8AC3E}">
+        <p14:creationId xmlns:p14="http://schemas.microsoft.com/office/powerpoint/2010/main" val="1623505800"/>
       </p:ext>
     </p:extLst>
   </p:cSld>
@@ -8572,7 +8811,7 @@
                 <a:ea typeface="+mn-ea"/>
                 <a:cs typeface="Arial"/>
               </a:rPr>
-              <a:t>Reactive what?</a:t>
+              <a:t>IO WHAT??</a:t>
             </a:r>
             <a:endParaRPr lang="en-US" sz="4400" dirty="0">
               <a:solidFill>
@@ -12430,41 +12669,79 @@
       </p:grpSpPr>
       <p:sp>
         <p:nvSpPr>
-          <p:cNvPr id="6" name="Content Placeholder 5"/>
-          <p:cNvSpPr>
-            <a:spLocks noGrp="1"/>
-          </p:cNvSpPr>
-          <p:nvPr>
-            <p:ph idx="1"/>
-          </p:nvPr>
+          <p:cNvPr id="9" name="Rectangle 8"/>
+          <p:cNvSpPr/>
+          <p:nvPr/>
         </p:nvSpPr>
         <p:spPr>
           <a:xfrm>
-            <a:off x="457200" y="764704"/>
-            <a:ext cx="8229600" cy="5361459"/>
+            <a:off x="0" y="1700808"/>
+            <a:ext cx="9144000" cy="3168352"/>
           </a:xfrm>
+          <a:prstGeom prst="rect">
+            <a:avLst/>
+          </a:prstGeom>
+          <a:solidFill>
+            <a:schemeClr val="tx1"/>
+          </a:solidFill>
         </p:spPr>
+        <p:style>
+          <a:lnRef idx="1">
+            <a:schemeClr val="accent1"/>
+          </a:lnRef>
+          <a:fillRef idx="3">
+            <a:schemeClr val="accent1"/>
+          </a:fillRef>
+          <a:effectRef idx="2">
+            <a:schemeClr val="accent1"/>
+          </a:effectRef>
+          <a:fontRef idx="minor">
+            <a:schemeClr val="lt1"/>
+          </a:fontRef>
+        </p:style>
         <p:txBody>
-          <a:bodyPr>
-            <a:normAutofit/>
-          </a:bodyPr>
+          <a:bodyPr rtlCol="0" anchor="ctr"/>
           <a:lstStyle/>
           <a:p>
-            <a:pPr marL="0" indent="0" algn="ctr">
-              <a:buNone/>
-            </a:pPr>
-            <a:r>
-              <a:rPr lang="en-US" sz="28700" dirty="0" smtClean="0"/>
-              <a:t>?</a:t>
-            </a:r>
-            <a:endParaRPr lang="en-US" sz="28700" dirty="0"/>
+            <a:pPr algn="ctr"/>
+            <a:endParaRPr lang="en-US"/>
           </a:p>
         </p:txBody>
       </p:sp>
+      <p:pic>
+        <p:nvPicPr>
+          <p:cNvPr id="10" name="Picture 9" descr="Accenture.svg.emf"/>
+          <p:cNvPicPr>
+            <a:picLocks noChangeAspect="1"/>
+          </p:cNvPicPr>
+          <p:nvPr/>
+        </p:nvPicPr>
+        <p:blipFill>
+          <a:blip r:embed="rId3">
+            <a:extLst>
+              <a:ext uri="{28A0092B-C50C-407E-A947-70E740481C1C}">
+                <a14:useLocalDpi xmlns:a14="http://schemas.microsoft.com/office/drawing/2010/main" val="0"/>
+              </a:ext>
+            </a:extLst>
+          </a:blip>
+          <a:stretch>
+            <a:fillRect/>
+          </a:stretch>
+        </p:blipFill>
+        <p:spPr>
+          <a:xfrm>
+            <a:off x="1331640" y="2132856"/>
+            <a:ext cx="6563709" cy="2016224"/>
+          </a:xfrm>
+          <a:prstGeom prst="rect">
+            <a:avLst/>
+          </a:prstGeom>
+        </p:spPr>
+      </p:pic>
     </p:spTree>
     <p:extLst>
       <p:ext uri="{BB962C8B-B14F-4D97-AF65-F5344CB8AC3E}">
-        <p14:creationId xmlns:p14="http://schemas.microsoft.com/office/powerpoint/2010/main" val="1414630886"/>
+        <p14:creationId xmlns:p14="http://schemas.microsoft.com/office/powerpoint/2010/main" val="1523860661"/>
       </p:ext>
     </p:extLst>
   </p:cSld>
@@ -12500,6 +12777,237 @@
       </p:grpSpPr>
       <p:sp>
         <p:nvSpPr>
+          <p:cNvPr id="6" name="Content Placeholder 5"/>
+          <p:cNvSpPr>
+            <a:spLocks noGrp="1"/>
+          </p:cNvSpPr>
+          <p:nvPr>
+            <p:ph idx="1"/>
+          </p:nvPr>
+        </p:nvSpPr>
+        <p:spPr>
+          <a:xfrm>
+            <a:off x="457200" y="764704"/>
+            <a:ext cx="8229600" cy="5361459"/>
+          </a:xfrm>
+        </p:spPr>
+        <p:txBody>
+          <a:bodyPr>
+            <a:normAutofit/>
+          </a:bodyPr>
+          <a:lstStyle/>
+          <a:p>
+            <a:pPr marL="0" indent="0" algn="ctr">
+              <a:buNone/>
+            </a:pPr>
+            <a:r>
+              <a:rPr lang="en-US" sz="28700" dirty="0" smtClean="0"/>
+              <a:t>?</a:t>
+            </a:r>
+            <a:endParaRPr lang="en-US" sz="28700" dirty="0"/>
+          </a:p>
+        </p:txBody>
+      </p:sp>
+    </p:spTree>
+    <p:extLst>
+      <p:ext uri="{BB962C8B-B14F-4D97-AF65-F5344CB8AC3E}">
+        <p14:creationId xmlns:p14="http://schemas.microsoft.com/office/powerpoint/2010/main" val="1414630886"/>
+      </p:ext>
+    </p:extLst>
+  </p:cSld>
+  <p:clrMapOvr>
+    <a:masterClrMapping/>
+  </p:clrMapOvr>
+  <p:timing>
+    <p:tnLst>
+      <p:par>
+        <p:cTn xmlns:p14="http://schemas.microsoft.com/office/powerpoint/2010/main" id="1" dur="indefinite" restart="never" nodeType="tmRoot"/>
+      </p:par>
+    </p:tnLst>
+  </p:timing>
+</p:sld>
+</file>
+
+<file path=ppt/slides/slide35.xml><?xml version="1.0" encoding="utf-8"?>
+<p:sld xmlns:a="http://schemas.openxmlformats.org/drawingml/2006/main" xmlns:r="http://schemas.openxmlformats.org/officeDocument/2006/relationships" xmlns:p="http://schemas.openxmlformats.org/presentationml/2006/main">
+  <p:cSld>
+    <p:spTree>
+      <p:nvGrpSpPr>
+        <p:cNvPr id="1" name=""/>
+        <p:cNvGrpSpPr/>
+        <p:nvPr/>
+      </p:nvGrpSpPr>
+      <p:grpSpPr>
+        <a:xfrm>
+          <a:off x="0" y="0"/>
+          <a:ext cx="0" cy="0"/>
+          <a:chOff x="0" y="0"/>
+          <a:chExt cx="0" cy="0"/>
+        </a:xfrm>
+      </p:grpSpPr>
+      <p:sp>
+        <p:nvSpPr>
+          <p:cNvPr id="2" name="Title 1"/>
+          <p:cNvSpPr>
+            <a:spLocks noGrp="1"/>
+          </p:cNvSpPr>
+          <p:nvPr>
+            <p:ph type="title"/>
+          </p:nvPr>
+        </p:nvSpPr>
+        <p:spPr/>
+        <p:txBody>
+          <a:bodyPr/>
+          <a:lstStyle/>
+          <a:p>
+            <a:r>
+              <a:rPr lang="en-US" dirty="0" err="1" smtClean="0"/>
+              <a:t>Github</a:t>
+            </a:r>
+            <a:r>
+              <a:rPr lang="en-US" dirty="0" smtClean="0"/>
+              <a:t> repo or it didn’t happen</a:t>
+            </a:r>
+            <a:endParaRPr lang="en-US" dirty="0"/>
+          </a:p>
+        </p:txBody>
+      </p:sp>
+      <p:sp>
+        <p:nvSpPr>
+          <p:cNvPr id="4" name="Rectangle 3"/>
+          <p:cNvSpPr/>
+          <p:nvPr/>
+        </p:nvSpPr>
+        <p:spPr>
+          <a:xfrm>
+            <a:off x="0" y="2996952"/>
+            <a:ext cx="9144000" cy="1656184"/>
+          </a:xfrm>
+          <a:prstGeom prst="rect">
+            <a:avLst/>
+          </a:prstGeom>
+          <a:solidFill>
+            <a:srgbClr val="D5D0D6">
+              <a:alpha val="78039"/>
+            </a:srgbClr>
+          </a:solidFill>
+        </p:spPr>
+        <p:txBody>
+          <a:bodyPr vert="horz" lIns="91440" tIns="108000" rIns="91440" bIns="295200" rtlCol="0" anchor="ctr" anchorCtr="0">
+            <a:noAutofit/>
+          </a:bodyPr>
+          <a:lstStyle/>
+          <a:p>
+            <a:pPr algn="ctr" defTabSz="457200" eaLnBrk="1" hangingPunct="1">
+              <a:lnSpc>
+                <a:spcPct val="130000"/>
+              </a:lnSpc>
+              <a:spcBef>
+                <a:spcPct val="20000"/>
+              </a:spcBef>
+              <a:buFont typeface="Arial"/>
+              <a:buNone/>
+            </a:pPr>
+            <a:r>
+              <a:rPr lang="en-US" sz="4400" dirty="0">
+                <a:solidFill>
+                  <a:schemeClr val="bg1">
+                    <a:lumMod val="75000"/>
+                  </a:schemeClr>
+                </a:solidFill>
+                <a:latin typeface="Calluna Sans" pitchFamily="50" charset="0"/>
+                <a:ea typeface="+mn-ea"/>
+                <a:cs typeface="Arial"/>
+              </a:rPr>
+              <a:t>https://</a:t>
+            </a:r>
+            <a:r>
+              <a:rPr lang="en-US" sz="4400" dirty="0" err="1">
+                <a:solidFill>
+                  <a:schemeClr val="bg1">
+                    <a:lumMod val="75000"/>
+                  </a:schemeClr>
+                </a:solidFill>
+                <a:latin typeface="Calluna Sans" pitchFamily="50" charset="0"/>
+                <a:ea typeface="+mn-ea"/>
+                <a:cs typeface="Arial"/>
+              </a:rPr>
+              <a:t>github.com</a:t>
+            </a:r>
+            <a:r>
+              <a:rPr lang="en-US" sz="4400" dirty="0">
+                <a:solidFill>
+                  <a:schemeClr val="bg1">
+                    <a:lumMod val="75000"/>
+                  </a:schemeClr>
+                </a:solidFill>
+                <a:latin typeface="Calluna Sans" pitchFamily="50" charset="0"/>
+                <a:ea typeface="+mn-ea"/>
+                <a:cs typeface="Arial"/>
+              </a:rPr>
+              <a:t>/</a:t>
+            </a:r>
+            <a:r>
+              <a:rPr lang="en-US" sz="4400" dirty="0" err="1">
+                <a:solidFill>
+                  <a:schemeClr val="bg1">
+                    <a:lumMod val="75000"/>
+                  </a:schemeClr>
+                </a:solidFill>
+                <a:latin typeface="Calluna Sans" pitchFamily="50" charset="0"/>
+                <a:ea typeface="+mn-ea"/>
+                <a:cs typeface="Arial"/>
+              </a:rPr>
+              <a:t>oscarrenalias</a:t>
+            </a:r>
+            <a:r>
+              <a:rPr lang="en-US" sz="4400" dirty="0">
+                <a:solidFill>
+                  <a:schemeClr val="bg1">
+                    <a:lumMod val="75000"/>
+                  </a:schemeClr>
+                </a:solidFill>
+                <a:latin typeface="Calluna Sans" pitchFamily="50" charset="0"/>
+                <a:ea typeface="+mn-ea"/>
+                <a:cs typeface="Arial"/>
+              </a:rPr>
+              <a:t>/wjax-2012-play-async-apps</a:t>
+            </a:r>
+          </a:p>
+        </p:txBody>
+      </p:sp>
+    </p:spTree>
+    <p:extLst>
+      <p:ext uri="{BB962C8B-B14F-4D97-AF65-F5344CB8AC3E}">
+        <p14:creationId xmlns:p14="http://schemas.microsoft.com/office/powerpoint/2010/main" val="3897917046"/>
+      </p:ext>
+    </p:extLst>
+  </p:cSld>
+  <p:clrMapOvr>
+    <a:masterClrMapping/>
+  </p:clrMapOvr>
+</p:sld>
+</file>
+
+<file path=ppt/slides/slide36.xml><?xml version="1.0" encoding="utf-8"?>
+<p:sld xmlns:a="http://schemas.openxmlformats.org/drawingml/2006/main" xmlns:r="http://schemas.openxmlformats.org/officeDocument/2006/relationships" xmlns:p="http://schemas.openxmlformats.org/presentationml/2006/main">
+  <p:cSld>
+    <p:spTree>
+      <p:nvGrpSpPr>
+        <p:cNvPr id="1" name=""/>
+        <p:cNvGrpSpPr/>
+        <p:nvPr/>
+      </p:nvGrpSpPr>
+      <p:grpSpPr>
+        <a:xfrm>
+          <a:off x="0" y="0"/>
+          <a:ext cx="0" cy="0"/>
+          <a:chOff x="0" y="0"/>
+          <a:chExt cx="0" cy="0"/>
+        </a:xfrm>
+      </p:grpSpPr>
+      <p:sp>
+        <p:nvSpPr>
           <p:cNvPr id="3" name="Content Placeholder 2"/>
           <p:cNvSpPr>
             <a:spLocks noGrp="1"/>
@@ -12541,6 +13049,13 @@
   <p:clrMapOvr>
     <a:masterClrMapping/>
   </p:clrMapOvr>
+  <p:timing>
+    <p:tnLst>
+      <p:par>
+        <p:cTn xmlns:p14="http://schemas.microsoft.com/office/powerpoint/2010/main" id="1" dur="indefinite" restart="never" nodeType="tmRoot"/>
+      </p:par>
+    </p:tnLst>
+  </p:timing>
 </p:sld>
 </file>
 

</xml_diff>

<commit_message>
First version of the deck with all content and slides in place. Finally.
</commit_message>
<xml_diff>
--- a/presentation/Asynchronous web apps with Play Framework 2.0.pptx
+++ b/presentation/Asynchronous web apps with Play Framework 2.0.pptx
@@ -7,7 +7,7 @@
     <p:sldMasterId id="2147483672" r:id="rId3"/>
   </p:sldMasterIdLst>
   <p:notesMasterIdLst>
-    <p:notesMasterId r:id="rId40"/>
+    <p:notesMasterId r:id="rId44"/>
   </p:notesMasterIdLst>
   <p:sldIdLst>
     <p:sldId id="259" r:id="rId4"/>
@@ -34,18 +34,22 @@
     <p:sldId id="291" r:id="rId25"/>
     <p:sldId id="289" r:id="rId26"/>
     <p:sldId id="274" r:id="rId27"/>
-    <p:sldId id="290" r:id="rId28"/>
-    <p:sldId id="264" r:id="rId29"/>
-    <p:sldId id="292" r:id="rId30"/>
-    <p:sldId id="272" r:id="rId31"/>
-    <p:sldId id="297" r:id="rId32"/>
-    <p:sldId id="275" r:id="rId33"/>
-    <p:sldId id="265" r:id="rId34"/>
-    <p:sldId id="295" r:id="rId35"/>
-    <p:sldId id="298" r:id="rId36"/>
-    <p:sldId id="286" r:id="rId37"/>
-    <p:sldId id="299" r:id="rId38"/>
-    <p:sldId id="287" r:id="rId39"/>
+    <p:sldId id="300" r:id="rId28"/>
+    <p:sldId id="290" r:id="rId29"/>
+    <p:sldId id="301" r:id="rId30"/>
+    <p:sldId id="302" r:id="rId31"/>
+    <p:sldId id="264" r:id="rId32"/>
+    <p:sldId id="303" r:id="rId33"/>
+    <p:sldId id="292" r:id="rId34"/>
+    <p:sldId id="272" r:id="rId35"/>
+    <p:sldId id="297" r:id="rId36"/>
+    <p:sldId id="275" r:id="rId37"/>
+    <p:sldId id="265" r:id="rId38"/>
+    <p:sldId id="295" r:id="rId39"/>
+    <p:sldId id="299" r:id="rId40"/>
+    <p:sldId id="298" r:id="rId41"/>
+    <p:sldId id="286" r:id="rId42"/>
+    <p:sldId id="287" r:id="rId43"/>
   </p:sldIdLst>
   <p:sldSz cx="9144000" cy="6858000" type="screen4x3"/>
   <p:notesSz cx="6858000" cy="9144000"/>
@@ -846,6 +850,84 @@
           <a:bodyPr/>
           <a:lstStyle/>
           <a:p>
+            <a:r>
+              <a:rPr lang="en-US" dirty="0" smtClean="0"/>
+              <a:t/>
+            </a:r>
+            <a:r>
+              <a:rPr lang="en-US" dirty="0" err="1" smtClean="0"/>
+              <a:t>Eumeratees</a:t>
+            </a:r>
+            <a:r>
+              <a:rPr lang="en-US" baseline="0" dirty="0" smtClean="0"/>
+              <a:t> convert the data generated by an Enumerator, and are </a:t>
+            </a:r>
+            <a:r>
+              <a:rPr lang="en-US" baseline="0" dirty="0" err="1" smtClean="0"/>
+              <a:t>composable</a:t>
+            </a:r>
+            <a:r>
+              <a:rPr lang="en-US" baseline="0" dirty="0" smtClean="0"/>
+              <a:t> and chainable because an </a:t>
+            </a:r>
+            <a:r>
+              <a:rPr lang="en-US" baseline="0" dirty="0" err="1" smtClean="0"/>
+              <a:t>Enumeratee</a:t>
+            </a:r>
+            <a:r>
+              <a:rPr lang="en-US" baseline="0" dirty="0" smtClean="0"/>
+              <a:t> produces a new enumerator.</a:t>
+            </a:r>
+          </a:p>
+          <a:p>
+            <a:endParaRPr lang="en-US" baseline="0" dirty="0" smtClean="0"/>
+          </a:p>
+          <a:p>
+            <a:r>
+              <a:rPr lang="en-US" baseline="0" dirty="0" smtClean="0"/>
+              <a:t>Some of the common </a:t>
+            </a:r>
+            <a:r>
+              <a:rPr lang="en-US" baseline="0" dirty="0" err="1" smtClean="0"/>
+              <a:t>enumeratees</a:t>
+            </a:r>
+            <a:r>
+              <a:rPr lang="en-US" baseline="0" dirty="0" smtClean="0"/>
+              <a:t> as </a:t>
+            </a:r>
+            <a:r>
+              <a:rPr lang="en-US" baseline="0" dirty="0" err="1" smtClean="0"/>
+              <a:t>Enumeratee.map</a:t>
+            </a:r>
+            <a:r>
+              <a:rPr lang="en-US" baseline="0" dirty="0" smtClean="0"/>
+              <a:t>, </a:t>
+            </a:r>
+            <a:r>
+              <a:rPr lang="en-US" baseline="0" dirty="0" err="1" smtClean="0"/>
+              <a:t>Enumeratee</a:t>
+            </a:r>
+            <a:r>
+              <a:rPr lang="en-US" baseline="0" dirty="0" smtClean="0"/>
+              <a:t>.</a:t>
+            </a:r>
+          </a:p>
+          <a:p>
+            <a:endParaRPr lang="en-US" baseline="0" dirty="0" smtClean="0"/>
+          </a:p>
+          <a:p>
+            <a:r>
+              <a:rPr lang="en-US" baseline="0" dirty="0" smtClean="0"/>
+              <a:t>The type signature for an </a:t>
+            </a:r>
+            <a:r>
+              <a:rPr lang="en-US" baseline="0" dirty="0" err="1" smtClean="0"/>
+              <a:t>Enumeratee</a:t>
+            </a:r>
+            <a:r>
+              <a:rPr lang="en-US" baseline="0" dirty="0" smtClean="0"/>
+              <a:t> is </a:t>
+            </a:r>
             <a:endParaRPr lang="en-US" dirty="0"/>
           </a:p>
         </p:txBody>
@@ -867,7 +949,7 @@
           <a:p>
             <a:fld id="{0C2B02A6-44A8-594C-8023-D31DDC0C2785}" type="slidenum">
               <a:rPr lang="en-US" smtClean="0"/>
-              <a:t>27</a:t>
+              <a:t>24</a:t>
             </a:fld>
             <a:endParaRPr lang="en-US"/>
           </a:p>
@@ -876,7 +958,7 @@
     </p:spTree>
     <p:extLst>
       <p:ext uri="{BB962C8B-B14F-4D97-AF65-F5344CB8AC3E}">
-        <p14:creationId xmlns:p14="http://schemas.microsoft.com/office/powerpoint/2010/main" val="2679536641"/>
+        <p14:creationId xmlns:p14="http://schemas.microsoft.com/office/powerpoint/2010/main" val="1917909189"/>
       </p:ext>
     </p:extLst>
   </p:cSld>
@@ -930,48 +1012,57 @@
           <a:bodyPr/>
           <a:lstStyle/>
           <a:p>
+            <a:pPr marL="171450" indent="-171450">
+              <a:buFont typeface="Arial"/>
+              <a:buChar char="•"/>
+            </a:pPr>
+            <a:r>
+              <a:rPr lang="en-US" dirty="0" err="1" smtClean="0"/>
+              <a:t>Enumeratee.map</a:t>
+            </a:r>
             <a:r>
               <a:rPr lang="en-US" dirty="0" smtClean="0"/>
-              <a:t>Can’t work with Play? No </a:t>
-            </a:r>
-            <a:r>
-              <a:rPr lang="en-US" dirty="0" smtClean="0"/>
-              <a:t>problem,</a:t>
+              <a:t> processes input</a:t>
             </a:r>
             <a:r>
               <a:rPr lang="en-US" baseline="0" dirty="0" smtClean="0"/>
-              <a:t> other frameworks are catching up and eventually the development of asynchronous applications will be commonplace.</a:t>
-            </a:r>
-          </a:p>
-          <a:p>
-            <a:endParaRPr lang="en-US" baseline="0" dirty="0" smtClean="0"/>
-          </a:p>
-          <a:p>
+              <a:t> data from another enumerator or </a:t>
+            </a:r>
+            <a:r>
+              <a:rPr lang="en-US" baseline="0" dirty="0" err="1" smtClean="0"/>
+              <a:t>enumeratee</a:t>
+            </a:r>
             <a:r>
               <a:rPr lang="en-US" baseline="0" dirty="0" smtClean="0"/>
-              <a:t>One of the biggest enablers of asynchronous applications is the servlet 3.0 spec, which allows applications to mark certain requests as suspended and allow the app server to handle those in the background.</a:t>
-            </a:r>
-          </a:p>
-          <a:p>
-            <a:endParaRPr lang="en-US" baseline="0" dirty="0" smtClean="0"/>
-          </a:p>
-          <a:p>
+              <a:t> and transforms items with the given function</a:t>
+            </a:r>
+          </a:p>
+          <a:p>
+            <a:pPr marL="171450" indent="-171450">
+              <a:buFont typeface="Arial"/>
+              <a:buChar char="•"/>
+            </a:pPr>
+            <a:r>
+              <a:rPr lang="en-US" baseline="0" dirty="0" err="1" smtClean="0"/>
+              <a:t>Enumeratee.filter</a:t>
+            </a:r>
             <a:r>
               <a:rPr lang="en-US" baseline="0" dirty="0" smtClean="0"/>
-              <a:t>The example above is based on Grails 2.0 </a:t>
+              <a:t> filters out certain types of input from an enumerator</a:t>
+            </a:r>
+          </a:p>
+          <a:p>
+            <a:pPr marL="171450" indent="-171450">
+              <a:buFont typeface="Arial"/>
+              <a:buChar char="•"/>
+            </a:pPr>
+            <a:r>
+              <a:rPr lang="en-US" baseline="0" dirty="0" err="1" smtClean="0"/>
+              <a:t>Enumeratee</a:t>
             </a:r>
             <a:r>
               <a:rPr lang="en-US" baseline="0" dirty="0" smtClean="0"/>
-              <a:t>+ a Servlet 3.0 server (such as Tomcat 7.0), just to see how it works. As you may have already noticed, it shows a bit too much of the low-level interface by forcing controller classes to handle asynchronous contexts… In my opinion Play’s API is more elegant but Groovy lends itself very nicely to internal DSLs so it’s likely that the Grails guys will work on some higher-level abstractions to make development easier.</a:t>
-            </a:r>
-          </a:p>
-          <a:p>
-            <a:endParaRPr lang="en-US" baseline="0" dirty="0" smtClean="0"/>
-          </a:p>
-          <a:p>
-            <a:r>
-              <a:rPr lang="en-US" baseline="0" dirty="0" smtClean="0"/>
-              <a:t>Note: the example is taken from the Grails 2.0 release notes.</a:t>
+              <a:t>.</a:t>
             </a:r>
             <a:endParaRPr lang="en-US" dirty="0"/>
           </a:p>
@@ -994,7 +1085,7 @@
           <a:p>
             <a:fld id="{0C2B02A6-44A8-594C-8023-D31DDC0C2785}" type="slidenum">
               <a:rPr lang="en-US" smtClean="0"/>
-              <a:t>31</a:t>
+              <a:t>25</a:t>
             </a:fld>
             <a:endParaRPr lang="en-US"/>
           </a:p>
@@ -1003,7 +1094,7 @@
     </p:spTree>
     <p:extLst>
       <p:ext uri="{BB962C8B-B14F-4D97-AF65-F5344CB8AC3E}">
-        <p14:creationId xmlns:p14="http://schemas.microsoft.com/office/powerpoint/2010/main" val="2140312193"/>
+        <p14:creationId xmlns:p14="http://schemas.microsoft.com/office/powerpoint/2010/main" val="1654610968"/>
       </p:ext>
     </p:extLst>
   </p:cSld>
@@ -1058,67 +1149,62 @@
           <a:lstStyle/>
           <a:p>
             <a:r>
-              <a:rPr lang="en-US" dirty="0" err="1" smtClean="0"/>
-              <a:t>Vert.x</a:t>
-            </a:r>
-            <a:r>
               <a:rPr lang="en-US" dirty="0" smtClean="0"/>
-              <a:t> defines</a:t>
+              <a:t>Essentially,</a:t>
             </a:r>
             <a:r>
               <a:rPr lang="en-US" baseline="0" dirty="0" smtClean="0"/>
-              <a:t> itself as “Effortless asynchronous application development for the modern web and enterprise”. It’s not a coincidence that in their efforts to implement a high-performance asynchronous web framework, the </a:t>
+              <a:t> </a:t>
             </a:r>
             <a:r>
               <a:rPr lang="en-US" baseline="0" dirty="0" err="1" smtClean="0"/>
-              <a:t>Vert.x</a:t>
+              <a:t>Iteratees</a:t>
             </a:r>
             <a:r>
               <a:rPr lang="en-US" baseline="0" dirty="0" smtClean="0"/>
-              <a:t> development team also kept away from JEE </a:t>
-            </a:r>
-            <a:r>
-              <a:rPr lang="en-US" baseline="0" dirty="0" smtClean="0">
-                <a:sym typeface="Wingdings"/>
-              </a:rPr>
-              <a:t></a:t>
-            </a:r>
-          </a:p>
-          <a:p>
-            <a:endParaRPr lang="en-US" baseline="0" dirty="0" smtClean="0">
-              <a:sym typeface="Wingdings"/>
-            </a:endParaRPr>
-          </a:p>
-          <a:p>
-            <a:r>
-              <a:rPr lang="en-US" baseline="0" dirty="0" smtClean="0">
-                <a:sym typeface="Wingdings"/>
-              </a:rPr>
-              <a:t>However as opposed to Play, </a:t>
-            </a:r>
-            <a:r>
-              <a:rPr lang="en-US" baseline="0" dirty="0" err="1" smtClean="0">
-                <a:sym typeface="Wingdings"/>
-              </a:rPr>
-              <a:t>Vert.x’s</a:t>
-            </a:r>
-            <a:r>
-              <a:rPr lang="en-US" baseline="0" dirty="0" smtClean="0">
-                <a:sym typeface="Wingdings"/>
-              </a:rPr>
-              <a:t> architecture is based on the callback-style mechanism. While I have no direct experience developing large-scale applications or applications with complex logic on </a:t>
-            </a:r>
-            <a:r>
-              <a:rPr lang="en-US" baseline="0" dirty="0" err="1" smtClean="0">
-                <a:sym typeface="Wingdings"/>
-              </a:rPr>
-              <a:t>Vert.x</a:t>
-            </a:r>
-            <a:r>
-              <a:rPr lang="en-US" baseline="0" dirty="0" smtClean="0">
-                <a:sym typeface="Wingdings"/>
-              </a:rPr>
-              <a:t>, it remains to be seen how efficient this approach is in those cases.</a:t>
+              <a:t> act as a sink for input that is generated by an Enumerator and possibly mapped with an </a:t>
+            </a:r>
+            <a:r>
+              <a:rPr lang="en-US" baseline="0" dirty="0" err="1" smtClean="0"/>
+              <a:t>Enumeratee</a:t>
+            </a:r>
+            <a:r>
+              <a:rPr lang="en-US" baseline="0" dirty="0" smtClean="0"/>
+              <a:t>.</a:t>
+            </a:r>
+          </a:p>
+          <a:p>
+            <a:endParaRPr lang="en-US" baseline="0" dirty="0" smtClean="0"/>
+          </a:p>
+          <a:p>
+            <a:r>
+              <a:rPr lang="en-US" baseline="0" dirty="0" smtClean="0"/>
+              <a:t>Working with </a:t>
+            </a:r>
+            <a:r>
+              <a:rPr lang="en-US" baseline="0" dirty="0" err="1" smtClean="0"/>
+              <a:t>iteratees</a:t>
+            </a:r>
+            <a:r>
+              <a:rPr lang="en-US" baseline="0" dirty="0" smtClean="0"/>
+              <a:t> consists of repeatedly calling the fold() method with the given input in order to check what the next status is.</a:t>
+            </a:r>
+          </a:p>
+          <a:p>
+            <a:endParaRPr lang="en-US" baseline="0" dirty="0" smtClean="0"/>
+          </a:p>
+          <a:p>
+            <a:r>
+              <a:rPr lang="en-US" baseline="0" dirty="0" smtClean="0"/>
+              <a:t>But all these operations are fairly low-level, so there are abstractions available that simplify that work in the </a:t>
+            </a:r>
+            <a:r>
+              <a:rPr lang="en-US" baseline="0" dirty="0" err="1" smtClean="0"/>
+              <a:t>Iteratee</a:t>
+            </a:r>
+            <a:r>
+              <a:rPr lang="en-US" baseline="0" dirty="0" smtClean="0"/>
+              <a:t> object.</a:t>
             </a:r>
             <a:endParaRPr lang="en-US" dirty="0"/>
           </a:p>
@@ -1141,7 +1227,7 @@
           <a:p>
             <a:fld id="{0C2B02A6-44A8-594C-8023-D31DDC0C2785}" type="slidenum">
               <a:rPr lang="en-US" smtClean="0"/>
-              <a:t>32</a:t>
+              <a:t>26</a:t>
             </a:fld>
             <a:endParaRPr lang="en-US"/>
           </a:p>
@@ -1150,7 +1236,7 @@
     </p:spTree>
     <p:extLst>
       <p:ext uri="{BB962C8B-B14F-4D97-AF65-F5344CB8AC3E}">
-        <p14:creationId xmlns:p14="http://schemas.microsoft.com/office/powerpoint/2010/main" val="2140312193"/>
+        <p14:creationId xmlns:p14="http://schemas.microsoft.com/office/powerpoint/2010/main" val="2628166926"/>
       </p:ext>
     </p:extLst>
   </p:cSld>
@@ -1204,75 +1290,6 @@
           <a:bodyPr/>
           <a:lstStyle/>
           <a:p>
-            <a:r>
-              <a:rPr lang="en-US" dirty="0" smtClean="0"/>
-              <a:t>Shameless plug</a:t>
-            </a:r>
-            <a:r>
-              <a:rPr lang="en-US" baseline="0" dirty="0" smtClean="0"/>
-              <a:t> </a:t>
-            </a:r>
-            <a:r>
-              <a:rPr lang="en-US" baseline="0" dirty="0" smtClean="0">
-                <a:sym typeface="Wingdings"/>
-              </a:rPr>
-              <a:t></a:t>
-            </a:r>
-          </a:p>
-          <a:p>
-            <a:endParaRPr lang="en-US" baseline="0" dirty="0" smtClean="0">
-              <a:sym typeface="Wingdings"/>
-            </a:endParaRPr>
-          </a:p>
-          <a:p>
-            <a:r>
-              <a:rPr lang="en-US" baseline="0" dirty="0" smtClean="0">
-                <a:sym typeface="Wingdings"/>
-              </a:rPr>
-              <a:t>At Accenture we have also been training ourselves with Play 2.0 (both Java and </a:t>
-            </a:r>
-            <a:r>
-              <a:rPr lang="en-US" baseline="0" dirty="0" err="1" smtClean="0">
-                <a:sym typeface="Wingdings"/>
-              </a:rPr>
-              <a:t>Scala</a:t>
-            </a:r>
-            <a:r>
-              <a:rPr lang="en-US" baseline="0" dirty="0" smtClean="0">
-                <a:sym typeface="Wingdings"/>
-              </a:rPr>
-              <a:t>) and we are currently delivering an interesting project on </a:t>
-            </a:r>
-            <a:r>
-              <a:rPr lang="en-US" baseline="0" dirty="0" smtClean="0">
-                <a:sym typeface="Wingdings"/>
-              </a:rPr>
-              <a:t>Play Java and preparing to deliver an even more interesting one with Play </a:t>
-            </a:r>
-            <a:r>
-              <a:rPr lang="en-US" baseline="0" dirty="0" err="1" smtClean="0">
-                <a:sym typeface="Wingdings"/>
-              </a:rPr>
-              <a:t>Scala</a:t>
-            </a:r>
-            <a:r>
-              <a:rPr lang="en-US" baseline="0" dirty="0" smtClean="0">
-                <a:sym typeface="Wingdings"/>
-              </a:rPr>
-              <a:t> to implement a highly-scalable API so we are ready to help you and clients in general with these innovative technologies and frameworks (even if innovation and say, </a:t>
-            </a:r>
-            <a:r>
-              <a:rPr lang="en-US" baseline="0" dirty="0" err="1" smtClean="0">
-                <a:sym typeface="Wingdings"/>
-              </a:rPr>
-              <a:t>Scala</a:t>
-            </a:r>
-            <a:r>
-              <a:rPr lang="en-US" baseline="0" dirty="0" smtClean="0">
-                <a:sym typeface="Wingdings"/>
-              </a:rPr>
-              <a:t>, are not the first things that come to your minds when you think of Accenture)</a:t>
-            </a:r>
             <a:endParaRPr lang="en-US" dirty="0"/>
           </a:p>
         </p:txBody>
@@ -1294,6 +1311,819 @@
           <a:p>
             <a:fld id="{0C2B02A6-44A8-594C-8023-D31DDC0C2785}" type="slidenum">
               <a:rPr lang="en-US" smtClean="0"/>
+              <a:t>27</a:t>
+            </a:fld>
+            <a:endParaRPr lang="en-US"/>
+          </a:p>
+        </p:txBody>
+      </p:sp>
+    </p:spTree>
+    <p:extLst>
+      <p:ext uri="{BB962C8B-B14F-4D97-AF65-F5344CB8AC3E}">
+        <p14:creationId xmlns:p14="http://schemas.microsoft.com/office/powerpoint/2010/main" val="179199892"/>
+      </p:ext>
+    </p:extLst>
+  </p:cSld>
+  <p:clrMapOvr>
+    <a:masterClrMapping/>
+  </p:clrMapOvr>
+</p:notes>
+</file>
+
+<file path=ppt/notesSlides/notesSlide15.xml><?xml version="1.0" encoding="utf-8"?>
+<p:notes xmlns:a="http://schemas.openxmlformats.org/drawingml/2006/main" xmlns:r="http://schemas.openxmlformats.org/officeDocument/2006/relationships" xmlns:p="http://schemas.openxmlformats.org/presentationml/2006/main">
+  <p:cSld>
+    <p:spTree>
+      <p:nvGrpSpPr>
+        <p:cNvPr id="1" name=""/>
+        <p:cNvGrpSpPr/>
+        <p:nvPr/>
+      </p:nvGrpSpPr>
+      <p:grpSpPr>
+        <a:xfrm>
+          <a:off x="0" y="0"/>
+          <a:ext cx="0" cy="0"/>
+          <a:chOff x="0" y="0"/>
+          <a:chExt cx="0" cy="0"/>
+        </a:xfrm>
+      </p:grpSpPr>
+      <p:sp>
+        <p:nvSpPr>
+          <p:cNvPr id="2" name="Slide Image Placeholder 1"/>
+          <p:cNvSpPr>
+            <a:spLocks noGrp="1" noRot="1" noChangeAspect="1"/>
+          </p:cNvSpPr>
+          <p:nvPr>
+            <p:ph type="sldImg"/>
+          </p:nvPr>
+        </p:nvSpPr>
+        <p:spPr/>
+      </p:sp>
+      <p:sp>
+        <p:nvSpPr>
+          <p:cNvPr id="3" name="Notes Placeholder 2"/>
+          <p:cNvSpPr>
+            <a:spLocks noGrp="1"/>
+          </p:cNvSpPr>
+          <p:nvPr>
+            <p:ph type="body" idx="1"/>
+          </p:nvPr>
+        </p:nvSpPr>
+        <p:spPr/>
+        <p:txBody>
+          <a:bodyPr/>
+          <a:lstStyle/>
+          <a:p>
+            <a:r>
+              <a:rPr lang="en-US" dirty="0" smtClean="0"/>
+              <a:t>Using </a:t>
+            </a:r>
+            <a:r>
+              <a:rPr lang="en-US" dirty="0" err="1" smtClean="0"/>
+              <a:t>Ok.feed</a:t>
+            </a:r>
+            <a:r>
+              <a:rPr lang="en-US" dirty="0" smtClean="0"/>
+              <a:t> and</a:t>
+            </a:r>
+            <a:r>
+              <a:rPr lang="en-US" baseline="0" dirty="0" smtClean="0"/>
+              <a:t> </a:t>
+            </a:r>
+            <a:r>
+              <a:rPr lang="en-US" baseline="0" dirty="0" err="1" smtClean="0"/>
+              <a:t>Ok.stream</a:t>
+            </a:r>
+            <a:r>
+              <a:rPr lang="en-US" baseline="0" dirty="0" smtClean="0"/>
+              <a:t> we can use our </a:t>
+            </a:r>
+            <a:r>
+              <a:rPr lang="en-US" baseline="0" dirty="0" err="1" smtClean="0"/>
+              <a:t>Iteratees</a:t>
+            </a:r>
+            <a:r>
+              <a:rPr lang="en-US" baseline="0" dirty="0" smtClean="0"/>
+              <a:t> and our Enumerators/</a:t>
+            </a:r>
+            <a:r>
+              <a:rPr lang="en-US" baseline="0" dirty="0" err="1" smtClean="0"/>
+              <a:t>Enumeratees</a:t>
+            </a:r>
+            <a:r>
+              <a:rPr lang="en-US" baseline="0" dirty="0" smtClean="0"/>
+              <a:t> to return non-blocking responses to clients. Their non-blocking nature ensures that no processing time is wasted on them while there is no input, while the framework will ensure that data is sent to clients as soon as it becomes available.</a:t>
+            </a:r>
+            <a:endParaRPr lang="en-US" dirty="0"/>
+          </a:p>
+        </p:txBody>
+      </p:sp>
+      <p:sp>
+        <p:nvSpPr>
+          <p:cNvPr id="4" name="Slide Number Placeholder 3"/>
+          <p:cNvSpPr>
+            <a:spLocks noGrp="1"/>
+          </p:cNvSpPr>
+          <p:nvPr>
+            <p:ph type="sldNum" sz="quarter" idx="10"/>
+          </p:nvPr>
+        </p:nvSpPr>
+        <p:spPr/>
+        <p:txBody>
+          <a:bodyPr/>
+          <a:lstStyle/>
+          <a:p>
+            <a:fld id="{0C2B02A6-44A8-594C-8023-D31DDC0C2785}" type="slidenum">
+              <a:rPr lang="en-US" smtClean="0"/>
+              <a:t>28</a:t>
+            </a:fld>
+            <a:endParaRPr lang="en-US"/>
+          </a:p>
+        </p:txBody>
+      </p:sp>
+    </p:spTree>
+    <p:extLst>
+      <p:ext uri="{BB962C8B-B14F-4D97-AF65-F5344CB8AC3E}">
+        <p14:creationId xmlns:p14="http://schemas.microsoft.com/office/powerpoint/2010/main" val="4224573714"/>
+      </p:ext>
+    </p:extLst>
+  </p:cSld>
+  <p:clrMapOvr>
+    <a:masterClrMapping/>
+  </p:clrMapOvr>
+</p:notes>
+</file>
+
+<file path=ppt/notesSlides/notesSlide16.xml><?xml version="1.0" encoding="utf-8"?>
+<p:notes xmlns:a="http://schemas.openxmlformats.org/drawingml/2006/main" xmlns:r="http://schemas.openxmlformats.org/officeDocument/2006/relationships" xmlns:p="http://schemas.openxmlformats.org/presentationml/2006/main">
+  <p:cSld>
+    <p:spTree>
+      <p:nvGrpSpPr>
+        <p:cNvPr id="1" name=""/>
+        <p:cNvGrpSpPr/>
+        <p:nvPr/>
+      </p:nvGrpSpPr>
+      <p:grpSpPr>
+        <a:xfrm>
+          <a:off x="0" y="0"/>
+          <a:ext cx="0" cy="0"/>
+          <a:chOff x="0" y="0"/>
+          <a:chExt cx="0" cy="0"/>
+        </a:xfrm>
+      </p:grpSpPr>
+      <p:sp>
+        <p:nvSpPr>
+          <p:cNvPr id="2" name="Slide Image Placeholder 1"/>
+          <p:cNvSpPr>
+            <a:spLocks noGrp="1" noRot="1" noChangeAspect="1"/>
+          </p:cNvSpPr>
+          <p:nvPr>
+            <p:ph type="sldImg"/>
+          </p:nvPr>
+        </p:nvSpPr>
+        <p:spPr/>
+      </p:sp>
+      <p:sp>
+        <p:nvSpPr>
+          <p:cNvPr id="3" name="Notes Placeholder 2"/>
+          <p:cNvSpPr>
+            <a:spLocks noGrp="1"/>
+          </p:cNvSpPr>
+          <p:nvPr>
+            <p:ph type="body" idx="1"/>
+          </p:nvPr>
+        </p:nvSpPr>
+        <p:spPr/>
+        <p:txBody>
+          <a:bodyPr/>
+          <a:lstStyle/>
+          <a:p>
+            <a:r>
+              <a:rPr lang="en-US" dirty="0" err="1" smtClean="0"/>
+              <a:t>Enumerator.fromFile</a:t>
+            </a:r>
+            <a:r>
+              <a:rPr lang="en-US" baseline="0" dirty="0" smtClean="0"/>
+              <a:t> gives us a totally straightforward mechanism for streaming data from a file as an Enumerator, which we can naturally map with </a:t>
+            </a:r>
+            <a:r>
+              <a:rPr lang="en-US" baseline="0" dirty="0" err="1" smtClean="0"/>
+              <a:t>Enumeratee</a:t>
+            </a:r>
+            <a:r>
+              <a:rPr lang="en-US" baseline="0" dirty="0" smtClean="0"/>
+              <a:t> and process with an </a:t>
+            </a:r>
+            <a:r>
+              <a:rPr lang="en-US" baseline="0" dirty="0" err="1" smtClean="0"/>
+              <a:t>Iteratee</a:t>
+            </a:r>
+            <a:r>
+              <a:rPr lang="en-US" baseline="0" dirty="0" smtClean="0"/>
+              <a:t> or just feed it into </a:t>
+            </a:r>
+            <a:r>
+              <a:rPr lang="en-US" baseline="0" dirty="0" err="1" smtClean="0"/>
+              <a:t>Ok.stream</a:t>
+            </a:r>
+            <a:r>
+              <a:rPr lang="en-US" baseline="0" dirty="0" smtClean="0"/>
+              <a:t>/</a:t>
+            </a:r>
+            <a:r>
+              <a:rPr lang="en-US" baseline="0" dirty="0" err="1" smtClean="0"/>
+              <a:t>Ok.feed</a:t>
+            </a:r>
+            <a:r>
+              <a:rPr lang="en-US" baseline="0" dirty="0" smtClean="0"/>
+              <a:t>.</a:t>
+            </a:r>
+            <a:endParaRPr lang="en-US" dirty="0" smtClean="0"/>
+          </a:p>
+          <a:p>
+            <a:endParaRPr lang="en-US" dirty="0" smtClean="0"/>
+          </a:p>
+          <a:p>
+            <a:r>
+              <a:rPr lang="en-US" dirty="0" smtClean="0"/>
+              <a:t>More generically, </a:t>
+            </a:r>
+            <a:r>
+              <a:rPr lang="en-US" dirty="0" err="1" smtClean="0"/>
+              <a:t>Enumerator.fromStream</a:t>
+            </a:r>
+            <a:r>
+              <a:rPr lang="en-US" baseline="0" dirty="0" smtClean="0"/>
+              <a:t> is also available and that will allow us to plug in any </a:t>
+            </a:r>
+            <a:r>
+              <a:rPr lang="en-US" baseline="0" dirty="0" err="1" smtClean="0"/>
+              <a:t>InputStream</a:t>
+            </a:r>
+            <a:r>
+              <a:rPr lang="en-US" baseline="0" dirty="0" smtClean="0"/>
+              <a:t> of any kind as an enumerator.</a:t>
+            </a:r>
+            <a:endParaRPr lang="en-US" dirty="0"/>
+          </a:p>
+        </p:txBody>
+      </p:sp>
+      <p:sp>
+        <p:nvSpPr>
+          <p:cNvPr id="4" name="Slide Number Placeholder 3"/>
+          <p:cNvSpPr>
+            <a:spLocks noGrp="1"/>
+          </p:cNvSpPr>
+          <p:nvPr>
+            <p:ph type="sldNum" sz="quarter" idx="10"/>
+          </p:nvPr>
+        </p:nvSpPr>
+        <p:spPr/>
+        <p:txBody>
+          <a:bodyPr/>
+          <a:lstStyle/>
+          <a:p>
+            <a:fld id="{0C2B02A6-44A8-594C-8023-D31DDC0C2785}" type="slidenum">
+              <a:rPr lang="en-US" smtClean="0"/>
+              <a:t>30</a:t>
+            </a:fld>
+            <a:endParaRPr lang="en-US"/>
+          </a:p>
+        </p:txBody>
+      </p:sp>
+    </p:spTree>
+    <p:extLst>
+      <p:ext uri="{BB962C8B-B14F-4D97-AF65-F5344CB8AC3E}">
+        <p14:creationId xmlns:p14="http://schemas.microsoft.com/office/powerpoint/2010/main" val="1689672506"/>
+      </p:ext>
+    </p:extLst>
+  </p:cSld>
+  <p:clrMapOvr>
+    <a:masterClrMapping/>
+  </p:clrMapOvr>
+</p:notes>
+</file>
+
+<file path=ppt/notesSlides/notesSlide17.xml><?xml version="1.0" encoding="utf-8"?>
+<p:notes xmlns:a="http://schemas.openxmlformats.org/drawingml/2006/main" xmlns:r="http://schemas.openxmlformats.org/officeDocument/2006/relationships" xmlns:p="http://schemas.openxmlformats.org/presentationml/2006/main">
+  <p:cSld>
+    <p:spTree>
+      <p:nvGrpSpPr>
+        <p:cNvPr id="1" name=""/>
+        <p:cNvGrpSpPr/>
+        <p:nvPr/>
+      </p:nvGrpSpPr>
+      <p:grpSpPr>
+        <a:xfrm>
+          <a:off x="0" y="0"/>
+          <a:ext cx="0" cy="0"/>
+          <a:chOff x="0" y="0"/>
+          <a:chExt cx="0" cy="0"/>
+        </a:xfrm>
+      </p:grpSpPr>
+      <p:sp>
+        <p:nvSpPr>
+          <p:cNvPr id="2" name="Slide Image Placeholder 1"/>
+          <p:cNvSpPr>
+            <a:spLocks noGrp="1" noRot="1" noChangeAspect="1"/>
+          </p:cNvSpPr>
+          <p:nvPr>
+            <p:ph type="sldImg"/>
+          </p:nvPr>
+        </p:nvSpPr>
+        <p:spPr/>
+      </p:sp>
+      <p:sp>
+        <p:nvSpPr>
+          <p:cNvPr id="3" name="Notes Placeholder 2"/>
+          <p:cNvSpPr>
+            <a:spLocks noGrp="1"/>
+          </p:cNvSpPr>
+          <p:nvPr>
+            <p:ph type="body" idx="1"/>
+          </p:nvPr>
+        </p:nvSpPr>
+        <p:spPr/>
+        <p:txBody>
+          <a:bodyPr/>
+          <a:lstStyle/>
+          <a:p>
+            <a:r>
+              <a:rPr lang="en-US" dirty="0" smtClean="0"/>
+              <a:t>The easiest way to implement scalable,</a:t>
+            </a:r>
+            <a:r>
+              <a:rPr lang="en-US" baseline="0" dirty="0" smtClean="0"/>
+              <a:t> asynchronous non-blocking streaming APIs is to use </a:t>
+            </a:r>
+            <a:r>
+              <a:rPr lang="en-US" baseline="0" dirty="0" err="1" smtClean="0"/>
+              <a:t>Ok.stream</a:t>
+            </a:r>
+            <a:r>
+              <a:rPr lang="en-US" baseline="0" dirty="0" smtClean="0"/>
+              <a:t> as it </a:t>
+            </a:r>
+            <a:r>
+              <a:rPr lang="en-US" dirty="0" smtClean="0"/>
+              <a:t>returns chunked</a:t>
+            </a:r>
+            <a:r>
+              <a:rPr lang="en-US" baseline="0" dirty="0" smtClean="0"/>
+              <a:t> responses and will suspend the thread if no data is available to be pushed.</a:t>
+            </a:r>
+          </a:p>
+          <a:p>
+            <a:endParaRPr lang="en-US" baseline="0" dirty="0" smtClean="0"/>
+          </a:p>
+          <a:p>
+            <a:r>
+              <a:rPr lang="en-US" baseline="0" dirty="0" smtClean="0"/>
+              <a:t>Our enumerator can be then reading data from a database, waiting for external events (like a </a:t>
+            </a:r>
+            <a:r>
+              <a:rPr lang="en-US" baseline="0" dirty="0" err="1" smtClean="0"/>
+              <a:t>PushEnumerator</a:t>
+            </a:r>
+            <a:r>
+              <a:rPr lang="en-US" baseline="0" dirty="0" smtClean="0"/>
+              <a:t>) or reacting to a callback event like </a:t>
+            </a:r>
+            <a:r>
+              <a:rPr lang="en-US" baseline="0" dirty="0" err="1" smtClean="0"/>
+              <a:t>Enumerator.fromCallback</a:t>
+            </a:r>
+            <a:r>
+              <a:rPr lang="en-US" baseline="0" dirty="0" smtClean="0"/>
+              <a:t>.</a:t>
+            </a:r>
+          </a:p>
+          <a:p>
+            <a:endParaRPr lang="en-US" baseline="0" dirty="0" smtClean="0"/>
+          </a:p>
+          <a:p>
+            <a:r>
+              <a:rPr lang="en-US" baseline="0" dirty="0" smtClean="0"/>
+              <a:t>Naturally the data produced by the enumerator can be transformed using </a:t>
+            </a:r>
+            <a:r>
+              <a:rPr lang="en-US" baseline="0" dirty="0" err="1" smtClean="0"/>
+              <a:t>Enumeratees</a:t>
+            </a:r>
+            <a:r>
+              <a:rPr lang="en-US" baseline="0" dirty="0" smtClean="0"/>
+              <a:t> along the way.</a:t>
+            </a:r>
+          </a:p>
+        </p:txBody>
+      </p:sp>
+      <p:sp>
+        <p:nvSpPr>
+          <p:cNvPr id="4" name="Slide Number Placeholder 3"/>
+          <p:cNvSpPr>
+            <a:spLocks noGrp="1"/>
+          </p:cNvSpPr>
+          <p:nvPr>
+            <p:ph type="sldNum" sz="quarter" idx="10"/>
+          </p:nvPr>
+        </p:nvSpPr>
+        <p:spPr/>
+        <p:txBody>
+          <a:bodyPr/>
+          <a:lstStyle/>
+          <a:p>
+            <a:fld id="{0C2B02A6-44A8-594C-8023-D31DDC0C2785}" type="slidenum">
+              <a:rPr lang="en-US" smtClean="0"/>
+              <a:t>31</a:t>
+            </a:fld>
+            <a:endParaRPr lang="en-US"/>
+          </a:p>
+        </p:txBody>
+      </p:sp>
+    </p:spTree>
+    <p:extLst>
+      <p:ext uri="{BB962C8B-B14F-4D97-AF65-F5344CB8AC3E}">
+        <p14:creationId xmlns:p14="http://schemas.microsoft.com/office/powerpoint/2010/main" val="2679536641"/>
+      </p:ext>
+    </p:extLst>
+  </p:cSld>
+  <p:clrMapOvr>
+    <a:masterClrMapping/>
+  </p:clrMapOvr>
+</p:notes>
+</file>
+
+<file path=ppt/notesSlides/notesSlide18.xml><?xml version="1.0" encoding="utf-8"?>
+<p:notes xmlns:a="http://schemas.openxmlformats.org/drawingml/2006/main" xmlns:r="http://schemas.openxmlformats.org/officeDocument/2006/relationships" xmlns:p="http://schemas.openxmlformats.org/presentationml/2006/main">
+  <p:cSld>
+    <p:spTree>
+      <p:nvGrpSpPr>
+        <p:cNvPr id="1" name=""/>
+        <p:cNvGrpSpPr/>
+        <p:nvPr/>
+      </p:nvGrpSpPr>
+      <p:grpSpPr>
+        <a:xfrm>
+          <a:off x="0" y="0"/>
+          <a:ext cx="0" cy="0"/>
+          <a:chOff x="0" y="0"/>
+          <a:chExt cx="0" cy="0"/>
+        </a:xfrm>
+      </p:grpSpPr>
+      <p:sp>
+        <p:nvSpPr>
+          <p:cNvPr id="2" name="Slide Image Placeholder 1"/>
+          <p:cNvSpPr>
+            <a:spLocks noGrp="1" noRot="1" noChangeAspect="1"/>
+          </p:cNvSpPr>
+          <p:nvPr>
+            <p:ph type="sldImg"/>
+          </p:nvPr>
+        </p:nvSpPr>
+        <p:spPr/>
+      </p:sp>
+      <p:sp>
+        <p:nvSpPr>
+          <p:cNvPr id="3" name="Notes Placeholder 2"/>
+          <p:cNvSpPr>
+            <a:spLocks noGrp="1"/>
+          </p:cNvSpPr>
+          <p:nvPr>
+            <p:ph type="body" idx="1"/>
+          </p:nvPr>
+        </p:nvSpPr>
+        <p:spPr/>
+        <p:txBody>
+          <a:bodyPr/>
+          <a:lstStyle/>
+          <a:p>
+            <a:r>
+              <a:rPr lang="en-US" dirty="0" err="1" smtClean="0"/>
+              <a:t>WebSockets</a:t>
+            </a:r>
+            <a:r>
+              <a:rPr lang="en-US" dirty="0" smtClean="0"/>
+              <a:t> in</a:t>
+            </a:r>
+            <a:r>
+              <a:rPr lang="en-US" baseline="0" dirty="0" smtClean="0"/>
+              <a:t> Play are built on top of Enumerators and </a:t>
+            </a:r>
+            <a:r>
+              <a:rPr lang="en-US" baseline="0" dirty="0" err="1" smtClean="0"/>
+              <a:t>Iteratees</a:t>
+            </a:r>
+            <a:r>
+              <a:rPr lang="en-US" baseline="0" dirty="0" smtClean="0"/>
+              <a:t>. The main thing to keep in mind with </a:t>
+            </a:r>
+            <a:r>
+              <a:rPr lang="en-US" baseline="0" dirty="0" err="1" smtClean="0"/>
+              <a:t>websockets</a:t>
+            </a:r>
+            <a:r>
+              <a:rPr lang="en-US" baseline="0" dirty="0" smtClean="0"/>
+              <a:t> is that we must always return a pair of an </a:t>
+            </a:r>
+            <a:r>
+              <a:rPr lang="en-US" baseline="0" dirty="0" err="1" smtClean="0"/>
+              <a:t>iteratee</a:t>
+            </a:r>
+            <a:r>
+              <a:rPr lang="en-US" baseline="0" dirty="0" smtClean="0"/>
+              <a:t> and an enumerator; if using </a:t>
+            </a:r>
+            <a:r>
+              <a:rPr lang="en-US" baseline="0" dirty="0" err="1" smtClean="0"/>
+              <a:t>WebSocket.async</a:t>
+            </a:r>
+            <a:r>
+              <a:rPr lang="en-US" baseline="0" dirty="0" smtClean="0"/>
+              <a:t> we’ll wrap them in a future and if using </a:t>
+            </a:r>
+            <a:r>
+              <a:rPr lang="en-US" baseline="0" dirty="0" err="1" smtClean="0"/>
+              <a:t>WebSocket.using</a:t>
+            </a:r>
+            <a:r>
+              <a:rPr lang="en-US" baseline="0" dirty="0" smtClean="0"/>
+              <a:t>, we’ll return them unwrapped.</a:t>
+            </a:r>
+          </a:p>
+          <a:p>
+            <a:endParaRPr lang="en-US" baseline="0" dirty="0" smtClean="0"/>
+          </a:p>
+          <a:p>
+            <a:r>
+              <a:rPr lang="en-US" baseline="0" dirty="0" smtClean="0"/>
+              <a:t>This means that when using </a:t>
+            </a:r>
+            <a:r>
+              <a:rPr lang="en-US" baseline="0" dirty="0" err="1" smtClean="0"/>
+              <a:t>websockets</a:t>
+            </a:r>
+            <a:r>
+              <a:rPr lang="en-US" baseline="0" dirty="0" smtClean="0"/>
+              <a:t> we have to be very much explicit about how we expect the </a:t>
+            </a:r>
+            <a:r>
+              <a:rPr lang="en-US" baseline="0" dirty="0" err="1" smtClean="0"/>
+              <a:t>websocket</a:t>
+            </a:r>
+            <a:r>
+              <a:rPr lang="en-US" baseline="0" dirty="0" smtClean="0"/>
+              <a:t> to produce and consume the data; here the “produce” step </a:t>
+            </a:r>
+          </a:p>
+        </p:txBody>
+      </p:sp>
+      <p:sp>
+        <p:nvSpPr>
+          <p:cNvPr id="4" name="Slide Number Placeholder 3"/>
+          <p:cNvSpPr>
+            <a:spLocks noGrp="1"/>
+          </p:cNvSpPr>
+          <p:nvPr>
+            <p:ph type="sldNum" sz="quarter" idx="10"/>
+          </p:nvPr>
+        </p:nvSpPr>
+        <p:spPr/>
+        <p:txBody>
+          <a:bodyPr/>
+          <a:lstStyle/>
+          <a:p>
+            <a:fld id="{0C2B02A6-44A8-594C-8023-D31DDC0C2785}" type="slidenum">
+              <a:rPr lang="en-US" smtClean="0"/>
+              <a:t>32</a:t>
+            </a:fld>
+            <a:endParaRPr lang="en-US"/>
+          </a:p>
+        </p:txBody>
+      </p:sp>
+    </p:spTree>
+    <p:extLst>
+      <p:ext uri="{BB962C8B-B14F-4D97-AF65-F5344CB8AC3E}">
+        <p14:creationId xmlns:p14="http://schemas.microsoft.com/office/powerpoint/2010/main" val="3315201904"/>
+      </p:ext>
+    </p:extLst>
+  </p:cSld>
+  <p:clrMapOvr>
+    <a:masterClrMapping/>
+  </p:clrMapOvr>
+</p:notes>
+</file>
+
+<file path=ppt/notesSlides/notesSlide19.xml><?xml version="1.0" encoding="utf-8"?>
+<p:notes xmlns:a="http://schemas.openxmlformats.org/drawingml/2006/main" xmlns:r="http://schemas.openxmlformats.org/officeDocument/2006/relationships" xmlns:p="http://schemas.openxmlformats.org/presentationml/2006/main">
+  <p:cSld>
+    <p:spTree>
+      <p:nvGrpSpPr>
+        <p:cNvPr id="1" name=""/>
+        <p:cNvGrpSpPr/>
+        <p:nvPr/>
+      </p:nvGrpSpPr>
+      <p:grpSpPr>
+        <a:xfrm>
+          <a:off x="0" y="0"/>
+          <a:ext cx="0" cy="0"/>
+          <a:chOff x="0" y="0"/>
+          <a:chExt cx="0" cy="0"/>
+        </a:xfrm>
+      </p:grpSpPr>
+      <p:sp>
+        <p:nvSpPr>
+          <p:cNvPr id="2" name="Slide Image Placeholder 1"/>
+          <p:cNvSpPr>
+            <a:spLocks noGrp="1" noRot="1" noChangeAspect="1"/>
+          </p:cNvSpPr>
+          <p:nvPr>
+            <p:ph type="sldImg"/>
+          </p:nvPr>
+        </p:nvSpPr>
+        <p:spPr/>
+      </p:sp>
+      <p:sp>
+        <p:nvSpPr>
+          <p:cNvPr id="3" name="Notes Placeholder 2"/>
+          <p:cNvSpPr>
+            <a:spLocks noGrp="1"/>
+          </p:cNvSpPr>
+          <p:nvPr>
+            <p:ph type="body" idx="1"/>
+          </p:nvPr>
+        </p:nvSpPr>
+        <p:spPr/>
+        <p:txBody>
+          <a:bodyPr/>
+          <a:lstStyle/>
+          <a:p>
+            <a:r>
+              <a:rPr lang="en-US" dirty="0" smtClean="0"/>
+              <a:t>Now we’re going</a:t>
+            </a:r>
+            <a:r>
+              <a:rPr lang="en-US" baseline="0" dirty="0" smtClean="0"/>
+              <a:t> to see a brief demo of all the concepts we’ve seen so far:</a:t>
+            </a:r>
+          </a:p>
+          <a:p>
+            <a:endParaRPr lang="en-US" baseline="0" dirty="0" smtClean="0"/>
+          </a:p>
+          <a:p>
+            <a:pPr marL="171450" marR="0" indent="-171450" algn="l" defTabSz="457200" rtl="0" eaLnBrk="1" fontAlgn="auto" latinLnBrk="0" hangingPunct="1">
+              <a:lnSpc>
+                <a:spcPct val="100000"/>
+              </a:lnSpc>
+              <a:spcBef>
+                <a:spcPts val="0"/>
+              </a:spcBef>
+              <a:spcAft>
+                <a:spcPts val="0"/>
+              </a:spcAft>
+              <a:buClrTx/>
+              <a:buSzTx/>
+              <a:buFont typeface="Arial"/>
+              <a:buChar char="•"/>
+              <a:tabLst/>
+              <a:defRPr/>
+            </a:pPr>
+            <a:r>
+              <a:rPr lang="en-US" baseline="0" dirty="0" smtClean="0"/>
+              <a:t>An HTTP publish-subscribe type of API built using an imperative enumerator and an Actor to process events and distribute them to clients. Since one enumerator can only feed one </a:t>
+            </a:r>
+            <a:r>
+              <a:rPr lang="en-US" baseline="0" dirty="0" err="1" smtClean="0"/>
+              <a:t>iteratee</a:t>
+            </a:r>
+            <a:r>
+              <a:rPr lang="en-US" baseline="0" dirty="0" smtClean="0"/>
+              <a:t> (it’s a 1:1 relationship as opposed to 1:n), we need this actor to react to a message event and push it into all the </a:t>
+            </a:r>
+            <a:r>
+              <a:rPr lang="en-US" baseline="0" dirty="0" err="1" smtClean="0"/>
+              <a:t>PushEnumerators</a:t>
+            </a:r>
+            <a:r>
+              <a:rPr lang="en-US" baseline="0" dirty="0" smtClean="0"/>
+              <a:t> that it will keep in an internal list. Not a single blocking code in sight.</a:t>
+            </a:r>
+          </a:p>
+          <a:p>
+            <a:pPr marL="171450" marR="0" indent="-171450" algn="l" defTabSz="457200" rtl="0" eaLnBrk="1" fontAlgn="auto" latinLnBrk="0" hangingPunct="1">
+              <a:lnSpc>
+                <a:spcPct val="100000"/>
+              </a:lnSpc>
+              <a:spcBef>
+                <a:spcPts val="0"/>
+              </a:spcBef>
+              <a:spcAft>
+                <a:spcPts val="0"/>
+              </a:spcAft>
+              <a:buClrTx/>
+              <a:buSzTx/>
+              <a:buFont typeface="Arial"/>
+              <a:buChar char="•"/>
+              <a:tabLst/>
+              <a:defRPr/>
+            </a:pPr>
+            <a:endParaRPr lang="en-US" baseline="0" dirty="0" smtClean="0"/>
+          </a:p>
+          <a:p>
+            <a:pPr marL="171450" marR="0" indent="-171450" algn="l" defTabSz="457200" rtl="0" eaLnBrk="1" fontAlgn="auto" latinLnBrk="0" hangingPunct="1">
+              <a:lnSpc>
+                <a:spcPct val="100000"/>
+              </a:lnSpc>
+              <a:spcBef>
+                <a:spcPts val="0"/>
+              </a:spcBef>
+              <a:spcAft>
+                <a:spcPts val="0"/>
+              </a:spcAft>
+              <a:buClrTx/>
+              <a:buSzTx/>
+              <a:buFont typeface="Arial"/>
+              <a:buChar char="•"/>
+              <a:tabLst/>
+              <a:defRPr/>
+            </a:pPr>
+            <a:r>
+              <a:rPr lang="en-US" baseline="0" dirty="0" smtClean="0"/>
+              <a:t>A model class that returns an Enumerator rather than a list of elements. The biggest advantage here is that for large amounts of data, we are not loading all of them into memory and then returning it to the calling class but instead data is delivered to the client as it is loaded from the database.</a:t>
+            </a:r>
+          </a:p>
+          <a:p>
+            <a:pPr marL="171450" marR="0" indent="-171450" algn="l" defTabSz="457200" rtl="0" eaLnBrk="1" fontAlgn="auto" latinLnBrk="0" hangingPunct="1">
+              <a:lnSpc>
+                <a:spcPct val="100000"/>
+              </a:lnSpc>
+              <a:spcBef>
+                <a:spcPts val="0"/>
+              </a:spcBef>
+              <a:spcAft>
+                <a:spcPts val="0"/>
+              </a:spcAft>
+              <a:buClrTx/>
+              <a:buSzTx/>
+              <a:buFont typeface="Arial"/>
+              <a:buChar char="•"/>
+              <a:tabLst/>
+              <a:defRPr/>
+            </a:pPr>
+            <a:endParaRPr lang="en-US" baseline="0" dirty="0" smtClean="0"/>
+          </a:p>
+          <a:p>
+            <a:pPr marL="171450" marR="0" indent="-171450" algn="l" defTabSz="457200" rtl="0" eaLnBrk="1" fontAlgn="auto" latinLnBrk="0" hangingPunct="1">
+              <a:lnSpc>
+                <a:spcPct val="100000"/>
+              </a:lnSpc>
+              <a:spcBef>
+                <a:spcPts val="0"/>
+              </a:spcBef>
+              <a:spcAft>
+                <a:spcPts val="0"/>
+              </a:spcAft>
+              <a:buClrTx/>
+              <a:buSzTx/>
+              <a:buFont typeface="Arial"/>
+              <a:buChar char="•"/>
+              <a:tabLst/>
+              <a:defRPr/>
+            </a:pPr>
+            <a:r>
+              <a:rPr lang="en-US" baseline="0" dirty="0" err="1" smtClean="0"/>
+              <a:t>WebSockets</a:t>
+            </a:r>
+            <a:r>
+              <a:rPr lang="en-US" baseline="0" dirty="0" smtClean="0"/>
+              <a:t> - TODO</a:t>
+            </a:r>
+          </a:p>
+          <a:p>
+            <a:pPr marL="171450" indent="-171450">
+              <a:buFont typeface="Arial"/>
+              <a:buChar char="•"/>
+            </a:pPr>
+            <a:endParaRPr lang="en-US" dirty="0"/>
+          </a:p>
+        </p:txBody>
+      </p:sp>
+      <p:sp>
+        <p:nvSpPr>
+          <p:cNvPr id="4" name="Slide Number Placeholder 3"/>
+          <p:cNvSpPr>
+            <a:spLocks noGrp="1"/>
+          </p:cNvSpPr>
+          <p:nvPr>
+            <p:ph type="sldNum" sz="quarter" idx="10"/>
+          </p:nvPr>
+        </p:nvSpPr>
+        <p:spPr/>
+        <p:txBody>
+          <a:bodyPr/>
+          <a:lstStyle/>
+          <a:p>
+            <a:fld id="{0C2B02A6-44A8-594C-8023-D31DDC0C2785}" type="slidenum">
+              <a:rPr lang="en-US" smtClean="0"/>
               <a:t>33</a:t>
             </a:fld>
             <a:endParaRPr lang="en-US"/>
@@ -1303,7 +2133,7 @@
     </p:spTree>
     <p:extLst>
       <p:ext uri="{BB962C8B-B14F-4D97-AF65-F5344CB8AC3E}">
-        <p14:creationId xmlns:p14="http://schemas.microsoft.com/office/powerpoint/2010/main" val="1623505800"/>
+        <p14:creationId xmlns:p14="http://schemas.microsoft.com/office/powerpoint/2010/main" val="540011296"/>
       </p:ext>
     </p:extLst>
   </p:cSld>
@@ -1455,6 +2285,638 @@
     <p:extLst>
       <p:ext uri="{BB962C8B-B14F-4D97-AF65-F5344CB8AC3E}">
         <p14:creationId xmlns:p14="http://schemas.microsoft.com/office/powerpoint/2010/main" val="299574873"/>
+      </p:ext>
+    </p:extLst>
+  </p:cSld>
+  <p:clrMapOvr>
+    <a:masterClrMapping/>
+  </p:clrMapOvr>
+</p:notes>
+</file>
+
+<file path=ppt/notesSlides/notesSlide20.xml><?xml version="1.0" encoding="utf-8"?>
+<p:notes xmlns:a="http://schemas.openxmlformats.org/drawingml/2006/main" xmlns:r="http://schemas.openxmlformats.org/officeDocument/2006/relationships" xmlns:p="http://schemas.openxmlformats.org/presentationml/2006/main">
+  <p:cSld>
+    <p:spTree>
+      <p:nvGrpSpPr>
+        <p:cNvPr id="1" name=""/>
+        <p:cNvGrpSpPr/>
+        <p:nvPr/>
+      </p:nvGrpSpPr>
+      <p:grpSpPr>
+        <a:xfrm>
+          <a:off x="0" y="0"/>
+          <a:ext cx="0" cy="0"/>
+          <a:chOff x="0" y="0"/>
+          <a:chExt cx="0" cy="0"/>
+        </a:xfrm>
+      </p:grpSpPr>
+      <p:sp>
+        <p:nvSpPr>
+          <p:cNvPr id="2" name="Slide Image Placeholder 1"/>
+          <p:cNvSpPr>
+            <a:spLocks noGrp="1" noRot="1" noChangeAspect="1"/>
+          </p:cNvSpPr>
+          <p:nvPr>
+            <p:ph type="sldImg"/>
+          </p:nvPr>
+        </p:nvSpPr>
+        <p:spPr/>
+      </p:sp>
+      <p:sp>
+        <p:nvSpPr>
+          <p:cNvPr id="3" name="Notes Placeholder 2"/>
+          <p:cNvSpPr>
+            <a:spLocks noGrp="1"/>
+          </p:cNvSpPr>
+          <p:nvPr>
+            <p:ph type="body" idx="1"/>
+          </p:nvPr>
+        </p:nvSpPr>
+        <p:spPr/>
+        <p:txBody>
+          <a:bodyPr/>
+          <a:lstStyle/>
+          <a:p>
+            <a:r>
+              <a:rPr lang="en-US" dirty="0" smtClean="0"/>
+              <a:t>http://</a:t>
+            </a:r>
+            <a:r>
+              <a:rPr lang="en-US" dirty="0" err="1" smtClean="0"/>
+              <a:t>reactivemongo.org</a:t>
+            </a:r>
+            <a:r>
+              <a:rPr lang="en-US" dirty="0" smtClean="0"/>
+              <a:t>/</a:t>
+            </a:r>
+          </a:p>
+          <a:p>
+            <a:endParaRPr lang="en-US" dirty="0" smtClean="0"/>
+          </a:p>
+          <a:p>
+            <a:r>
+              <a:rPr lang="en-US" dirty="0" err="1" smtClean="0"/>
+              <a:t>ReactiveMongo</a:t>
+            </a:r>
+            <a:r>
+              <a:rPr lang="en-US" baseline="0" dirty="0" smtClean="0"/>
+              <a:t> is a library currently under development that formalizes the usage of Play’s reactive IO for accessing a </a:t>
+            </a:r>
+            <a:r>
+              <a:rPr lang="en-US" baseline="0" dirty="0" err="1" smtClean="0"/>
+              <a:t>MongoDb</a:t>
+            </a:r>
+            <a:r>
+              <a:rPr lang="en-US" baseline="0" dirty="0" smtClean="0"/>
+              <a:t> data storage using the non-blocking patterns that we have just seen such as enumerators and Futures.</a:t>
+            </a:r>
+            <a:endParaRPr lang="en-US" dirty="0"/>
+          </a:p>
+        </p:txBody>
+      </p:sp>
+      <p:sp>
+        <p:nvSpPr>
+          <p:cNvPr id="4" name="Slide Number Placeholder 3"/>
+          <p:cNvSpPr>
+            <a:spLocks noGrp="1"/>
+          </p:cNvSpPr>
+          <p:nvPr>
+            <p:ph type="sldNum" sz="quarter" idx="10"/>
+          </p:nvPr>
+        </p:nvSpPr>
+        <p:spPr/>
+        <p:txBody>
+          <a:bodyPr/>
+          <a:lstStyle/>
+          <a:p>
+            <a:fld id="{0C2B02A6-44A8-594C-8023-D31DDC0C2785}" type="slidenum">
+              <a:rPr lang="en-US" smtClean="0"/>
+              <a:t>34</a:t>
+            </a:fld>
+            <a:endParaRPr lang="en-US"/>
+          </a:p>
+        </p:txBody>
+      </p:sp>
+    </p:spTree>
+    <p:extLst>
+      <p:ext uri="{BB962C8B-B14F-4D97-AF65-F5344CB8AC3E}">
+        <p14:creationId xmlns:p14="http://schemas.microsoft.com/office/powerpoint/2010/main" val="359783357"/>
+      </p:ext>
+    </p:extLst>
+  </p:cSld>
+  <p:clrMapOvr>
+    <a:masterClrMapping/>
+  </p:clrMapOvr>
+</p:notes>
+</file>
+
+<file path=ppt/notesSlides/notesSlide21.xml><?xml version="1.0" encoding="utf-8"?>
+<p:notes xmlns:a="http://schemas.openxmlformats.org/drawingml/2006/main" xmlns:r="http://schemas.openxmlformats.org/officeDocument/2006/relationships" xmlns:p="http://schemas.openxmlformats.org/presentationml/2006/main">
+  <p:cSld>
+    <p:spTree>
+      <p:nvGrpSpPr>
+        <p:cNvPr id="1" name=""/>
+        <p:cNvGrpSpPr/>
+        <p:nvPr/>
+      </p:nvGrpSpPr>
+      <p:grpSpPr>
+        <a:xfrm>
+          <a:off x="0" y="0"/>
+          <a:ext cx="0" cy="0"/>
+          <a:chOff x="0" y="0"/>
+          <a:chExt cx="0" cy="0"/>
+        </a:xfrm>
+      </p:grpSpPr>
+      <p:sp>
+        <p:nvSpPr>
+          <p:cNvPr id="2" name="Slide Image Placeholder 1"/>
+          <p:cNvSpPr>
+            <a:spLocks noGrp="1" noRot="1" noChangeAspect="1"/>
+          </p:cNvSpPr>
+          <p:nvPr>
+            <p:ph type="sldImg"/>
+          </p:nvPr>
+        </p:nvSpPr>
+        <p:spPr/>
+      </p:sp>
+      <p:sp>
+        <p:nvSpPr>
+          <p:cNvPr id="3" name="Notes Placeholder 2"/>
+          <p:cNvSpPr>
+            <a:spLocks noGrp="1"/>
+          </p:cNvSpPr>
+          <p:nvPr>
+            <p:ph type="body" idx="1"/>
+          </p:nvPr>
+        </p:nvSpPr>
+        <p:spPr/>
+        <p:txBody>
+          <a:bodyPr/>
+          <a:lstStyle/>
+          <a:p>
+            <a:r>
+              <a:rPr lang="en-US" dirty="0" smtClean="0"/>
+              <a:t>Can’t work with Play? No </a:t>
+            </a:r>
+            <a:r>
+              <a:rPr lang="en-US" dirty="0" smtClean="0"/>
+              <a:t>problem,</a:t>
+            </a:r>
+            <a:r>
+              <a:rPr lang="en-US" baseline="0" dirty="0" smtClean="0"/>
+              <a:t> other frameworks are catching up and eventually the development of asynchronous applications will be commonplace.</a:t>
+            </a:r>
+          </a:p>
+          <a:p>
+            <a:endParaRPr lang="en-US" baseline="0" dirty="0" smtClean="0"/>
+          </a:p>
+          <a:p>
+            <a:r>
+              <a:rPr lang="en-US" baseline="0" dirty="0" smtClean="0"/>
+              <a:t>One of the biggest enablers of asynchronous applications is the servlet 3.0 spec, which allows applications to mark certain requests as suspended and allow the app server to handle those in the background.</a:t>
+            </a:r>
+          </a:p>
+          <a:p>
+            <a:endParaRPr lang="en-US" baseline="0" dirty="0" smtClean="0"/>
+          </a:p>
+          <a:p>
+            <a:r>
+              <a:rPr lang="en-US" baseline="0" dirty="0" smtClean="0"/>
+              <a:t>The example above is based on Grails 2.0 </a:t>
+            </a:r>
+            <a:r>
+              <a:rPr lang="en-US" baseline="0" dirty="0" smtClean="0"/>
+              <a:t>+ a Servlet 3.0 server (such as Tomcat 7.0), just to see how it works. As you may have already noticed, it shows a bit too much of the low-level interface by forcing controller classes to handle asynchronous contexts… In my opinion Play’s API is more elegant but Groovy lends itself very nicely to internal DSLs so it’s likely that the Grails guys will work on some higher-level abstractions to make development easier.</a:t>
+            </a:r>
+          </a:p>
+          <a:p>
+            <a:endParaRPr lang="en-US" baseline="0" dirty="0" smtClean="0"/>
+          </a:p>
+          <a:p>
+            <a:r>
+              <a:rPr lang="en-US" baseline="0" dirty="0" smtClean="0"/>
+              <a:t>Note: the example is taken from the Grails 2.0 release notes.</a:t>
+            </a:r>
+            <a:endParaRPr lang="en-US" dirty="0"/>
+          </a:p>
+        </p:txBody>
+      </p:sp>
+      <p:sp>
+        <p:nvSpPr>
+          <p:cNvPr id="4" name="Slide Number Placeholder 3"/>
+          <p:cNvSpPr>
+            <a:spLocks noGrp="1"/>
+          </p:cNvSpPr>
+          <p:nvPr>
+            <p:ph type="sldNum" sz="quarter" idx="10"/>
+          </p:nvPr>
+        </p:nvSpPr>
+        <p:spPr/>
+        <p:txBody>
+          <a:bodyPr/>
+          <a:lstStyle/>
+          <a:p>
+            <a:fld id="{0C2B02A6-44A8-594C-8023-D31DDC0C2785}" type="slidenum">
+              <a:rPr lang="en-US" smtClean="0"/>
+              <a:t>35</a:t>
+            </a:fld>
+            <a:endParaRPr lang="en-US"/>
+          </a:p>
+        </p:txBody>
+      </p:sp>
+    </p:spTree>
+    <p:extLst>
+      <p:ext uri="{BB962C8B-B14F-4D97-AF65-F5344CB8AC3E}">
+        <p14:creationId xmlns:p14="http://schemas.microsoft.com/office/powerpoint/2010/main" val="2140312193"/>
+      </p:ext>
+    </p:extLst>
+  </p:cSld>
+  <p:clrMapOvr>
+    <a:masterClrMapping/>
+  </p:clrMapOvr>
+</p:notes>
+</file>
+
+<file path=ppt/notesSlides/notesSlide22.xml><?xml version="1.0" encoding="utf-8"?>
+<p:notes xmlns:a="http://schemas.openxmlformats.org/drawingml/2006/main" xmlns:r="http://schemas.openxmlformats.org/officeDocument/2006/relationships" xmlns:p="http://schemas.openxmlformats.org/presentationml/2006/main">
+  <p:cSld>
+    <p:spTree>
+      <p:nvGrpSpPr>
+        <p:cNvPr id="1" name=""/>
+        <p:cNvGrpSpPr/>
+        <p:nvPr/>
+      </p:nvGrpSpPr>
+      <p:grpSpPr>
+        <a:xfrm>
+          <a:off x="0" y="0"/>
+          <a:ext cx="0" cy="0"/>
+          <a:chOff x="0" y="0"/>
+          <a:chExt cx="0" cy="0"/>
+        </a:xfrm>
+      </p:grpSpPr>
+      <p:sp>
+        <p:nvSpPr>
+          <p:cNvPr id="2" name="Slide Image Placeholder 1"/>
+          <p:cNvSpPr>
+            <a:spLocks noGrp="1" noRot="1" noChangeAspect="1"/>
+          </p:cNvSpPr>
+          <p:nvPr>
+            <p:ph type="sldImg"/>
+          </p:nvPr>
+        </p:nvSpPr>
+        <p:spPr/>
+      </p:sp>
+      <p:sp>
+        <p:nvSpPr>
+          <p:cNvPr id="3" name="Notes Placeholder 2"/>
+          <p:cNvSpPr>
+            <a:spLocks noGrp="1"/>
+          </p:cNvSpPr>
+          <p:nvPr>
+            <p:ph type="body" idx="1"/>
+          </p:nvPr>
+        </p:nvSpPr>
+        <p:spPr/>
+        <p:txBody>
+          <a:bodyPr/>
+          <a:lstStyle/>
+          <a:p>
+            <a:r>
+              <a:rPr lang="en-US" dirty="0" err="1" smtClean="0"/>
+              <a:t>Vert.x</a:t>
+            </a:r>
+            <a:r>
+              <a:rPr lang="en-US" dirty="0" smtClean="0"/>
+              <a:t> defines</a:t>
+            </a:r>
+            <a:r>
+              <a:rPr lang="en-US" baseline="0" dirty="0" smtClean="0"/>
+              <a:t> itself as “Effortless asynchronous application development for the modern web and enterprise”. It’s not a coincidence that in their efforts to implement a high-performance asynchronous web framework, the </a:t>
+            </a:r>
+            <a:r>
+              <a:rPr lang="en-US" baseline="0" dirty="0" err="1" smtClean="0"/>
+              <a:t>Vert.x</a:t>
+            </a:r>
+            <a:r>
+              <a:rPr lang="en-US" baseline="0" dirty="0" smtClean="0"/>
+              <a:t> development team also kept away from JEE </a:t>
+            </a:r>
+            <a:r>
+              <a:rPr lang="en-US" baseline="0" dirty="0" smtClean="0">
+                <a:sym typeface="Wingdings"/>
+              </a:rPr>
+              <a:t></a:t>
+            </a:r>
+          </a:p>
+          <a:p>
+            <a:endParaRPr lang="en-US" baseline="0" dirty="0" smtClean="0">
+              <a:sym typeface="Wingdings"/>
+            </a:endParaRPr>
+          </a:p>
+          <a:p>
+            <a:r>
+              <a:rPr lang="en-US" baseline="0" dirty="0" smtClean="0">
+                <a:sym typeface="Wingdings"/>
+              </a:rPr>
+              <a:t>However as opposed to Play, </a:t>
+            </a:r>
+            <a:r>
+              <a:rPr lang="en-US" baseline="0" dirty="0" err="1" smtClean="0">
+                <a:sym typeface="Wingdings"/>
+              </a:rPr>
+              <a:t>Vert.x’s</a:t>
+            </a:r>
+            <a:r>
+              <a:rPr lang="en-US" baseline="0" dirty="0" smtClean="0">
+                <a:sym typeface="Wingdings"/>
+              </a:rPr>
+              <a:t> architecture is based on the callback-style mechanism. While I have no direct experience developing large-scale applications or applications with complex logic on </a:t>
+            </a:r>
+            <a:r>
+              <a:rPr lang="en-US" baseline="0" dirty="0" err="1" smtClean="0">
+                <a:sym typeface="Wingdings"/>
+              </a:rPr>
+              <a:t>Vert.x</a:t>
+            </a:r>
+            <a:r>
+              <a:rPr lang="en-US" baseline="0" dirty="0" smtClean="0">
+                <a:sym typeface="Wingdings"/>
+              </a:rPr>
+              <a:t>, it remains to be seen how efficient this approach is in those cases.</a:t>
+            </a:r>
+            <a:endParaRPr lang="en-US" dirty="0"/>
+          </a:p>
+        </p:txBody>
+      </p:sp>
+      <p:sp>
+        <p:nvSpPr>
+          <p:cNvPr id="4" name="Slide Number Placeholder 3"/>
+          <p:cNvSpPr>
+            <a:spLocks noGrp="1"/>
+          </p:cNvSpPr>
+          <p:nvPr>
+            <p:ph type="sldNum" sz="quarter" idx="10"/>
+          </p:nvPr>
+        </p:nvSpPr>
+        <p:spPr/>
+        <p:txBody>
+          <a:bodyPr/>
+          <a:lstStyle/>
+          <a:p>
+            <a:fld id="{0C2B02A6-44A8-594C-8023-D31DDC0C2785}" type="slidenum">
+              <a:rPr lang="en-US" smtClean="0"/>
+              <a:t>36</a:t>
+            </a:fld>
+            <a:endParaRPr lang="en-US"/>
+          </a:p>
+        </p:txBody>
+      </p:sp>
+    </p:spTree>
+    <p:extLst>
+      <p:ext uri="{BB962C8B-B14F-4D97-AF65-F5344CB8AC3E}">
+        <p14:creationId xmlns:p14="http://schemas.microsoft.com/office/powerpoint/2010/main" val="2140312193"/>
+      </p:ext>
+    </p:extLst>
+  </p:cSld>
+  <p:clrMapOvr>
+    <a:masterClrMapping/>
+  </p:clrMapOvr>
+</p:notes>
+</file>
+
+<file path=ppt/notesSlides/notesSlide23.xml><?xml version="1.0" encoding="utf-8"?>
+<p:notes xmlns:a="http://schemas.openxmlformats.org/drawingml/2006/main" xmlns:r="http://schemas.openxmlformats.org/officeDocument/2006/relationships" xmlns:p="http://schemas.openxmlformats.org/presentationml/2006/main">
+  <p:cSld>
+    <p:spTree>
+      <p:nvGrpSpPr>
+        <p:cNvPr id="1" name=""/>
+        <p:cNvGrpSpPr/>
+        <p:nvPr/>
+      </p:nvGrpSpPr>
+      <p:grpSpPr>
+        <a:xfrm>
+          <a:off x="0" y="0"/>
+          <a:ext cx="0" cy="0"/>
+          <a:chOff x="0" y="0"/>
+          <a:chExt cx="0" cy="0"/>
+        </a:xfrm>
+      </p:grpSpPr>
+      <p:sp>
+        <p:nvSpPr>
+          <p:cNvPr id="2" name="Slide Image Placeholder 1"/>
+          <p:cNvSpPr>
+            <a:spLocks noGrp="1" noRot="1" noChangeAspect="1"/>
+          </p:cNvSpPr>
+          <p:nvPr>
+            <p:ph type="sldImg"/>
+          </p:nvPr>
+        </p:nvSpPr>
+        <p:spPr/>
+      </p:sp>
+      <p:sp>
+        <p:nvSpPr>
+          <p:cNvPr id="3" name="Notes Placeholder 2"/>
+          <p:cNvSpPr>
+            <a:spLocks noGrp="1"/>
+          </p:cNvSpPr>
+          <p:nvPr>
+            <p:ph type="body" idx="1"/>
+          </p:nvPr>
+        </p:nvSpPr>
+        <p:spPr/>
+        <p:txBody>
+          <a:bodyPr/>
+          <a:lstStyle/>
+          <a:p>
+            <a:r>
+              <a:rPr lang="en-US" dirty="0" smtClean="0"/>
+              <a:t>The link above contains all the example code showed today as well as other stuff that we did not have time to cover.</a:t>
+            </a:r>
+            <a:endParaRPr lang="en-US" dirty="0"/>
+          </a:p>
+        </p:txBody>
+      </p:sp>
+      <p:sp>
+        <p:nvSpPr>
+          <p:cNvPr id="4" name="Slide Number Placeholder 3"/>
+          <p:cNvSpPr>
+            <a:spLocks noGrp="1"/>
+          </p:cNvSpPr>
+          <p:nvPr>
+            <p:ph type="sldNum" sz="quarter" idx="10"/>
+          </p:nvPr>
+        </p:nvSpPr>
+        <p:spPr/>
+        <p:txBody>
+          <a:bodyPr/>
+          <a:lstStyle/>
+          <a:p>
+            <a:fld id="{0C2B02A6-44A8-594C-8023-D31DDC0C2785}" type="slidenum">
+              <a:rPr lang="en-US" smtClean="0"/>
+              <a:t>37</a:t>
+            </a:fld>
+            <a:endParaRPr lang="en-US"/>
+          </a:p>
+        </p:txBody>
+      </p:sp>
+    </p:spTree>
+    <p:extLst>
+      <p:ext uri="{BB962C8B-B14F-4D97-AF65-F5344CB8AC3E}">
+        <p14:creationId xmlns:p14="http://schemas.microsoft.com/office/powerpoint/2010/main" val="3305300233"/>
+      </p:ext>
+    </p:extLst>
+  </p:cSld>
+  <p:clrMapOvr>
+    <a:masterClrMapping/>
+  </p:clrMapOvr>
+</p:notes>
+</file>
+
+<file path=ppt/notesSlides/notesSlide24.xml><?xml version="1.0" encoding="utf-8"?>
+<p:notes xmlns:a="http://schemas.openxmlformats.org/drawingml/2006/main" xmlns:r="http://schemas.openxmlformats.org/officeDocument/2006/relationships" xmlns:p="http://schemas.openxmlformats.org/presentationml/2006/main">
+  <p:cSld>
+    <p:spTree>
+      <p:nvGrpSpPr>
+        <p:cNvPr id="1" name=""/>
+        <p:cNvGrpSpPr/>
+        <p:nvPr/>
+      </p:nvGrpSpPr>
+      <p:grpSpPr>
+        <a:xfrm>
+          <a:off x="0" y="0"/>
+          <a:ext cx="0" cy="0"/>
+          <a:chOff x="0" y="0"/>
+          <a:chExt cx="0" cy="0"/>
+        </a:xfrm>
+      </p:grpSpPr>
+      <p:sp>
+        <p:nvSpPr>
+          <p:cNvPr id="2" name="Slide Image Placeholder 1"/>
+          <p:cNvSpPr>
+            <a:spLocks noGrp="1" noRot="1" noChangeAspect="1"/>
+          </p:cNvSpPr>
+          <p:nvPr>
+            <p:ph type="sldImg"/>
+          </p:nvPr>
+        </p:nvSpPr>
+        <p:spPr/>
+      </p:sp>
+      <p:sp>
+        <p:nvSpPr>
+          <p:cNvPr id="3" name="Notes Placeholder 2"/>
+          <p:cNvSpPr>
+            <a:spLocks noGrp="1"/>
+          </p:cNvSpPr>
+          <p:nvPr>
+            <p:ph type="body" idx="1"/>
+          </p:nvPr>
+        </p:nvSpPr>
+        <p:spPr/>
+        <p:txBody>
+          <a:bodyPr/>
+          <a:lstStyle/>
+          <a:p>
+            <a:r>
+              <a:rPr lang="en-US" dirty="0" smtClean="0"/>
+              <a:t>Shameless plug</a:t>
+            </a:r>
+            <a:r>
+              <a:rPr lang="en-US" baseline="0" dirty="0" smtClean="0"/>
+              <a:t> </a:t>
+            </a:r>
+            <a:r>
+              <a:rPr lang="en-US" baseline="0" dirty="0" smtClean="0">
+                <a:sym typeface="Wingdings"/>
+              </a:rPr>
+              <a:t></a:t>
+            </a:r>
+          </a:p>
+          <a:p>
+            <a:endParaRPr lang="en-US" baseline="0" dirty="0" smtClean="0">
+              <a:sym typeface="Wingdings"/>
+            </a:endParaRPr>
+          </a:p>
+          <a:p>
+            <a:r>
+              <a:rPr lang="en-US" baseline="0" dirty="0" smtClean="0">
+                <a:sym typeface="Wingdings"/>
+              </a:rPr>
+              <a:t>At Accenture we have also been training ourselves with Play 2.0 (both Java and </a:t>
+            </a:r>
+            <a:r>
+              <a:rPr lang="en-US" baseline="0" dirty="0" err="1" smtClean="0">
+                <a:sym typeface="Wingdings"/>
+              </a:rPr>
+              <a:t>Scala</a:t>
+            </a:r>
+            <a:r>
+              <a:rPr lang="en-US" baseline="0" dirty="0" smtClean="0">
+                <a:sym typeface="Wingdings"/>
+              </a:rPr>
+              <a:t>) and we are currently delivering an interesting project on </a:t>
+            </a:r>
+            <a:r>
+              <a:rPr lang="en-US" baseline="0" dirty="0" smtClean="0">
+                <a:sym typeface="Wingdings"/>
+              </a:rPr>
+              <a:t>Play Java and preparing to deliver an even more interesting one with Play </a:t>
+            </a:r>
+            <a:r>
+              <a:rPr lang="en-US" baseline="0" dirty="0" err="1" smtClean="0">
+                <a:sym typeface="Wingdings"/>
+              </a:rPr>
+              <a:t>Scala</a:t>
+            </a:r>
+            <a:r>
+              <a:rPr lang="en-US" baseline="0" dirty="0" smtClean="0">
+                <a:sym typeface="Wingdings"/>
+              </a:rPr>
+              <a:t> to implement a highly-scalable API so we are ready to help you and clients in general with these innovative technologies and frameworks (even if innovation and say, </a:t>
+            </a:r>
+            <a:r>
+              <a:rPr lang="en-US" baseline="0" dirty="0" err="1" smtClean="0">
+                <a:sym typeface="Wingdings"/>
+              </a:rPr>
+              <a:t>Scala</a:t>
+            </a:r>
+            <a:r>
+              <a:rPr lang="en-US" baseline="0" dirty="0" smtClean="0">
+                <a:sym typeface="Wingdings"/>
+              </a:rPr>
+              <a:t>, are not the first things that come to your minds when you think of Accenture)</a:t>
+            </a:r>
+            <a:endParaRPr lang="en-US" dirty="0"/>
+          </a:p>
+        </p:txBody>
+      </p:sp>
+      <p:sp>
+        <p:nvSpPr>
+          <p:cNvPr id="4" name="Slide Number Placeholder 3"/>
+          <p:cNvSpPr>
+            <a:spLocks noGrp="1"/>
+          </p:cNvSpPr>
+          <p:nvPr>
+            <p:ph type="sldNum" sz="quarter" idx="10"/>
+          </p:nvPr>
+        </p:nvSpPr>
+        <p:spPr/>
+        <p:txBody>
+          <a:bodyPr/>
+          <a:lstStyle/>
+          <a:p>
+            <a:fld id="{0C2B02A6-44A8-594C-8023-D31DDC0C2785}" type="slidenum">
+              <a:rPr lang="en-US" smtClean="0"/>
+              <a:t>38</a:t>
+            </a:fld>
+            <a:endParaRPr lang="en-US"/>
+          </a:p>
+        </p:txBody>
+      </p:sp>
+    </p:spTree>
+    <p:extLst>
+      <p:ext uri="{BB962C8B-B14F-4D97-AF65-F5344CB8AC3E}">
+        <p14:creationId xmlns:p14="http://schemas.microsoft.com/office/powerpoint/2010/main" val="1623505800"/>
       </p:ext>
     </p:extLst>
   </p:cSld>
@@ -9861,7 +11323,7 @@
         </p:nvSpPr>
         <p:spPr/>
         <p:txBody>
-          <a:bodyPr>
+          <a:bodyPr anchor="ctr">
             <a:normAutofit/>
           </a:bodyPr>
           <a:lstStyle/>
@@ -10035,6 +11497,39 @@
           </a:p>
         </p:txBody>
       </p:sp>
+      <p:cxnSp>
+        <p:nvCxnSpPr>
+          <p:cNvPr id="4" name="Straight Arrow Connector 3"/>
+          <p:cNvCxnSpPr/>
+          <p:nvPr/>
+        </p:nvCxnSpPr>
+        <p:spPr>
+          <a:xfrm>
+            <a:off x="4391980" y="2204864"/>
+            <a:ext cx="0" cy="720080"/>
+          </a:xfrm>
+          <a:prstGeom prst="straightConnector1">
+            <a:avLst/>
+          </a:prstGeom>
+          <a:ln>
+            <a:tailEnd type="arrow"/>
+          </a:ln>
+        </p:spPr>
+        <p:style>
+          <a:lnRef idx="2">
+            <a:schemeClr val="accent1"/>
+          </a:lnRef>
+          <a:fillRef idx="0">
+            <a:schemeClr val="accent1"/>
+          </a:fillRef>
+          <a:effectRef idx="1">
+            <a:schemeClr val="accent1"/>
+          </a:effectRef>
+          <a:fontRef idx="minor">
+            <a:schemeClr val="tx1"/>
+          </a:fontRef>
+        </p:style>
+      </p:cxnSp>
     </p:spTree>
     <p:extLst>
       <p:ext uri="{BB962C8B-B14F-4D97-AF65-F5344CB8AC3E}">
@@ -10097,84 +11592,344 @@
       </p:sp>
       <p:sp>
         <p:nvSpPr>
-          <p:cNvPr id="3" name="Content Placeholder 2"/>
-          <p:cNvSpPr>
-            <a:spLocks noGrp="1"/>
-          </p:cNvSpPr>
-          <p:nvPr>
-            <p:ph idx="1"/>
-          </p:nvPr>
-        </p:nvSpPr>
-        <p:spPr/>
+          <p:cNvPr id="5" name="Rectangle 4"/>
+          <p:cNvSpPr/>
+          <p:nvPr/>
+        </p:nvSpPr>
+        <p:spPr>
+          <a:xfrm>
+            <a:off x="3203848" y="1484784"/>
+            <a:ext cx="2376264" cy="720080"/>
+          </a:xfrm>
+          <a:prstGeom prst="rect">
+            <a:avLst/>
+          </a:prstGeom>
+        </p:spPr>
+        <p:style>
+          <a:lnRef idx="1">
+            <a:schemeClr val="dk1"/>
+          </a:lnRef>
+          <a:fillRef idx="3">
+            <a:schemeClr val="dk1"/>
+          </a:fillRef>
+          <a:effectRef idx="2">
+            <a:schemeClr val="dk1"/>
+          </a:effectRef>
+          <a:fontRef idx="minor">
+            <a:schemeClr val="lt1"/>
+          </a:fontRef>
+        </p:style>
         <p:txBody>
-          <a:bodyPr/>
+          <a:bodyPr rtlCol="0" anchor="ctr"/>
           <a:lstStyle/>
           <a:p>
-            <a:pPr marL="0" indent="0">
-              <a:buNone/>
-            </a:pPr>
-            <a:endParaRPr lang="en-US" dirty="0" smtClean="0"/>
-          </a:p>
-          <a:p>
-            <a:pPr marL="0" indent="0">
-              <a:buNone/>
-            </a:pPr>
-            <a:endParaRPr lang="en-US" dirty="0"/>
-          </a:p>
-          <a:p>
-            <a:pPr marL="0" indent="0">
-              <a:buNone/>
-            </a:pPr>
-            <a:r>
-              <a:rPr lang="en-US" dirty="0" smtClean="0"/>
-              <a:t>Enumerator </a:t>
-            </a:r>
-            <a:r>
-              <a:rPr lang="en-US" dirty="0" smtClean="0">
-                <a:sym typeface="Wingdings"/>
-              </a:rPr>
-              <a:t> </a:t>
-            </a:r>
-            <a:r>
-              <a:rPr lang="en-US" dirty="0" err="1" smtClean="0">
-                <a:sym typeface="Wingdings"/>
+            <a:pPr algn="ctr"/>
+            <a:r>
+              <a:rPr lang="en-US" sz="2800" dirty="0" smtClean="0">
+                <a:solidFill>
+                  <a:schemeClr val="bg1">
+                    <a:lumMod val="75000"/>
+                  </a:schemeClr>
+                </a:solidFill>
+                <a:latin typeface="Calluna Sans"/>
+                <a:cs typeface="Calluna Sans"/>
+              </a:rPr>
+              <a:t>Enumerator</a:t>
+            </a:r>
+            <a:endParaRPr lang="en-US" sz="2800" dirty="0">
+              <a:solidFill>
+                <a:schemeClr val="bg1">
+                  <a:lumMod val="75000"/>
+                </a:schemeClr>
+              </a:solidFill>
+              <a:latin typeface="Calluna Sans"/>
+              <a:cs typeface="Calluna Sans"/>
+            </a:endParaRPr>
+          </a:p>
+        </p:txBody>
+      </p:sp>
+      <p:sp>
+        <p:nvSpPr>
+          <p:cNvPr id="6" name="Rectangle 5"/>
+          <p:cNvSpPr/>
+          <p:nvPr/>
+        </p:nvSpPr>
+        <p:spPr>
+          <a:xfrm>
+            <a:off x="3203848" y="2852936"/>
+            <a:ext cx="2376264" cy="720080"/>
+          </a:xfrm>
+          <a:prstGeom prst="rect">
+            <a:avLst/>
+          </a:prstGeom>
+        </p:spPr>
+        <p:style>
+          <a:lnRef idx="1">
+            <a:schemeClr val="dk1"/>
+          </a:lnRef>
+          <a:fillRef idx="3">
+            <a:schemeClr val="dk1"/>
+          </a:fillRef>
+          <a:effectRef idx="2">
+            <a:schemeClr val="dk1"/>
+          </a:effectRef>
+          <a:fontRef idx="minor">
+            <a:schemeClr val="lt1"/>
+          </a:fontRef>
+        </p:style>
+        <p:txBody>
+          <a:bodyPr rtlCol="0" anchor="ctr"/>
+          <a:lstStyle/>
+          <a:p>
+            <a:pPr algn="ctr"/>
+            <a:r>
+              <a:rPr lang="en-US" sz="2800" dirty="0" err="1" smtClean="0">
+                <a:solidFill>
+                  <a:schemeClr val="bg1">
+                    <a:lumMod val="75000"/>
+                  </a:schemeClr>
+                </a:solidFill>
+                <a:latin typeface="Calluna Sans"/>
+                <a:cs typeface="Calluna Sans"/>
               </a:rPr>
               <a:t>Enumeratee</a:t>
             </a:r>
-            <a:r>
-              <a:rPr lang="en-US" dirty="0" smtClean="0">
-                <a:sym typeface="Wingdings"/>
-              </a:rPr>
-              <a:t>  </a:t>
-            </a:r>
-            <a:r>
-              <a:rPr lang="en-US" dirty="0" err="1" smtClean="0">
-                <a:sym typeface="Wingdings"/>
+            <a:endParaRPr lang="en-US" sz="2800" dirty="0">
+              <a:solidFill>
+                <a:schemeClr val="bg1">
+                  <a:lumMod val="75000"/>
+                </a:schemeClr>
+              </a:solidFill>
+              <a:latin typeface="Calluna Sans"/>
+              <a:cs typeface="Calluna Sans"/>
+            </a:endParaRPr>
+          </a:p>
+        </p:txBody>
+      </p:sp>
+      <p:sp>
+        <p:nvSpPr>
+          <p:cNvPr id="7" name="Rectangle 6"/>
+          <p:cNvSpPr/>
+          <p:nvPr/>
+        </p:nvSpPr>
+        <p:spPr>
+          <a:xfrm>
+            <a:off x="3203848" y="4221088"/>
+            <a:ext cx="2376264" cy="720080"/>
+          </a:xfrm>
+          <a:prstGeom prst="rect">
+            <a:avLst/>
+          </a:prstGeom>
+        </p:spPr>
+        <p:style>
+          <a:lnRef idx="1">
+            <a:schemeClr val="dk1"/>
+          </a:lnRef>
+          <a:fillRef idx="3">
+            <a:schemeClr val="dk1"/>
+          </a:fillRef>
+          <a:effectRef idx="2">
+            <a:schemeClr val="dk1"/>
+          </a:effectRef>
+          <a:fontRef idx="minor">
+            <a:schemeClr val="lt1"/>
+          </a:fontRef>
+        </p:style>
+        <p:txBody>
+          <a:bodyPr rtlCol="0" anchor="ctr"/>
+          <a:lstStyle/>
+          <a:p>
+            <a:pPr algn="ctr"/>
+            <a:r>
+              <a:rPr lang="en-US" sz="2800" dirty="0" err="1" smtClean="0">
+                <a:solidFill>
+                  <a:schemeClr val="bg1">
+                    <a:lumMod val="75000"/>
+                  </a:schemeClr>
+                </a:solidFill>
+                <a:latin typeface="Calluna Sans"/>
+                <a:cs typeface="Calluna Sans"/>
               </a:rPr>
               <a:t>Enumeratee</a:t>
             </a:r>
-            <a:r>
-              <a:rPr lang="en-US" dirty="0" smtClean="0">
-                <a:sym typeface="Wingdings"/>
-              </a:rPr>
-              <a:t>  </a:t>
-            </a:r>
-            <a:r>
-              <a:rPr lang="en-US" dirty="0" err="1" smtClean="0">
-                <a:sym typeface="Wingdings"/>
+            <a:endParaRPr lang="en-US" sz="2800" dirty="0">
+              <a:solidFill>
+                <a:schemeClr val="bg1">
+                  <a:lumMod val="75000"/>
+                </a:schemeClr>
+              </a:solidFill>
+              <a:latin typeface="Calluna Sans"/>
+              <a:cs typeface="Calluna Sans"/>
+            </a:endParaRPr>
+          </a:p>
+        </p:txBody>
+      </p:sp>
+      <p:sp>
+        <p:nvSpPr>
+          <p:cNvPr id="8" name="Rectangle 7"/>
+          <p:cNvSpPr/>
+          <p:nvPr/>
+        </p:nvSpPr>
+        <p:spPr>
+          <a:xfrm>
+            <a:off x="3203848" y="5661248"/>
+            <a:ext cx="2376264" cy="720080"/>
+          </a:xfrm>
+          <a:prstGeom prst="rect">
+            <a:avLst/>
+          </a:prstGeom>
+        </p:spPr>
+        <p:style>
+          <a:lnRef idx="1">
+            <a:schemeClr val="dk1"/>
+          </a:lnRef>
+          <a:fillRef idx="3">
+            <a:schemeClr val="dk1"/>
+          </a:fillRef>
+          <a:effectRef idx="2">
+            <a:schemeClr val="dk1"/>
+          </a:effectRef>
+          <a:fontRef idx="minor">
+            <a:schemeClr val="lt1"/>
+          </a:fontRef>
+        </p:style>
+        <p:txBody>
+          <a:bodyPr rtlCol="0" anchor="ctr"/>
+          <a:lstStyle/>
+          <a:p>
+            <a:pPr algn="ctr"/>
+            <a:r>
+              <a:rPr lang="en-US" sz="2800" dirty="0" err="1" smtClean="0">
+                <a:solidFill>
+                  <a:schemeClr val="bg1">
+                    <a:lumMod val="75000"/>
+                  </a:schemeClr>
+                </a:solidFill>
+                <a:latin typeface="Calluna Sans"/>
+                <a:cs typeface="Calluna Sans"/>
               </a:rPr>
               <a:t>Iteratee</a:t>
             </a:r>
-            <a:r>
-              <a:rPr lang="en-US" dirty="0" smtClean="0">
-                <a:sym typeface="Wingdings"/>
-              </a:rPr>
-              <a:t>  Client</a:t>
-            </a:r>
-            <a:endParaRPr lang="en-US" dirty="0"/>
+            <a:endParaRPr lang="en-US" sz="2800" dirty="0">
+              <a:solidFill>
+                <a:schemeClr val="bg1">
+                  <a:lumMod val="75000"/>
+                </a:schemeClr>
+              </a:solidFill>
+              <a:latin typeface="Calluna Sans"/>
+              <a:cs typeface="Calluna Sans"/>
+            </a:endParaRPr>
           </a:p>
         </p:txBody>
       </p:sp>
+      <p:cxnSp>
+        <p:nvCxnSpPr>
+          <p:cNvPr id="11" name="Straight Arrow Connector 10"/>
+          <p:cNvCxnSpPr>
+            <a:stCxn id="5" idx="2"/>
+            <a:endCxn id="6" idx="0"/>
+          </p:cNvCxnSpPr>
+          <p:nvPr/>
+        </p:nvCxnSpPr>
+        <p:spPr>
+          <a:xfrm>
+            <a:off x="4391980" y="2204864"/>
+            <a:ext cx="0" cy="648072"/>
+          </a:xfrm>
+          <a:prstGeom prst="straightConnector1">
+            <a:avLst/>
+          </a:prstGeom>
+          <a:ln>
+            <a:tailEnd type="arrow"/>
+          </a:ln>
+        </p:spPr>
+        <p:style>
+          <a:lnRef idx="2">
+            <a:schemeClr val="accent1"/>
+          </a:lnRef>
+          <a:fillRef idx="0">
+            <a:schemeClr val="accent1"/>
+          </a:fillRef>
+          <a:effectRef idx="1">
+            <a:schemeClr val="accent1"/>
+          </a:effectRef>
+          <a:fontRef idx="minor">
+            <a:schemeClr val="tx1"/>
+          </a:fontRef>
+        </p:style>
+      </p:cxnSp>
+      <p:cxnSp>
+        <p:nvCxnSpPr>
+          <p:cNvPr id="13" name="Straight Arrow Connector 12"/>
+          <p:cNvCxnSpPr>
+            <a:stCxn id="6" idx="2"/>
+            <a:endCxn id="7" idx="0"/>
+          </p:cNvCxnSpPr>
+          <p:nvPr/>
+        </p:nvCxnSpPr>
+        <p:spPr>
+          <a:xfrm>
+            <a:off x="4391980" y="3573016"/>
+            <a:ext cx="0" cy="648072"/>
+          </a:xfrm>
+          <a:prstGeom prst="straightConnector1">
+            <a:avLst/>
+          </a:prstGeom>
+          <a:ln>
+            <a:tailEnd type="arrow"/>
+          </a:ln>
+        </p:spPr>
+        <p:style>
+          <a:lnRef idx="2">
+            <a:schemeClr val="accent1"/>
+          </a:lnRef>
+          <a:fillRef idx="0">
+            <a:schemeClr val="accent1"/>
+          </a:fillRef>
+          <a:effectRef idx="1">
+            <a:schemeClr val="accent1"/>
+          </a:effectRef>
+          <a:fontRef idx="minor">
+            <a:schemeClr val="tx1"/>
+          </a:fontRef>
+        </p:style>
+      </p:cxnSp>
+      <p:cxnSp>
+        <p:nvCxnSpPr>
+          <p:cNvPr id="16" name="Straight Arrow Connector 15"/>
+          <p:cNvCxnSpPr>
+            <a:stCxn id="7" idx="2"/>
+            <a:endCxn id="8" idx="0"/>
+          </p:cNvCxnSpPr>
+          <p:nvPr/>
+        </p:nvCxnSpPr>
+        <p:spPr>
+          <a:xfrm>
+            <a:off x="4391980" y="4941168"/>
+            <a:ext cx="0" cy="720080"/>
+          </a:xfrm>
+          <a:prstGeom prst="straightConnector1">
+            <a:avLst/>
+          </a:prstGeom>
+          <a:ln>
+            <a:tailEnd type="arrow"/>
+          </a:ln>
+        </p:spPr>
+        <p:style>
+          <a:lnRef idx="2">
+            <a:schemeClr val="accent1"/>
+          </a:lnRef>
+          <a:fillRef idx="0">
+            <a:schemeClr val="accent1"/>
+          </a:fillRef>
+          <a:effectRef idx="1">
+            <a:schemeClr val="accent1"/>
+          </a:effectRef>
+          <a:fontRef idx="minor">
+            <a:schemeClr val="tx1"/>
+          </a:fontRef>
+        </p:style>
+      </p:cxnSp>
     </p:spTree>
     <p:extLst>
       <p:ext uri="{BB962C8B-B14F-4D97-AF65-F5344CB8AC3E}">
@@ -10196,6 +11951,143 @@
 </file>
 
 <file path=ppt/slides/slide25.xml><?xml version="1.0" encoding="utf-8"?>
+<p:sld xmlns:a="http://schemas.openxmlformats.org/drawingml/2006/main" xmlns:r="http://schemas.openxmlformats.org/officeDocument/2006/relationships" xmlns:p="http://schemas.openxmlformats.org/presentationml/2006/main">
+  <p:cSld>
+    <p:spTree>
+      <p:nvGrpSpPr>
+        <p:cNvPr id="1" name=""/>
+        <p:cNvGrpSpPr/>
+        <p:nvPr/>
+      </p:nvGrpSpPr>
+      <p:grpSpPr>
+        <a:xfrm>
+          <a:off x="0" y="0"/>
+          <a:ext cx="0" cy="0"/>
+          <a:chOff x="0" y="0"/>
+          <a:chExt cx="0" cy="0"/>
+        </a:xfrm>
+      </p:grpSpPr>
+      <p:sp>
+        <p:nvSpPr>
+          <p:cNvPr id="2" name="Title 1"/>
+          <p:cNvSpPr>
+            <a:spLocks noGrp="1"/>
+          </p:cNvSpPr>
+          <p:nvPr>
+            <p:ph type="title"/>
+          </p:nvPr>
+        </p:nvSpPr>
+        <p:spPr/>
+        <p:txBody>
+          <a:bodyPr/>
+          <a:lstStyle/>
+          <a:p>
+            <a:r>
+              <a:rPr lang="en-US" dirty="0" smtClean="0"/>
+              <a:t>Useful </a:t>
+            </a:r>
+            <a:r>
+              <a:rPr lang="en-US" dirty="0" err="1" smtClean="0"/>
+              <a:t>Enumeratees</a:t>
+            </a:r>
+            <a:endParaRPr lang="en-US" dirty="0"/>
+          </a:p>
+        </p:txBody>
+      </p:sp>
+      <p:sp>
+        <p:nvSpPr>
+          <p:cNvPr id="3" name="Content Placeholder 2"/>
+          <p:cNvSpPr>
+            <a:spLocks noGrp="1"/>
+          </p:cNvSpPr>
+          <p:nvPr>
+            <p:ph idx="1"/>
+          </p:nvPr>
+        </p:nvSpPr>
+        <p:spPr/>
+        <p:txBody>
+          <a:bodyPr>
+            <a:normAutofit/>
+          </a:bodyPr>
+          <a:lstStyle/>
+          <a:p>
+            <a:pPr marL="0" indent="0">
+              <a:buNone/>
+            </a:pPr>
+            <a:r>
+              <a:rPr lang="en-US" sz="3600" dirty="0" err="1" smtClean="0">
+                <a:latin typeface="Source Code Pro"/>
+                <a:cs typeface="Source Code Pro"/>
+              </a:rPr>
+              <a:t>Enumeratee.map</a:t>
+            </a:r>
+            <a:endParaRPr lang="en-US" sz="3600" dirty="0" smtClean="0">
+              <a:latin typeface="Source Code Pro"/>
+              <a:cs typeface="Source Code Pro"/>
+            </a:endParaRPr>
+          </a:p>
+          <a:p>
+            <a:pPr marL="0" indent="0">
+              <a:buNone/>
+            </a:pPr>
+            <a:r>
+              <a:rPr lang="en-US" sz="3600" dirty="0" err="1" smtClean="0">
+                <a:latin typeface="Source Code Pro"/>
+                <a:cs typeface="Source Code Pro"/>
+              </a:rPr>
+              <a:t>Enumeratee.filter</a:t>
+            </a:r>
+            <a:endParaRPr lang="en-US" sz="3600" dirty="0" smtClean="0">
+              <a:latin typeface="Source Code Pro"/>
+              <a:cs typeface="Source Code Pro"/>
+            </a:endParaRPr>
+          </a:p>
+          <a:p>
+            <a:pPr marL="0" indent="0">
+              <a:buNone/>
+            </a:pPr>
+            <a:r>
+              <a:rPr lang="en-US" sz="3600" dirty="0" err="1" smtClean="0">
+                <a:latin typeface="Source Code Pro"/>
+                <a:cs typeface="Source Code Pro"/>
+              </a:rPr>
+              <a:t>Enumeratee.drop</a:t>
+            </a:r>
+            <a:r>
+              <a:rPr lang="en-US" sz="3600" dirty="0" smtClean="0">
+                <a:latin typeface="Source Code Pro"/>
+                <a:cs typeface="Source Code Pro"/>
+              </a:rPr>
+              <a:t> </a:t>
+            </a:r>
+            <a:r>
+              <a:rPr lang="en-US" sz="3600" dirty="0" err="1" smtClean="0">
+                <a:latin typeface="Source Code Pro"/>
+                <a:cs typeface="Source Code Pro"/>
+              </a:rPr>
+              <a:t>Enumeratee.take</a:t>
+            </a:r>
+            <a:endParaRPr lang="en-US" sz="3600" dirty="0" smtClean="0">
+              <a:latin typeface="Source Code Pro"/>
+              <a:cs typeface="Source Code Pro"/>
+            </a:endParaRPr>
+          </a:p>
+        </p:txBody>
+      </p:sp>
+    </p:spTree>
+    <p:extLst>
+      <p:ext uri="{BB962C8B-B14F-4D97-AF65-F5344CB8AC3E}">
+        <p14:creationId xmlns:p14="http://schemas.microsoft.com/office/powerpoint/2010/main" val="323551900"/>
+      </p:ext>
+    </p:extLst>
+  </p:cSld>
+  <p:clrMapOvr>
+    <a:masterClrMapping/>
+  </p:clrMapOvr>
+</p:sld>
+</file>
+
+<file path=ppt/slides/slide26.xml><?xml version="1.0" encoding="utf-8"?>
 <p:sld xmlns:a="http://schemas.openxmlformats.org/drawingml/2006/main" xmlns:r="http://schemas.openxmlformats.org/officeDocument/2006/relationships" xmlns:p="http://schemas.openxmlformats.org/presentationml/2006/main">
   <p:cSld>
     <p:spTree>
@@ -10587,7 +12479,7 @@
                 </a:solidFill>
                 <a:cs typeface="Arial"/>
               </a:rPr>
-              <a:t>Done: TODO</a:t>
+              <a:t>Done: there is no more input</a:t>
             </a:r>
           </a:p>
           <a:p>
@@ -10615,7 +12507,7 @@
                 </a:solidFill>
                 <a:cs typeface="Arial"/>
               </a:rPr>
-              <a:t>: TODO</a:t>
+              <a:t>: more input incoming</a:t>
             </a:r>
           </a:p>
           <a:p>
@@ -10632,7 +12524,7 @@
                 </a:solidFill>
                 <a:cs typeface="Arial"/>
               </a:rPr>
-              <a:t>Error: TODO </a:t>
+              <a:t>Error: there was an error with the input</a:t>
             </a:r>
             <a:endParaRPr lang="en-US" sz="4000" dirty="0">
               <a:solidFill>
@@ -10649,202 +12541,6 @@
     <p:extLst>
       <p:ext uri="{BB962C8B-B14F-4D97-AF65-F5344CB8AC3E}">
         <p14:creationId xmlns:p14="http://schemas.microsoft.com/office/powerpoint/2010/main" val="2357084998"/>
-      </p:ext>
-    </p:extLst>
-  </p:cSld>
-  <p:clrMapOvr>
-    <a:masterClrMapping/>
-  </p:clrMapOvr>
-  <p:timing>
-    <p:tnLst>
-      <p:par>
-        <p:cTn xmlns:p14="http://schemas.microsoft.com/office/powerpoint/2010/main" id="1" dur="indefinite" restart="never" nodeType="tmRoot"/>
-      </p:par>
-    </p:tnLst>
-  </p:timing>
-</p:sld>
-</file>
-
-<file path=ppt/slides/slide26.xml><?xml version="1.0" encoding="utf-8"?>
-<p:sld xmlns:a="http://schemas.openxmlformats.org/drawingml/2006/main" xmlns:r="http://schemas.openxmlformats.org/officeDocument/2006/relationships" xmlns:p="http://schemas.openxmlformats.org/presentationml/2006/main">
-  <p:cSld>
-    <p:spTree>
-      <p:nvGrpSpPr>
-        <p:cNvPr id="1" name=""/>
-        <p:cNvGrpSpPr/>
-        <p:nvPr/>
-      </p:nvGrpSpPr>
-      <p:grpSpPr>
-        <a:xfrm>
-          <a:off x="0" y="0"/>
-          <a:ext cx="0" cy="0"/>
-          <a:chOff x="0" y="0"/>
-          <a:chExt cx="0" cy="0"/>
-        </a:xfrm>
-      </p:grpSpPr>
-      <p:sp>
-        <p:nvSpPr>
-          <p:cNvPr id="3" name="Content Placeholder 2"/>
-          <p:cNvSpPr>
-            <a:spLocks noGrp="1"/>
-          </p:cNvSpPr>
-          <p:nvPr>
-            <p:ph idx="1"/>
-          </p:nvPr>
-        </p:nvSpPr>
-        <p:spPr>
-          <a:xfrm>
-            <a:off x="0" y="2852937"/>
-            <a:ext cx="9144000" cy="2376263"/>
-          </a:xfrm>
-          <a:solidFill>
-            <a:srgbClr val="D5D0D6">
-              <a:alpha val="78039"/>
-            </a:srgbClr>
-          </a:solidFill>
-        </p:spPr>
-        <p:txBody>
-          <a:bodyPr vert="horz" lIns="91440" tIns="45720" rIns="91440" bIns="45720" rtlCol="0" anchor="ctr" anchorCtr="0">
-            <a:normAutofit fontScale="92500" lnSpcReduction="20000"/>
-          </a:bodyPr>
-          <a:lstStyle/>
-          <a:p>
-            <a:pPr marL="0" indent="0">
-              <a:buNone/>
-            </a:pPr>
-            <a:r>
-              <a:rPr lang="en-US" sz="4000" dirty="0">
-                <a:solidFill>
-                  <a:schemeClr val="bg1">
-                    <a:lumMod val="75000"/>
-                  </a:schemeClr>
-                </a:solidFill>
-                <a:cs typeface="Arial"/>
-              </a:rPr>
-              <a:t>	Streaming APIs</a:t>
-            </a:r>
-          </a:p>
-          <a:p>
-            <a:pPr marL="0" indent="0">
-              <a:buNone/>
-            </a:pPr>
-            <a:r>
-              <a:rPr lang="en-US" sz="4000" dirty="0">
-                <a:solidFill>
-                  <a:schemeClr val="bg1">
-                    <a:lumMod val="75000"/>
-                  </a:schemeClr>
-                </a:solidFill>
-                <a:cs typeface="Arial"/>
-              </a:rPr>
-              <a:t>	File streaming</a:t>
-            </a:r>
-          </a:p>
-          <a:p>
-            <a:pPr marL="0" indent="0">
-              <a:buNone/>
-            </a:pPr>
-            <a:r>
-              <a:rPr lang="en-US" sz="4000" dirty="0">
-                <a:solidFill>
-                  <a:schemeClr val="bg1">
-                    <a:lumMod val="75000"/>
-                  </a:schemeClr>
-                </a:solidFill>
-                <a:cs typeface="Arial"/>
-              </a:rPr>
-              <a:t>	Server-generated </a:t>
-            </a:r>
-            <a:r>
-              <a:rPr lang="en-US" sz="4000" dirty="0" smtClean="0">
-                <a:solidFill>
-                  <a:schemeClr val="bg1">
-                    <a:lumMod val="75000"/>
-                  </a:schemeClr>
-                </a:solidFill>
-                <a:cs typeface="Arial"/>
-              </a:rPr>
-              <a:t>events</a:t>
-            </a:r>
-          </a:p>
-          <a:p>
-            <a:pPr marL="0" indent="0">
-              <a:buNone/>
-            </a:pPr>
-            <a:r>
-              <a:rPr lang="en-US" sz="4000" dirty="0" smtClean="0">
-                <a:solidFill>
-                  <a:schemeClr val="bg1">
-                    <a:lumMod val="75000"/>
-                  </a:schemeClr>
-                </a:solidFill>
-                <a:cs typeface="Arial"/>
-              </a:rPr>
-              <a:t>	Reactive data</a:t>
-            </a:r>
-            <a:endParaRPr lang="en-US" sz="4000" dirty="0">
-              <a:solidFill>
-                <a:schemeClr val="bg1">
-                  <a:lumMod val="75000"/>
-                </a:schemeClr>
-              </a:solidFill>
-              <a:cs typeface="Arial"/>
-            </a:endParaRPr>
-          </a:p>
-        </p:txBody>
-      </p:sp>
-      <p:sp>
-        <p:nvSpPr>
-          <p:cNvPr id="4" name="Rectangle 3"/>
-          <p:cNvSpPr/>
-          <p:nvPr/>
-        </p:nvSpPr>
-        <p:spPr>
-          <a:xfrm>
-            <a:off x="755576" y="908720"/>
-            <a:ext cx="7589537" cy="923330"/>
-          </a:xfrm>
-          <a:prstGeom prst="rect">
-            <a:avLst/>
-          </a:prstGeom>
-        </p:spPr>
-        <p:txBody>
-          <a:bodyPr wrap="none">
-            <a:spAutoFit/>
-          </a:bodyPr>
-          <a:lstStyle/>
-          <a:p>
-            <a:pPr marL="0" indent="0">
-              <a:buNone/>
-            </a:pPr>
-            <a:r>
-              <a:rPr lang="en-US" sz="5400" dirty="0">
-                <a:latin typeface="Calluna Sans"/>
-                <a:cs typeface="Calluna Sans"/>
-              </a:rPr>
-              <a:t>Enumerators + </a:t>
-            </a:r>
-            <a:r>
-              <a:rPr lang="en-US" sz="5400" dirty="0" err="1">
-                <a:latin typeface="Calluna Sans"/>
-                <a:cs typeface="Calluna Sans"/>
-              </a:rPr>
-              <a:t>Iteratees</a:t>
-            </a:r>
-            <a:r>
-              <a:rPr lang="en-US" sz="5400" dirty="0">
-                <a:latin typeface="Calluna Sans"/>
-                <a:cs typeface="Calluna Sans"/>
-              </a:rPr>
-              <a:t> = </a:t>
-            </a:r>
-          </a:p>
-        </p:txBody>
-      </p:sp>
-    </p:spTree>
-    <p:extLst>
-      <p:ext uri="{BB962C8B-B14F-4D97-AF65-F5344CB8AC3E}">
-        <p14:creationId xmlns:p14="http://schemas.microsoft.com/office/powerpoint/2010/main" val="3043450211"/>
       </p:ext>
     </p:extLst>
   </p:cSld>
@@ -10895,7 +12591,11 @@
           <a:p>
             <a:r>
               <a:rPr lang="en-US" dirty="0" smtClean="0"/>
-              <a:t>Streaming APIs</a:t>
+              <a:t>Simplified </a:t>
+            </a:r>
+            <a:r>
+              <a:rPr lang="en-US" dirty="0" err="1" smtClean="0"/>
+              <a:t>Iteratees</a:t>
             </a:r>
             <a:endParaRPr lang="en-US" dirty="0"/>
           </a:p>
@@ -10916,14 +12616,32 @@
           <a:bodyPr/>
           <a:lstStyle/>
           <a:p>
-            <a:endParaRPr lang="en-US" dirty="0"/>
+            <a:r>
+              <a:rPr lang="en-US" dirty="0" err="1" smtClean="0"/>
+              <a:t>Iteratee.foreach</a:t>
+            </a:r>
+            <a:endParaRPr lang="en-US" dirty="0" smtClean="0"/>
+          </a:p>
+          <a:p>
+            <a:r>
+              <a:rPr lang="en-US" dirty="0" err="1" smtClean="0"/>
+              <a:t>Iteratee.fold</a:t>
+            </a:r>
+            <a:endParaRPr lang="en-US" dirty="0" smtClean="0"/>
+          </a:p>
+          <a:p>
+            <a:r>
+              <a:rPr lang="en-US" dirty="0" err="1" smtClean="0"/>
+              <a:t>Iteratee.consume</a:t>
+            </a:r>
+            <a:endParaRPr lang="en-US" dirty="0" smtClean="0"/>
           </a:p>
         </p:txBody>
       </p:sp>
     </p:spTree>
     <p:extLst>
       <p:ext uri="{BB962C8B-B14F-4D97-AF65-F5344CB8AC3E}">
-        <p14:creationId xmlns:p14="http://schemas.microsoft.com/office/powerpoint/2010/main" val="1801023126"/>
+        <p14:creationId xmlns:p14="http://schemas.microsoft.com/office/powerpoint/2010/main" val="2058713248"/>
       </p:ext>
     </p:extLst>
   </p:cSld>
@@ -10966,8 +12684,8 @@
           <a:lstStyle/>
           <a:p>
             <a:r>
-              <a:rPr lang="en-US" dirty="0" err="1" smtClean="0"/>
-              <a:t>WebSockets</a:t>
+              <a:rPr lang="en-US" dirty="0" smtClean="0"/>
+              <a:t>Reactive IO and HTTP responses</a:t>
             </a:r>
             <a:endParaRPr lang="en-US" dirty="0"/>
           </a:p>
@@ -10985,30 +12703,109 @@
         </p:nvSpPr>
         <p:spPr/>
         <p:txBody>
-          <a:bodyPr/>
+          <a:bodyPr anchor="ctr"/>
           <a:lstStyle/>
           <a:p>
-            <a:endParaRPr lang="es-ES_tradnl"/>
+            <a:pPr marL="0" indent="0">
+              <a:buNone/>
+            </a:pPr>
+            <a:r>
+              <a:rPr lang="en-US" dirty="0" err="1" smtClean="0">
+                <a:latin typeface="Source Code Pro"/>
+                <a:cs typeface="Source Code Pro"/>
+              </a:rPr>
+              <a:t>Ok.feed</a:t>
+            </a:r>
+            <a:r>
+              <a:rPr lang="en-US" dirty="0" smtClean="0">
+                <a:latin typeface="Source Code Pro"/>
+                <a:cs typeface="Source Code Pro"/>
+              </a:rPr>
+              <a:t>(</a:t>
+            </a:r>
+            <a:r>
+              <a:rPr lang="en-US" dirty="0" err="1" smtClean="0">
+                <a:latin typeface="Source Code Pro"/>
+                <a:cs typeface="Source Code Pro"/>
+              </a:rPr>
+              <a:t>iteratee</a:t>
+            </a:r>
+            <a:r>
+              <a:rPr lang="en-US" dirty="0" smtClean="0">
+                <a:latin typeface="Source Code Pro"/>
+                <a:cs typeface="Source Code Pro"/>
+              </a:rPr>
+              <a:t>)</a:t>
+            </a:r>
+          </a:p>
+          <a:p>
+            <a:pPr marL="0" indent="0">
+              <a:buNone/>
+            </a:pPr>
+            <a:r>
+              <a:rPr lang="en-US" dirty="0" err="1" smtClean="0">
+                <a:latin typeface="Source Code Pro"/>
+                <a:cs typeface="Source Code Pro"/>
+              </a:rPr>
+              <a:t>Ok.stream</a:t>
+            </a:r>
+            <a:r>
+              <a:rPr lang="en-US" dirty="0" smtClean="0">
+                <a:latin typeface="Source Code Pro"/>
+                <a:cs typeface="Source Code Pro"/>
+              </a:rPr>
+              <a:t>(</a:t>
+            </a:r>
+            <a:r>
+              <a:rPr lang="en-US" dirty="0" err="1" smtClean="0">
+                <a:latin typeface="Source Code Pro"/>
+                <a:cs typeface="Source Code Pro"/>
+              </a:rPr>
+              <a:t>iteratee</a:t>
+            </a:r>
+            <a:r>
+              <a:rPr lang="en-US" dirty="0" smtClean="0">
+                <a:latin typeface="Source Code Pro"/>
+                <a:cs typeface="Source Code Pro"/>
+              </a:rPr>
+              <a:t>)</a:t>
+            </a:r>
+          </a:p>
+          <a:p>
+            <a:pPr marL="0" indent="0">
+              <a:buNone/>
+            </a:pPr>
+            <a:r>
+              <a:rPr lang="en-US" dirty="0" err="1" smtClean="0">
+                <a:latin typeface="Source Code Pro"/>
+                <a:cs typeface="Source Code Pro"/>
+              </a:rPr>
+              <a:t>Ok.stream</a:t>
+            </a:r>
+            <a:r>
+              <a:rPr lang="en-US" dirty="0" smtClean="0">
+                <a:latin typeface="Source Code Pro"/>
+                <a:cs typeface="Source Code Pro"/>
+              </a:rPr>
+              <a:t>(enumerator)</a:t>
+            </a:r>
+            <a:endParaRPr lang="en-US" dirty="0">
+              <a:latin typeface="Source Code Pro"/>
+              <a:cs typeface="Source Code Pro"/>
+            </a:endParaRPr>
           </a:p>
         </p:txBody>
       </p:sp>
     </p:spTree>
     <p:extLst>
       <p:ext uri="{BB962C8B-B14F-4D97-AF65-F5344CB8AC3E}">
-        <p14:creationId xmlns:p14="http://schemas.microsoft.com/office/powerpoint/2010/main" val="2608260262"/>
+        <p14:creationId xmlns:p14="http://schemas.microsoft.com/office/powerpoint/2010/main" val="1820679085"/>
       </p:ext>
     </p:extLst>
   </p:cSld>
   <p:clrMapOvr>
     <a:masterClrMapping/>
   </p:clrMapOvr>
-  <p:timing>
-    <p:tnLst>
-      <p:par>
-        <p:cTn xmlns:p14="http://schemas.microsoft.com/office/powerpoint/2010/main" id="1" dur="indefinite" restart="never" nodeType="tmRoot"/>
-      </p:par>
-    </p:tnLst>
-  </p:timing>
 </p:sld>
 </file>
 
@@ -11029,29 +12826,6 @@
           <a:chExt cx="0" cy="0"/>
         </a:xfrm>
       </p:grpSpPr>
-      <p:pic>
-        <p:nvPicPr>
-          <p:cNvPr id="4" name="Picture 3"/>
-          <p:cNvPicPr>
-            <a:picLocks noChangeAspect="1"/>
-          </p:cNvPicPr>
-          <p:nvPr/>
-        </p:nvPicPr>
-        <p:blipFill rotWithShape="1">
-          <a:blip r:embed="rId2"/>
-          <a:srcRect l="-185" r="4353"/>
-          <a:stretch/>
-        </p:blipFill>
-        <p:spPr>
-          <a:xfrm>
-            <a:off x="-559301" y="0"/>
-            <a:ext cx="9703302" cy="6865331"/>
-          </a:xfrm>
-          <a:prstGeom prst="rect">
-            <a:avLst/>
-          </a:prstGeom>
-        </p:spPr>
-      </p:pic>
       <p:sp>
         <p:nvSpPr>
           <p:cNvPr id="3" name="Content Placeholder 2"/>
@@ -11064,8 +12838,8 @@
         </p:nvSpPr>
         <p:spPr>
           <a:xfrm>
-            <a:off x="-540568" y="4293097"/>
-            <a:ext cx="9684568" cy="1440159"/>
+            <a:off x="0" y="2852937"/>
+            <a:ext cx="9144000" cy="2376263"/>
           </a:xfrm>
           <a:solidFill>
             <a:srgbClr val="D5D0D6">
@@ -11075,11 +12849,11 @@
         </p:spPr>
         <p:txBody>
           <a:bodyPr vert="horz" lIns="91440" tIns="45720" rIns="91440" bIns="45720" rtlCol="0" anchor="ctr" anchorCtr="0">
-            <a:normAutofit/>
+            <a:normAutofit fontScale="92500" lnSpcReduction="20000"/>
           </a:bodyPr>
           <a:lstStyle/>
           <a:p>
-            <a:pPr marL="0" indent="0" algn="ctr">
+            <a:pPr marL="0" indent="0">
               <a:buNone/>
             </a:pPr>
             <a:r>
@@ -11091,7 +12865,39 @@
                 </a:solidFill>
                 <a:cs typeface="Arial"/>
               </a:rPr>
-              <a:t>Demo: </a:t>
+              <a:t>	Streaming APIs</a:t>
+            </a:r>
+          </a:p>
+          <a:p>
+            <a:pPr marL="0" indent="0">
+              <a:buNone/>
+            </a:pPr>
+            <a:r>
+              <a:rPr lang="en-US" sz="4000" dirty="0">
+                <a:solidFill>
+                  <a:schemeClr val="bg1">
+                    <a:lumMod val="75000"/>
+                  </a:schemeClr>
+                </a:solidFill>
+                <a:cs typeface="Arial"/>
+              </a:rPr>
+              <a:t>	File streaming</a:t>
+            </a:r>
+          </a:p>
+          <a:p>
+            <a:pPr marL="0" indent="0">
+              <a:buNone/>
+            </a:pPr>
+            <a:r>
+              <a:rPr lang="en-US" sz="4000" dirty="0">
+                <a:solidFill>
+                  <a:schemeClr val="bg1">
+                    <a:lumMod val="75000"/>
+                  </a:schemeClr>
+                </a:solidFill>
+                <a:cs typeface="Arial"/>
+              </a:rPr>
+              <a:t>	Server-generated </a:t>
             </a:r>
             <a:r>
               <a:rPr lang="en-US" sz="4000" dirty="0" smtClean="0">
@@ -11102,7 +12908,23 @@
                 </a:solidFill>
                 <a:cs typeface="Arial"/>
               </a:rPr>
-              <a:t>Reactive IO</a:t>
+              <a:t>events</a:t>
+            </a:r>
+          </a:p>
+          <a:p>
+            <a:pPr marL="0" indent="0">
+              <a:buNone/>
+            </a:pPr>
+            <a:r>
+              <a:rPr lang="en-US" sz="4000" dirty="0" smtClean="0">
+                <a:solidFill>
+                  <a:schemeClr val="bg1">
+                    <a:lumMod val="75000"/>
+                  </a:schemeClr>
+                </a:solidFill>
+                <a:cs typeface="Arial"/>
+              </a:rPr>
+              <a:t>	Reactive data</a:t>
             </a:r>
             <a:endParaRPr lang="en-US" sz="4000" dirty="0">
               <a:solidFill>
@@ -11115,16 +12937,71 @@
           </a:p>
         </p:txBody>
       </p:sp>
+      <p:sp>
+        <p:nvSpPr>
+          <p:cNvPr id="4" name="Rectangle 3"/>
+          <p:cNvSpPr/>
+          <p:nvPr/>
+        </p:nvSpPr>
+        <p:spPr>
+          <a:xfrm>
+            <a:off x="755576" y="908720"/>
+            <a:ext cx="7589537" cy="923330"/>
+          </a:xfrm>
+          <a:prstGeom prst="rect">
+            <a:avLst/>
+          </a:prstGeom>
+        </p:spPr>
+        <p:txBody>
+          <a:bodyPr wrap="none">
+            <a:spAutoFit/>
+          </a:bodyPr>
+          <a:lstStyle/>
+          <a:p>
+            <a:pPr marL="0" indent="0">
+              <a:buNone/>
+            </a:pPr>
+            <a:r>
+              <a:rPr lang="en-US" sz="5400" dirty="0">
+                <a:latin typeface="Calluna Sans"/>
+                <a:cs typeface="Calluna Sans"/>
+              </a:rPr>
+              <a:t>Enumerators + </a:t>
+            </a:r>
+            <a:r>
+              <a:rPr lang="en-US" sz="5400" dirty="0" err="1">
+                <a:latin typeface="Calluna Sans"/>
+                <a:cs typeface="Calluna Sans"/>
+              </a:rPr>
+              <a:t>Iteratees</a:t>
+            </a:r>
+            <a:r>
+              <a:rPr lang="en-US" sz="5400" dirty="0">
+                <a:latin typeface="Calluna Sans"/>
+                <a:cs typeface="Calluna Sans"/>
+              </a:rPr>
+              <a:t> = </a:t>
+            </a:r>
+          </a:p>
+        </p:txBody>
+      </p:sp>
     </p:spTree>
     <p:extLst>
       <p:ext uri="{BB962C8B-B14F-4D97-AF65-F5344CB8AC3E}">
-        <p14:creationId xmlns:p14="http://schemas.microsoft.com/office/powerpoint/2010/main" val="1183518611"/>
+        <p14:creationId xmlns:p14="http://schemas.microsoft.com/office/powerpoint/2010/main" val="3043450211"/>
       </p:ext>
     </p:extLst>
   </p:cSld>
   <p:clrMapOvr>
     <a:masterClrMapping/>
   </p:clrMapOvr>
+  <p:timing>
+    <p:tnLst>
+      <p:par>
+        <p:cTn xmlns:p14="http://schemas.microsoft.com/office/powerpoint/2010/main" id="1" dur="indefinite" restart="never" nodeType="tmRoot"/>
+      </p:par>
+    </p:tnLst>
+  </p:timing>
 </p:sld>
 </file>
 
@@ -11321,14 +13198,12 @@
         </p:nvSpPr>
         <p:spPr/>
         <p:txBody>
-          <a:bodyPr>
-            <a:normAutofit/>
-          </a:bodyPr>
+          <a:bodyPr/>
           <a:lstStyle/>
           <a:p>
             <a:r>
               <a:rPr lang="en-US" dirty="0" smtClean="0"/>
-              <a:t>A glimpse of the future</a:t>
+              <a:t>Streaming Files</a:t>
             </a:r>
             <a:endParaRPr lang="en-US" dirty="0"/>
           </a:p>
@@ -11344,6 +13219,90 @@
             <p:ph idx="1"/>
           </p:nvPr>
         </p:nvSpPr>
+        <p:spPr>
+          <a:xfrm>
+            <a:off x="0" y="2708920"/>
+            <a:ext cx="9144000" cy="1872208"/>
+          </a:xfrm>
+          <a:solidFill>
+            <a:srgbClr val="D5D0D6">
+              <a:alpha val="78039"/>
+            </a:srgbClr>
+          </a:solidFill>
+        </p:spPr>
+        <p:txBody>
+          <a:bodyPr vert="horz" lIns="91440" tIns="45720" rIns="91440" bIns="45720" rtlCol="0" anchor="ctr" anchorCtr="0">
+            <a:normAutofit/>
+          </a:bodyPr>
+          <a:lstStyle/>
+          <a:p>
+            <a:pPr marL="0" indent="0" algn="ctr">
+              <a:buNone/>
+            </a:pPr>
+            <a:r>
+              <a:rPr lang="en-US" sz="4800" dirty="0" err="1">
+                <a:solidFill>
+                  <a:schemeClr val="bg1">
+                    <a:lumMod val="75000"/>
+                  </a:schemeClr>
+                </a:solidFill>
+                <a:latin typeface="Source Code Pro"/>
+                <a:cs typeface="Source Code Pro"/>
+              </a:rPr>
+              <a:t>Enumerator.fromFile</a:t>
+            </a:r>
+            <a:endParaRPr lang="en-US" sz="4800" dirty="0">
+              <a:solidFill>
+                <a:schemeClr val="bg1">
+                  <a:lumMod val="75000"/>
+                </a:schemeClr>
+              </a:solidFill>
+              <a:latin typeface="Source Code Pro"/>
+              <a:cs typeface="Source Code Pro"/>
+            </a:endParaRPr>
+          </a:p>
+        </p:txBody>
+      </p:sp>
+    </p:spTree>
+    <p:extLst>
+      <p:ext uri="{BB962C8B-B14F-4D97-AF65-F5344CB8AC3E}">
+        <p14:creationId xmlns:p14="http://schemas.microsoft.com/office/powerpoint/2010/main" val="3017588657"/>
+      </p:ext>
+    </p:extLst>
+  </p:cSld>
+  <p:clrMapOvr>
+    <a:masterClrMapping/>
+  </p:clrMapOvr>
+</p:sld>
+</file>
+
+<file path=ppt/slides/slide31.xml><?xml version="1.0" encoding="utf-8"?>
+<p:sld xmlns:a="http://schemas.openxmlformats.org/drawingml/2006/main" xmlns:r="http://schemas.openxmlformats.org/officeDocument/2006/relationships" xmlns:p="http://schemas.openxmlformats.org/presentationml/2006/main">
+  <p:cSld>
+    <p:spTree>
+      <p:nvGrpSpPr>
+        <p:cNvPr id="1" name=""/>
+        <p:cNvGrpSpPr/>
+        <p:nvPr/>
+      </p:nvGrpSpPr>
+      <p:grpSpPr>
+        <a:xfrm>
+          <a:off x="0" y="0"/>
+          <a:ext cx="0" cy="0"/>
+          <a:chOff x="0" y="0"/>
+          <a:chExt cx="0" cy="0"/>
+        </a:xfrm>
+      </p:grpSpPr>
+      <p:sp>
+        <p:nvSpPr>
+          <p:cNvPr id="2" name="Title 1"/>
+          <p:cNvSpPr>
+            <a:spLocks noGrp="1"/>
+          </p:cNvSpPr>
+          <p:nvPr>
+            <p:ph type="title"/>
+          </p:nvPr>
+        </p:nvSpPr>
         <p:spPr/>
         <p:txBody>
           <a:bodyPr/>
@@ -11351,9 +13310,994 @@
           <a:p>
             <a:r>
               <a:rPr lang="en-US" dirty="0" smtClean="0"/>
-              <a:t>Reactive Mongo</a:t>
+              <a:t>Streaming APIs</a:t>
             </a:r>
             <a:endParaRPr lang="en-US" dirty="0"/>
+          </a:p>
+        </p:txBody>
+      </p:sp>
+      <p:sp>
+        <p:nvSpPr>
+          <p:cNvPr id="4" name="Content Placeholder 2"/>
+          <p:cNvSpPr>
+            <a:spLocks noGrp="1"/>
+          </p:cNvSpPr>
+          <p:nvPr>
+            <p:ph idx="1"/>
+          </p:nvPr>
+        </p:nvSpPr>
+        <p:spPr>
+          <a:xfrm>
+            <a:off x="0" y="2708920"/>
+            <a:ext cx="9144000" cy="1872208"/>
+          </a:xfrm>
+          <a:solidFill>
+            <a:srgbClr val="D5D0D6">
+              <a:alpha val="78039"/>
+            </a:srgbClr>
+          </a:solidFill>
+        </p:spPr>
+        <p:txBody>
+          <a:bodyPr vert="horz" lIns="91440" tIns="45720" rIns="91440" bIns="45720" rtlCol="0" anchor="ctr" anchorCtr="0">
+            <a:normAutofit/>
+          </a:bodyPr>
+          <a:lstStyle/>
+          <a:p>
+            <a:pPr marL="0" indent="0" algn="ctr">
+              <a:buNone/>
+            </a:pPr>
+            <a:r>
+              <a:rPr lang="en-US" sz="4800" dirty="0" smtClean="0">
+                <a:solidFill>
+                  <a:schemeClr val="bg1">
+                    <a:lumMod val="75000"/>
+                  </a:schemeClr>
+                </a:solidFill>
+                <a:latin typeface="Calluna Sans"/>
+                <a:cs typeface="Calluna Sans"/>
+              </a:rPr>
+              <a:t>Data source </a:t>
+            </a:r>
+            <a:r>
+              <a:rPr lang="en-US" sz="4800" dirty="0" smtClean="0">
+                <a:solidFill>
+                  <a:schemeClr val="bg1">
+                    <a:lumMod val="75000"/>
+                  </a:schemeClr>
+                </a:solidFill>
+                <a:latin typeface="Calluna Sans"/>
+                <a:cs typeface="Calluna Sans"/>
+                <a:sym typeface="Wingdings"/>
+              </a:rPr>
+              <a:t> Enumerator  (</a:t>
+            </a:r>
+            <a:r>
+              <a:rPr lang="en-US" sz="4800" dirty="0" smtClean="0">
+                <a:solidFill>
+                  <a:schemeClr val="bg1">
+                    <a:lumMod val="75000"/>
+                  </a:schemeClr>
+                </a:solidFill>
+                <a:latin typeface="Calluna Sans"/>
+                <a:cs typeface="Calluna Sans"/>
+                <a:sym typeface="Wingdings"/>
+              </a:rPr>
+              <a:t>transform) </a:t>
+            </a:r>
+            <a:r>
+              <a:rPr lang="en-US" sz="4800" dirty="0" smtClean="0">
+                <a:solidFill>
+                  <a:schemeClr val="bg1">
+                    <a:lumMod val="75000"/>
+                  </a:schemeClr>
+                </a:solidFill>
+                <a:latin typeface="Calluna Sans"/>
+                <a:cs typeface="Calluna Sans"/>
+                <a:sym typeface="Wingdings"/>
+              </a:rPr>
+              <a:t> </a:t>
+            </a:r>
+            <a:r>
+              <a:rPr lang="en-US" sz="4800" dirty="0" err="1" smtClean="0">
+                <a:solidFill>
+                  <a:schemeClr val="bg1">
+                    <a:lumMod val="75000"/>
+                  </a:schemeClr>
+                </a:solidFill>
+                <a:latin typeface="Calluna Sans"/>
+                <a:cs typeface="Calluna Sans"/>
+                <a:sym typeface="Wingdings"/>
+              </a:rPr>
+              <a:t>Ok.stream</a:t>
+            </a:r>
+            <a:endParaRPr lang="en-US" sz="4800" dirty="0">
+              <a:solidFill>
+                <a:schemeClr val="bg1">
+                  <a:lumMod val="75000"/>
+                </a:schemeClr>
+              </a:solidFill>
+              <a:latin typeface="Calluna Sans"/>
+              <a:cs typeface="Calluna Sans"/>
+            </a:endParaRPr>
+          </a:p>
+        </p:txBody>
+      </p:sp>
+    </p:spTree>
+    <p:extLst>
+      <p:ext uri="{BB962C8B-B14F-4D97-AF65-F5344CB8AC3E}">
+        <p14:creationId xmlns:p14="http://schemas.microsoft.com/office/powerpoint/2010/main" val="1801023126"/>
+      </p:ext>
+    </p:extLst>
+  </p:cSld>
+  <p:clrMapOvr>
+    <a:masterClrMapping/>
+  </p:clrMapOvr>
+</p:sld>
+</file>
+
+<file path=ppt/slides/slide32.xml><?xml version="1.0" encoding="utf-8"?>
+<p:sld xmlns:a="http://schemas.openxmlformats.org/drawingml/2006/main" xmlns:r="http://schemas.openxmlformats.org/officeDocument/2006/relationships" xmlns:p="http://schemas.openxmlformats.org/presentationml/2006/main">
+  <p:cSld>
+    <p:spTree>
+      <p:nvGrpSpPr>
+        <p:cNvPr id="1" name=""/>
+        <p:cNvGrpSpPr/>
+        <p:nvPr/>
+      </p:nvGrpSpPr>
+      <p:grpSpPr>
+        <a:xfrm>
+          <a:off x="0" y="0"/>
+          <a:ext cx="0" cy="0"/>
+          <a:chOff x="0" y="0"/>
+          <a:chExt cx="0" cy="0"/>
+        </a:xfrm>
+      </p:grpSpPr>
+      <p:sp>
+        <p:nvSpPr>
+          <p:cNvPr id="2" name="Title 1"/>
+          <p:cNvSpPr>
+            <a:spLocks noGrp="1"/>
+          </p:cNvSpPr>
+          <p:nvPr>
+            <p:ph type="title"/>
+          </p:nvPr>
+        </p:nvSpPr>
+        <p:spPr/>
+        <p:txBody>
+          <a:bodyPr/>
+          <a:lstStyle/>
+          <a:p>
+            <a:r>
+              <a:rPr lang="en-US" dirty="0" err="1" smtClean="0"/>
+              <a:t>WebSockets</a:t>
+            </a:r>
+            <a:endParaRPr lang="en-US" dirty="0"/>
+          </a:p>
+        </p:txBody>
+      </p:sp>
+      <p:sp>
+        <p:nvSpPr>
+          <p:cNvPr id="3" name="Content Placeholder 2"/>
+          <p:cNvSpPr>
+            <a:spLocks noGrp="1"/>
+          </p:cNvSpPr>
+          <p:nvPr>
+            <p:ph idx="1"/>
+          </p:nvPr>
+        </p:nvSpPr>
+        <p:spPr>
+          <a:xfrm>
+            <a:off x="251520" y="1600200"/>
+            <a:ext cx="8640960" cy="4525963"/>
+          </a:xfrm>
+        </p:spPr>
+        <p:txBody>
+          <a:bodyPr>
+            <a:normAutofit lnSpcReduction="10000"/>
+          </a:bodyPr>
+          <a:lstStyle/>
+          <a:p>
+            <a:pPr marL="0" indent="0">
+              <a:buNone/>
+            </a:pPr>
+            <a:r>
+              <a:rPr lang="es-ES_tradnl" sz="1800" dirty="0">
+                <a:latin typeface="Source Code Pro"/>
+                <a:cs typeface="Source Code Pro"/>
+              </a:rPr>
+              <a:t> </a:t>
+            </a:r>
+            <a:r>
+              <a:rPr lang="es-ES_tradnl" sz="1800" dirty="0" err="1">
+                <a:latin typeface="Source Code Pro"/>
+                <a:cs typeface="Source Code Pro"/>
+              </a:rPr>
+              <a:t>def</a:t>
+            </a:r>
+            <a:r>
+              <a:rPr lang="es-ES_tradnl" sz="1800" dirty="0">
+                <a:latin typeface="Source Code Pro"/>
+                <a:cs typeface="Source Code Pro"/>
+              </a:rPr>
+              <a:t> </a:t>
+            </a:r>
+            <a:r>
+              <a:rPr lang="es-ES_tradnl" sz="1800" dirty="0" err="1">
+                <a:latin typeface="Source Code Pro"/>
+                <a:cs typeface="Source Code Pro"/>
+              </a:rPr>
+              <a:t>websocketTime</a:t>
+            </a:r>
+            <a:r>
+              <a:rPr lang="es-ES_tradnl" sz="1800" dirty="0">
+                <a:latin typeface="Source Code Pro"/>
+                <a:cs typeface="Source Code Pro"/>
+              </a:rPr>
+              <a:t> = </a:t>
+            </a:r>
+            <a:r>
+              <a:rPr lang="es-ES_tradnl" sz="1800" dirty="0" err="1">
+                <a:latin typeface="Source Code Pro"/>
+                <a:cs typeface="Source Code Pro"/>
+              </a:rPr>
+              <a:t>WebSocket.async</a:t>
+            </a:r>
+            <a:r>
+              <a:rPr lang="es-ES_tradnl" sz="1800" dirty="0">
+                <a:latin typeface="Source Code Pro"/>
+                <a:cs typeface="Source Code Pro"/>
+              </a:rPr>
+              <a:t>[</a:t>
+            </a:r>
+            <a:r>
+              <a:rPr lang="es-ES_tradnl" sz="1800" dirty="0" err="1">
+                <a:latin typeface="Source Code Pro"/>
+                <a:cs typeface="Source Code Pro"/>
+              </a:rPr>
+              <a:t>String</a:t>
+            </a:r>
+            <a:r>
+              <a:rPr lang="es-ES_tradnl" sz="1800" dirty="0">
+                <a:latin typeface="Source Code Pro"/>
+                <a:cs typeface="Source Code Pro"/>
+              </a:rPr>
+              <a:t>] { </a:t>
+            </a:r>
+            <a:r>
+              <a:rPr lang="es-ES_tradnl" sz="1800" dirty="0" err="1">
+                <a:latin typeface="Source Code Pro"/>
+                <a:cs typeface="Source Code Pro"/>
+              </a:rPr>
+              <a:t>request</a:t>
+            </a:r>
+            <a:r>
+              <a:rPr lang="es-ES_tradnl" sz="1800" dirty="0">
+                <a:latin typeface="Source Code Pro"/>
+                <a:cs typeface="Source Code Pro"/>
+              </a:rPr>
+              <a:t> =&gt;</a:t>
+            </a:r>
+          </a:p>
+          <a:p>
+            <a:pPr marL="0" indent="0">
+              <a:buNone/>
+            </a:pPr>
+            <a:r>
+              <a:rPr lang="es-ES_tradnl" sz="1800" dirty="0">
+                <a:latin typeface="Source Code Pro"/>
+                <a:cs typeface="Source Code Pro"/>
+              </a:rPr>
+              <a:t>    </a:t>
+            </a:r>
+            <a:r>
+              <a:rPr lang="es-ES_tradnl" sz="1800" dirty="0" err="1">
+                <a:latin typeface="Source Code Pro"/>
+                <a:cs typeface="Source Code Pro"/>
+              </a:rPr>
+              <a:t>Akka.future</a:t>
+            </a:r>
+            <a:r>
+              <a:rPr lang="es-ES_tradnl" sz="1800" dirty="0">
+                <a:latin typeface="Source Code Pro"/>
+                <a:cs typeface="Source Code Pro"/>
+              </a:rPr>
+              <a:t> {</a:t>
+            </a:r>
+          </a:p>
+          <a:p>
+            <a:pPr marL="0" indent="0">
+              <a:buNone/>
+            </a:pPr>
+            <a:r>
+              <a:rPr lang="es-ES_tradnl" sz="1800" dirty="0">
+                <a:latin typeface="Source Code Pro"/>
+                <a:cs typeface="Source Code Pro"/>
+              </a:rPr>
+              <a:t>      val </a:t>
+            </a:r>
+            <a:r>
+              <a:rPr lang="es-ES_tradnl" sz="1800" dirty="0" err="1">
+                <a:latin typeface="Source Code Pro"/>
+                <a:cs typeface="Source Code Pro"/>
+              </a:rPr>
+              <a:t>timeEnumerator</a:t>
+            </a:r>
+            <a:r>
+              <a:rPr lang="es-ES_tradnl" sz="1800" dirty="0">
+                <a:latin typeface="Source Code Pro"/>
+                <a:cs typeface="Source Code Pro"/>
+              </a:rPr>
+              <a:t> = </a:t>
+            </a:r>
+            <a:r>
+              <a:rPr lang="es-ES_tradnl" sz="1800" dirty="0" err="1">
+                <a:latin typeface="Source Code Pro"/>
+                <a:cs typeface="Source Code Pro"/>
+              </a:rPr>
+              <a:t>Enumerator.fromCallback</a:t>
+            </a:r>
+            <a:r>
+              <a:rPr lang="es-ES_tradnl" sz="1800" dirty="0">
+                <a:latin typeface="Source Code Pro"/>
+                <a:cs typeface="Source Code Pro"/>
+              </a:rPr>
+              <a:t> { () =&gt;</a:t>
+            </a:r>
+          </a:p>
+          <a:p>
+            <a:pPr marL="0" indent="0">
+              <a:buNone/>
+            </a:pPr>
+            <a:r>
+              <a:rPr lang="es-ES_tradnl" sz="1800" dirty="0">
+                <a:latin typeface="Source Code Pro"/>
+                <a:cs typeface="Source Code Pro"/>
+              </a:rPr>
+              <a:t>        </a:t>
+            </a:r>
+            <a:r>
+              <a:rPr lang="es-ES_tradnl" sz="1800" dirty="0" err="1">
+                <a:latin typeface="Source Code Pro"/>
+                <a:cs typeface="Source Code Pro"/>
+              </a:rPr>
+              <a:t>Promise.timeout</a:t>
+            </a:r>
+            <a:r>
+              <a:rPr lang="es-ES_tradnl" sz="1800" dirty="0">
+                <a:latin typeface="Source Code Pro"/>
+                <a:cs typeface="Source Code Pro"/>
+              </a:rPr>
+              <a:t>(</a:t>
+            </a:r>
+            <a:r>
+              <a:rPr lang="es-ES_tradnl" sz="1800" dirty="0" err="1">
+                <a:latin typeface="Source Code Pro"/>
+                <a:cs typeface="Source Code Pro"/>
+              </a:rPr>
+              <a:t>Some</a:t>
+            </a:r>
+            <a:r>
+              <a:rPr lang="es-ES_tradnl" sz="1800" dirty="0">
+                <a:latin typeface="Source Code Pro"/>
+                <a:cs typeface="Source Code Pro"/>
+              </a:rPr>
+              <a:t>((new Date).</a:t>
+            </a:r>
+            <a:r>
+              <a:rPr lang="es-ES_tradnl" sz="1800" dirty="0" err="1">
+                <a:latin typeface="Source Code Pro"/>
+                <a:cs typeface="Source Code Pro"/>
+              </a:rPr>
+              <a:t>toString</a:t>
+            </a:r>
+            <a:r>
+              <a:rPr lang="es-ES_tradnl" sz="1800" dirty="0">
+                <a:latin typeface="Source Code Pro"/>
+                <a:cs typeface="Source Code Pro"/>
+              </a:rPr>
+              <a:t>()), 5000 </a:t>
+            </a:r>
+            <a:r>
+              <a:rPr lang="es-ES_tradnl" sz="1800" dirty="0" err="1">
+                <a:latin typeface="Source Code Pro"/>
+                <a:cs typeface="Source Code Pro"/>
+              </a:rPr>
+              <a:t>milliseconds</a:t>
+            </a:r>
+            <a:r>
+              <a:rPr lang="es-ES_tradnl" sz="1800" dirty="0">
+                <a:latin typeface="Source Code Pro"/>
+                <a:cs typeface="Source Code Pro"/>
+              </a:rPr>
+              <a:t>)</a:t>
+            </a:r>
+          </a:p>
+          <a:p>
+            <a:pPr marL="0" indent="0">
+              <a:buNone/>
+            </a:pPr>
+            <a:r>
+              <a:rPr lang="es-ES_tradnl" sz="1800" dirty="0">
+                <a:latin typeface="Source Code Pro"/>
+                <a:cs typeface="Source Code Pro"/>
+              </a:rPr>
+              <a:t>      }</a:t>
+            </a:r>
+          </a:p>
+          <a:p>
+            <a:pPr marL="0" indent="0">
+              <a:buNone/>
+            </a:pPr>
+            <a:endParaRPr lang="es-ES_tradnl" sz="1800" dirty="0">
+              <a:latin typeface="Source Code Pro"/>
+              <a:cs typeface="Source Code Pro"/>
+            </a:endParaRPr>
+          </a:p>
+          <a:p>
+            <a:pPr marL="0" indent="0">
+              <a:buNone/>
+            </a:pPr>
+            <a:r>
+              <a:rPr lang="es-ES_tradnl" sz="1800" dirty="0">
+                <a:latin typeface="Source Code Pro"/>
+                <a:cs typeface="Source Code Pro"/>
+              </a:rPr>
+              <a:t>      val in = </a:t>
+            </a:r>
+            <a:r>
+              <a:rPr lang="es-ES_tradnl" sz="1800" dirty="0" err="1">
+                <a:latin typeface="Source Code Pro"/>
+                <a:cs typeface="Source Code Pro"/>
+              </a:rPr>
+              <a:t>Iteratee.foreach</a:t>
+            </a:r>
+            <a:r>
+              <a:rPr lang="es-ES_tradnl" sz="1800" dirty="0">
+                <a:latin typeface="Source Code Pro"/>
+                <a:cs typeface="Source Code Pro"/>
+              </a:rPr>
+              <a:t>[</a:t>
+            </a:r>
+            <a:r>
+              <a:rPr lang="es-ES_tradnl" sz="1800" dirty="0" err="1">
+                <a:latin typeface="Source Code Pro"/>
+                <a:cs typeface="Source Code Pro"/>
+              </a:rPr>
+              <a:t>String</a:t>
+            </a:r>
+            <a:r>
+              <a:rPr lang="es-ES_tradnl" sz="1800" dirty="0">
+                <a:latin typeface="Source Code Pro"/>
+                <a:cs typeface="Source Code Pro"/>
+              </a:rPr>
+              <a:t>] { </a:t>
+            </a:r>
+            <a:r>
+              <a:rPr lang="es-ES_tradnl" sz="1800" dirty="0" err="1">
+                <a:latin typeface="Source Code Pro"/>
+                <a:cs typeface="Source Code Pro"/>
+              </a:rPr>
+              <a:t>message</a:t>
+            </a:r>
+            <a:r>
+              <a:rPr lang="es-ES_tradnl" sz="1800" dirty="0">
+                <a:latin typeface="Source Code Pro"/>
+                <a:cs typeface="Source Code Pro"/>
+              </a:rPr>
+              <a:t> =</a:t>
+            </a:r>
+            <a:r>
+              <a:rPr lang="es-ES_tradnl" sz="1800" dirty="0" smtClean="0">
+                <a:latin typeface="Source Code Pro"/>
+                <a:cs typeface="Source Code Pro"/>
+              </a:rPr>
+              <a:t>&gt;</a:t>
+            </a:r>
+          </a:p>
+          <a:p>
+            <a:pPr marL="0" indent="0">
+              <a:buNone/>
+            </a:pPr>
+            <a:r>
+              <a:rPr lang="es-ES_tradnl" sz="1800" dirty="0">
+                <a:latin typeface="Source Code Pro"/>
+                <a:cs typeface="Source Code Pro"/>
+              </a:rPr>
+              <a:t>	</a:t>
+            </a:r>
+            <a:r>
+              <a:rPr lang="es-ES_tradnl" sz="1800" dirty="0" smtClean="0">
+                <a:latin typeface="Source Code Pro"/>
+                <a:cs typeface="Source Code Pro"/>
+              </a:rPr>
+              <a:t>		</a:t>
+            </a:r>
+            <a:r>
+              <a:rPr lang="es-ES_tradnl" sz="1800" dirty="0" err="1" smtClean="0">
+                <a:latin typeface="Source Code Pro"/>
+                <a:cs typeface="Source Code Pro"/>
+              </a:rPr>
+              <a:t>println</a:t>
+            </a:r>
+            <a:r>
+              <a:rPr lang="es-ES_tradnl" sz="1800" dirty="0">
+                <a:latin typeface="Source Code Pro"/>
+                <a:cs typeface="Source Code Pro"/>
+              </a:rPr>
+              <a:t>(</a:t>
+            </a:r>
+            <a:r>
+              <a:rPr lang="es-ES_tradnl" sz="1800" dirty="0" err="1">
+                <a:latin typeface="Source Code Pro"/>
+                <a:cs typeface="Source Code Pro"/>
+              </a:rPr>
+              <a:t>message</a:t>
+            </a:r>
+            <a:r>
+              <a:rPr lang="es-ES_tradnl" sz="1800" dirty="0">
+                <a:latin typeface="Source Code Pro"/>
+                <a:cs typeface="Source Code Pro"/>
+              </a:rPr>
+              <a:t>) </a:t>
+            </a:r>
+            <a:endParaRPr lang="es-ES_tradnl" sz="1800" dirty="0" smtClean="0">
+              <a:latin typeface="Source Code Pro"/>
+              <a:cs typeface="Source Code Pro"/>
+            </a:endParaRPr>
+          </a:p>
+          <a:p>
+            <a:pPr marL="0" indent="0">
+              <a:buNone/>
+            </a:pPr>
+            <a:r>
+              <a:rPr lang="es-ES_tradnl" sz="1800" dirty="0">
+                <a:latin typeface="Source Code Pro"/>
+                <a:cs typeface="Source Code Pro"/>
+              </a:rPr>
+              <a:t>	</a:t>
+            </a:r>
+            <a:r>
+              <a:rPr lang="es-ES_tradnl" sz="1800" dirty="0" smtClean="0">
+                <a:latin typeface="Source Code Pro"/>
+                <a:cs typeface="Source Code Pro"/>
+              </a:rPr>
+              <a:t>	}</a:t>
+            </a:r>
+            <a:endParaRPr lang="es-ES_tradnl" sz="1800" dirty="0">
+              <a:latin typeface="Source Code Pro"/>
+              <a:cs typeface="Source Code Pro"/>
+            </a:endParaRPr>
+          </a:p>
+          <a:p>
+            <a:pPr marL="0" indent="0">
+              <a:buNone/>
+            </a:pPr>
+            <a:endParaRPr lang="es-ES_tradnl" sz="1800" dirty="0">
+              <a:latin typeface="Source Code Pro"/>
+              <a:cs typeface="Source Code Pro"/>
+            </a:endParaRPr>
+          </a:p>
+          <a:p>
+            <a:pPr marL="0" indent="0">
+              <a:buNone/>
+            </a:pPr>
+            <a:r>
+              <a:rPr lang="es-ES_tradnl" sz="1800" dirty="0">
+                <a:latin typeface="Source Code Pro"/>
+                <a:cs typeface="Source Code Pro"/>
+              </a:rPr>
+              <a:t>      (in, </a:t>
+            </a:r>
+            <a:r>
+              <a:rPr lang="es-ES_tradnl" sz="1800" dirty="0" err="1">
+                <a:latin typeface="Source Code Pro"/>
+                <a:cs typeface="Source Code Pro"/>
+              </a:rPr>
+              <a:t>timeEnumerator</a:t>
+            </a:r>
+            <a:r>
+              <a:rPr lang="es-ES_tradnl" sz="1800" dirty="0">
+                <a:latin typeface="Source Code Pro"/>
+                <a:cs typeface="Source Code Pro"/>
+              </a:rPr>
+              <a:t>)</a:t>
+            </a:r>
+          </a:p>
+          <a:p>
+            <a:pPr marL="0" indent="0">
+              <a:buNone/>
+            </a:pPr>
+            <a:r>
+              <a:rPr lang="es-ES_tradnl" sz="1800" dirty="0">
+                <a:latin typeface="Source Code Pro"/>
+                <a:cs typeface="Source Code Pro"/>
+              </a:rPr>
+              <a:t>    }</a:t>
+            </a:r>
+          </a:p>
+          <a:p>
+            <a:pPr marL="0" indent="0">
+              <a:buNone/>
+            </a:pPr>
+            <a:r>
+              <a:rPr lang="es-ES_tradnl" sz="1800" dirty="0">
+                <a:latin typeface="Source Code Pro"/>
+                <a:cs typeface="Source Code Pro"/>
+              </a:rPr>
+              <a:t>  }</a:t>
+            </a:r>
+            <a:endParaRPr lang="es-ES_tradnl" sz="1800" dirty="0">
+              <a:latin typeface="Source Code Pro"/>
+              <a:cs typeface="Source Code Pro"/>
+            </a:endParaRPr>
+          </a:p>
+        </p:txBody>
+      </p:sp>
+    </p:spTree>
+    <p:extLst>
+      <p:ext uri="{BB962C8B-B14F-4D97-AF65-F5344CB8AC3E}">
+        <p14:creationId xmlns:p14="http://schemas.microsoft.com/office/powerpoint/2010/main" val="2608260262"/>
+      </p:ext>
+    </p:extLst>
+  </p:cSld>
+  <p:clrMapOvr>
+    <a:masterClrMapping/>
+  </p:clrMapOvr>
+  <p:timing>
+    <p:tnLst>
+      <p:par>
+        <p:cTn xmlns:p14="http://schemas.microsoft.com/office/powerpoint/2010/main" id="1" dur="indefinite" restart="never" nodeType="tmRoot"/>
+      </p:par>
+    </p:tnLst>
+  </p:timing>
+</p:sld>
+</file>
+
+<file path=ppt/slides/slide33.xml><?xml version="1.0" encoding="utf-8"?>
+<p:sld xmlns:a="http://schemas.openxmlformats.org/drawingml/2006/main" xmlns:r="http://schemas.openxmlformats.org/officeDocument/2006/relationships" xmlns:p="http://schemas.openxmlformats.org/presentationml/2006/main">
+  <p:cSld>
+    <p:spTree>
+      <p:nvGrpSpPr>
+        <p:cNvPr id="1" name=""/>
+        <p:cNvGrpSpPr/>
+        <p:nvPr/>
+      </p:nvGrpSpPr>
+      <p:grpSpPr>
+        <a:xfrm>
+          <a:off x="0" y="0"/>
+          <a:ext cx="0" cy="0"/>
+          <a:chOff x="0" y="0"/>
+          <a:chExt cx="0" cy="0"/>
+        </a:xfrm>
+      </p:grpSpPr>
+      <p:pic>
+        <p:nvPicPr>
+          <p:cNvPr id="4" name="Picture 3"/>
+          <p:cNvPicPr>
+            <a:picLocks noChangeAspect="1"/>
+          </p:cNvPicPr>
+          <p:nvPr/>
+        </p:nvPicPr>
+        <p:blipFill rotWithShape="1">
+          <a:blip r:embed="rId3"/>
+          <a:srcRect l="-185" r="4353"/>
+          <a:stretch/>
+        </p:blipFill>
+        <p:spPr>
+          <a:xfrm>
+            <a:off x="-559301" y="0"/>
+            <a:ext cx="9703302" cy="6865331"/>
+          </a:xfrm>
+          <a:prstGeom prst="rect">
+            <a:avLst/>
+          </a:prstGeom>
+        </p:spPr>
+      </p:pic>
+      <p:sp>
+        <p:nvSpPr>
+          <p:cNvPr id="3" name="Content Placeholder 2"/>
+          <p:cNvSpPr>
+            <a:spLocks noGrp="1"/>
+          </p:cNvSpPr>
+          <p:nvPr>
+            <p:ph idx="1"/>
+          </p:nvPr>
+        </p:nvSpPr>
+        <p:spPr>
+          <a:xfrm>
+            <a:off x="-540568" y="4293097"/>
+            <a:ext cx="9684568" cy="1440159"/>
+          </a:xfrm>
+          <a:solidFill>
+            <a:srgbClr val="D5D0D6">
+              <a:alpha val="78039"/>
+            </a:srgbClr>
+          </a:solidFill>
+        </p:spPr>
+        <p:txBody>
+          <a:bodyPr vert="horz" lIns="91440" tIns="45720" rIns="91440" bIns="45720" rtlCol="0" anchor="ctr" anchorCtr="0">
+            <a:normAutofit/>
+          </a:bodyPr>
+          <a:lstStyle/>
+          <a:p>
+            <a:pPr marL="0" indent="0" algn="ctr">
+              <a:buNone/>
+            </a:pPr>
+            <a:r>
+              <a:rPr lang="en-US" sz="4000" dirty="0">
+                <a:solidFill>
+                  <a:schemeClr val="bg1">
+                    <a:lumMod val="75000"/>
+                  </a:schemeClr>
+                </a:solidFill>
+                <a:cs typeface="Arial"/>
+              </a:rPr>
+              <a:t>Demo: </a:t>
+            </a:r>
+            <a:r>
+              <a:rPr lang="en-US" sz="4000" dirty="0" smtClean="0">
+                <a:solidFill>
+                  <a:schemeClr val="bg1">
+                    <a:lumMod val="75000"/>
+                  </a:schemeClr>
+                </a:solidFill>
+                <a:cs typeface="Arial"/>
+              </a:rPr>
+              <a:t>Reactive IO</a:t>
+            </a:r>
+            <a:endParaRPr lang="en-US" sz="4000" dirty="0">
+              <a:solidFill>
+                <a:schemeClr val="bg1">
+                  <a:lumMod val="75000"/>
+                </a:schemeClr>
+              </a:solidFill>
+              <a:cs typeface="Arial"/>
+            </a:endParaRPr>
+          </a:p>
+        </p:txBody>
+      </p:sp>
+    </p:spTree>
+    <p:extLst>
+      <p:ext uri="{BB962C8B-B14F-4D97-AF65-F5344CB8AC3E}">
+        <p14:creationId xmlns:p14="http://schemas.microsoft.com/office/powerpoint/2010/main" val="1183518611"/>
+      </p:ext>
+    </p:extLst>
+  </p:cSld>
+  <p:clrMapOvr>
+    <a:masterClrMapping/>
+  </p:clrMapOvr>
+</p:sld>
+</file>
+
+<file path=ppt/slides/slide34.xml><?xml version="1.0" encoding="utf-8"?>
+<p:sld xmlns:a="http://schemas.openxmlformats.org/drawingml/2006/main" xmlns:r="http://schemas.openxmlformats.org/officeDocument/2006/relationships" xmlns:p="http://schemas.openxmlformats.org/presentationml/2006/main">
+  <p:cSld>
+    <p:spTree>
+      <p:nvGrpSpPr>
+        <p:cNvPr id="1" name=""/>
+        <p:cNvGrpSpPr/>
+        <p:nvPr/>
+      </p:nvGrpSpPr>
+      <p:grpSpPr>
+        <a:xfrm>
+          <a:off x="0" y="0"/>
+          <a:ext cx="0" cy="0"/>
+          <a:chOff x="0" y="0"/>
+          <a:chExt cx="0" cy="0"/>
+        </a:xfrm>
+      </p:grpSpPr>
+      <p:sp>
+        <p:nvSpPr>
+          <p:cNvPr id="2" name="Title 1"/>
+          <p:cNvSpPr>
+            <a:spLocks noGrp="1"/>
+          </p:cNvSpPr>
+          <p:nvPr>
+            <p:ph type="title"/>
+          </p:nvPr>
+        </p:nvSpPr>
+        <p:spPr/>
+        <p:txBody>
+          <a:bodyPr>
+            <a:normAutofit fontScale="90000"/>
+          </a:bodyPr>
+          <a:lstStyle/>
+          <a:p>
+            <a:r>
+              <a:rPr lang="en-US" dirty="0" smtClean="0"/>
+              <a:t>A glimpse of the </a:t>
+            </a:r>
+            <a:r>
+              <a:rPr lang="en-US" dirty="0" smtClean="0"/>
+              <a:t>future: Reactive Mongo</a:t>
+            </a:r>
+            <a:endParaRPr lang="en-US" dirty="0"/>
+          </a:p>
+        </p:txBody>
+      </p:sp>
+      <p:sp>
+        <p:nvSpPr>
+          <p:cNvPr id="3" name="Content Placeholder 2"/>
+          <p:cNvSpPr>
+            <a:spLocks noGrp="1"/>
+          </p:cNvSpPr>
+          <p:nvPr>
+            <p:ph idx="1"/>
+          </p:nvPr>
+        </p:nvSpPr>
+        <p:spPr/>
+        <p:txBody>
+          <a:bodyPr anchor="ctr">
+            <a:noAutofit/>
+          </a:bodyPr>
+          <a:lstStyle/>
+          <a:p>
+            <a:pPr marL="0" indent="0">
+              <a:buNone/>
+            </a:pPr>
+            <a:r>
+              <a:rPr lang="en-US" sz="2000" dirty="0" err="1">
+                <a:latin typeface="Source Code Pro"/>
+                <a:cs typeface="Source Code Pro"/>
+              </a:rPr>
+              <a:t>val</a:t>
+            </a:r>
+            <a:r>
+              <a:rPr lang="en-US" sz="2000" dirty="0">
+                <a:latin typeface="Source Code Pro"/>
+                <a:cs typeface="Source Code Pro"/>
+              </a:rPr>
+              <a:t> cursor = </a:t>
+            </a:r>
+            <a:r>
+              <a:rPr lang="en-US" sz="2000" dirty="0" err="1">
+                <a:latin typeface="Source Code Pro"/>
+                <a:cs typeface="Source Code Pro"/>
+              </a:rPr>
+              <a:t>collection.find</a:t>
+            </a:r>
+            <a:r>
+              <a:rPr lang="en-US" sz="2000" dirty="0">
+                <a:latin typeface="Source Code Pro"/>
+                <a:cs typeface="Source Code Pro"/>
+              </a:rPr>
+              <a:t>(query) </a:t>
+            </a:r>
+            <a:endParaRPr lang="en-US" sz="2000" dirty="0" smtClean="0">
+              <a:latin typeface="Source Code Pro"/>
+              <a:cs typeface="Source Code Pro"/>
+            </a:endParaRPr>
+          </a:p>
+          <a:p>
+            <a:pPr marL="0" indent="0">
+              <a:buNone/>
+            </a:pPr>
+            <a:r>
+              <a:rPr lang="en-US" sz="2000" dirty="0" err="1" smtClean="0">
+                <a:latin typeface="Source Code Pro"/>
+                <a:cs typeface="Source Code Pro"/>
+              </a:rPr>
+              <a:t>val</a:t>
+            </a:r>
+            <a:r>
+              <a:rPr lang="en-US" sz="2000" dirty="0" smtClean="0">
+                <a:latin typeface="Source Code Pro"/>
+                <a:cs typeface="Source Code Pro"/>
+              </a:rPr>
+              <a:t> </a:t>
+            </a:r>
+            <a:r>
+              <a:rPr lang="en-US" sz="2000" dirty="0" err="1">
+                <a:latin typeface="Source Code Pro"/>
+                <a:cs typeface="Source Code Pro"/>
+              </a:rPr>
+              <a:t>futureListOfArticles</a:t>
+            </a:r>
+            <a:r>
+              <a:rPr lang="en-US" sz="2000" dirty="0">
+                <a:latin typeface="Source Code Pro"/>
+                <a:cs typeface="Source Code Pro"/>
+              </a:rPr>
+              <a:t> :Future[List[</a:t>
+            </a:r>
+            <a:r>
+              <a:rPr lang="en-US" sz="2000" dirty="0" smtClean="0">
+                <a:latin typeface="Source Code Pro"/>
+                <a:cs typeface="Source Code Pro"/>
+              </a:rPr>
+              <a:t>Article</a:t>
+            </a:r>
+            <a:r>
+              <a:rPr lang="en-US" sz="2000" dirty="0">
+                <a:latin typeface="Source Code Pro"/>
+                <a:cs typeface="Source Code Pro"/>
+              </a:rPr>
+              <a:t>]] = </a:t>
+            </a:r>
+            <a:r>
+              <a:rPr lang="en-US" sz="2000" dirty="0" err="1">
+                <a:latin typeface="Source Code Pro"/>
+                <a:cs typeface="Source Code Pro"/>
+              </a:rPr>
+              <a:t>cursor.toList</a:t>
+            </a:r>
+            <a:endParaRPr lang="en-US" sz="2000" dirty="0">
+              <a:latin typeface="Source Code Pro"/>
+              <a:cs typeface="Source Code Pro"/>
+            </a:endParaRPr>
+          </a:p>
+          <a:p>
+            <a:pPr marL="0" indent="0">
+              <a:buNone/>
+            </a:pPr>
+            <a:r>
+              <a:rPr lang="en-US" sz="2000" dirty="0" err="1">
+                <a:latin typeface="Source Code Pro"/>
+                <a:cs typeface="Source Code Pro"/>
+              </a:rPr>
+              <a:t>futureListOfArticles.onSuccess</a:t>
+            </a:r>
+            <a:r>
+              <a:rPr lang="en-US" sz="2000" dirty="0">
+                <a:latin typeface="Source Code Pro"/>
+                <a:cs typeface="Source Code Pro"/>
+              </a:rPr>
+              <a:t> { articles =&gt;</a:t>
+            </a:r>
+          </a:p>
+          <a:p>
+            <a:pPr marL="0" indent="0">
+              <a:buNone/>
+            </a:pPr>
+            <a:r>
+              <a:rPr lang="en-US" sz="2000" dirty="0">
+                <a:latin typeface="Source Code Pro"/>
+                <a:cs typeface="Source Code Pro"/>
+              </a:rPr>
+              <a:t>  for(article &lt;- articles)</a:t>
+            </a:r>
+          </a:p>
+          <a:p>
+            <a:pPr marL="0" indent="0">
+              <a:buNone/>
+            </a:pPr>
+            <a:r>
+              <a:rPr lang="en-US" sz="2000" dirty="0">
+                <a:latin typeface="Source Code Pro"/>
+                <a:cs typeface="Source Code Pro"/>
+              </a:rPr>
+              <a:t>    </a:t>
+            </a:r>
+            <a:r>
+              <a:rPr lang="en-US" sz="2000" dirty="0" err="1">
+                <a:latin typeface="Source Code Pro"/>
+                <a:cs typeface="Source Code Pro"/>
+              </a:rPr>
+              <a:t>println</a:t>
+            </a:r>
+            <a:r>
+              <a:rPr lang="en-US" sz="2000" dirty="0">
+                <a:latin typeface="Source Code Pro"/>
+                <a:cs typeface="Source Code Pro"/>
+              </a:rPr>
+              <a:t>("found article: " + article)</a:t>
+            </a:r>
+          </a:p>
+          <a:p>
+            <a:pPr marL="0" indent="0">
+              <a:buNone/>
+            </a:pPr>
+            <a:r>
+              <a:rPr lang="en-US" sz="2000" dirty="0">
+                <a:latin typeface="Source Code Pro"/>
+                <a:cs typeface="Source Code Pro"/>
+              </a:rPr>
+              <a:t>}</a:t>
+            </a:r>
+            <a:endParaRPr lang="en-US" sz="2000" dirty="0">
+              <a:latin typeface="Source Code Pro"/>
+              <a:cs typeface="Source Code Pro"/>
+            </a:endParaRPr>
           </a:p>
         </p:txBody>
       </p:sp>
@@ -11377,7 +14321,7 @@
 </p:sld>
 </file>
 
-<file path=ppt/slides/slide31.xml><?xml version="1.0" encoding="utf-8"?>
+<file path=ppt/slides/slide35.xml><?xml version="1.0" encoding="utf-8"?>
 <p:sld xmlns:a="http://schemas.openxmlformats.org/drawingml/2006/main" xmlns:r="http://schemas.openxmlformats.org/officeDocument/2006/relationships" xmlns:p="http://schemas.openxmlformats.org/presentationml/2006/main">
   <p:cSld>
     <p:spTree>
@@ -11902,7 +14846,7 @@
 </p:sld>
 </file>
 
-<file path=ppt/slides/slide32.xml><?xml version="1.0" encoding="utf-8"?>
+<file path=ppt/slides/slide36.xml><?xml version="1.0" encoding="utf-8"?>
 <p:sld xmlns:a="http://schemas.openxmlformats.org/drawingml/2006/main" xmlns:r="http://schemas.openxmlformats.org/officeDocument/2006/relationships" xmlns:p="http://schemas.openxmlformats.org/presentationml/2006/main">
   <p:cSld>
     <p:spTree>
@@ -12650,7 +15594,168 @@
 </p:sld>
 </file>
 
-<file path=ppt/slides/slide33.xml><?xml version="1.0" encoding="utf-8"?>
+<file path=ppt/slides/slide37.xml><?xml version="1.0" encoding="utf-8"?>
+<p:sld xmlns:a="http://schemas.openxmlformats.org/drawingml/2006/main" xmlns:r="http://schemas.openxmlformats.org/officeDocument/2006/relationships" xmlns:p="http://schemas.openxmlformats.org/presentationml/2006/main">
+  <p:cSld>
+    <p:spTree>
+      <p:nvGrpSpPr>
+        <p:cNvPr id="1" name=""/>
+        <p:cNvGrpSpPr/>
+        <p:nvPr/>
+      </p:nvGrpSpPr>
+      <p:grpSpPr>
+        <a:xfrm>
+          <a:off x="0" y="0"/>
+          <a:ext cx="0" cy="0"/>
+          <a:chOff x="0" y="0"/>
+          <a:chExt cx="0" cy="0"/>
+        </a:xfrm>
+      </p:grpSpPr>
+      <p:sp>
+        <p:nvSpPr>
+          <p:cNvPr id="2" name="Title 1"/>
+          <p:cNvSpPr>
+            <a:spLocks noGrp="1"/>
+          </p:cNvSpPr>
+          <p:nvPr>
+            <p:ph type="title"/>
+          </p:nvPr>
+        </p:nvSpPr>
+        <p:spPr/>
+        <p:txBody>
+          <a:bodyPr/>
+          <a:lstStyle/>
+          <a:p>
+            <a:r>
+              <a:rPr lang="en-US" dirty="0" err="1" smtClean="0"/>
+              <a:t>Github</a:t>
+            </a:r>
+            <a:r>
+              <a:rPr lang="en-US" dirty="0" smtClean="0"/>
+              <a:t> repo or it didn’t happen</a:t>
+            </a:r>
+            <a:endParaRPr lang="en-US" dirty="0"/>
+          </a:p>
+        </p:txBody>
+      </p:sp>
+      <p:sp>
+        <p:nvSpPr>
+          <p:cNvPr id="4" name="Rectangle 3"/>
+          <p:cNvSpPr/>
+          <p:nvPr/>
+        </p:nvSpPr>
+        <p:spPr>
+          <a:xfrm>
+            <a:off x="0" y="2996952"/>
+            <a:ext cx="9144000" cy="1656184"/>
+          </a:xfrm>
+          <a:prstGeom prst="rect">
+            <a:avLst/>
+          </a:prstGeom>
+          <a:solidFill>
+            <a:srgbClr val="D5D0D6">
+              <a:alpha val="78039"/>
+            </a:srgbClr>
+          </a:solidFill>
+        </p:spPr>
+        <p:txBody>
+          <a:bodyPr vert="horz" lIns="91440" tIns="108000" rIns="91440" bIns="295200" rtlCol="0" anchor="ctr" anchorCtr="0">
+            <a:noAutofit/>
+          </a:bodyPr>
+          <a:lstStyle/>
+          <a:p>
+            <a:pPr algn="ctr" defTabSz="457200" eaLnBrk="1" hangingPunct="1">
+              <a:lnSpc>
+                <a:spcPct val="130000"/>
+              </a:lnSpc>
+              <a:spcBef>
+                <a:spcPct val="20000"/>
+              </a:spcBef>
+              <a:buFont typeface="Arial"/>
+              <a:buNone/>
+            </a:pPr>
+            <a:r>
+              <a:rPr lang="en-US" sz="4400" dirty="0">
+                <a:solidFill>
+                  <a:schemeClr val="bg1">
+                    <a:lumMod val="75000"/>
+                  </a:schemeClr>
+                </a:solidFill>
+                <a:latin typeface="Calluna Sans" pitchFamily="50" charset="0"/>
+                <a:ea typeface="+mn-ea"/>
+                <a:cs typeface="Arial"/>
+              </a:rPr>
+              <a:t>https://</a:t>
+            </a:r>
+            <a:r>
+              <a:rPr lang="en-US" sz="4400" dirty="0" err="1">
+                <a:solidFill>
+                  <a:schemeClr val="bg1">
+                    <a:lumMod val="75000"/>
+                  </a:schemeClr>
+                </a:solidFill>
+                <a:latin typeface="Calluna Sans" pitchFamily="50" charset="0"/>
+                <a:ea typeface="+mn-ea"/>
+                <a:cs typeface="Arial"/>
+              </a:rPr>
+              <a:t>github.com</a:t>
+            </a:r>
+            <a:r>
+              <a:rPr lang="en-US" sz="4400" dirty="0">
+                <a:solidFill>
+                  <a:schemeClr val="bg1">
+                    <a:lumMod val="75000"/>
+                  </a:schemeClr>
+                </a:solidFill>
+                <a:latin typeface="Calluna Sans" pitchFamily="50" charset="0"/>
+                <a:ea typeface="+mn-ea"/>
+                <a:cs typeface="Arial"/>
+              </a:rPr>
+              <a:t>/</a:t>
+            </a:r>
+            <a:r>
+              <a:rPr lang="en-US" sz="4400" dirty="0" err="1">
+                <a:solidFill>
+                  <a:schemeClr val="bg1">
+                    <a:lumMod val="75000"/>
+                  </a:schemeClr>
+                </a:solidFill>
+                <a:latin typeface="Calluna Sans" pitchFamily="50" charset="0"/>
+                <a:ea typeface="+mn-ea"/>
+                <a:cs typeface="Arial"/>
+              </a:rPr>
+              <a:t>oscarrenalias</a:t>
+            </a:r>
+            <a:r>
+              <a:rPr lang="en-US" sz="4400" dirty="0">
+                <a:solidFill>
+                  <a:schemeClr val="bg1">
+                    <a:lumMod val="75000"/>
+                  </a:schemeClr>
+                </a:solidFill>
+                <a:latin typeface="Calluna Sans" pitchFamily="50" charset="0"/>
+                <a:ea typeface="+mn-ea"/>
+                <a:cs typeface="Arial"/>
+              </a:rPr>
+              <a:t>/wjax-2012-play-async-apps</a:t>
+            </a:r>
+          </a:p>
+        </p:txBody>
+      </p:sp>
+    </p:spTree>
+    <p:extLst>
+      <p:ext uri="{BB962C8B-B14F-4D97-AF65-F5344CB8AC3E}">
+        <p14:creationId xmlns:p14="http://schemas.microsoft.com/office/powerpoint/2010/main" val="3897917046"/>
+      </p:ext>
+    </p:extLst>
+  </p:cSld>
+  <p:clrMapOvr>
+    <a:masterClrMapping/>
+  </p:clrMapOvr>
+</p:sld>
+</file>
+
+<file path=ppt/slides/slide38.xml><?xml version="1.0" encoding="utf-8"?>
 <p:sld xmlns:a="http://schemas.openxmlformats.org/drawingml/2006/main" xmlns:r="http://schemas.openxmlformats.org/officeDocument/2006/relationships" xmlns:p="http://schemas.openxmlformats.org/presentationml/2006/main">
   <p:cSld>
     <p:spTree>
@@ -12758,7 +15863,7 @@
 </p:sld>
 </file>
 
-<file path=ppt/slides/slide34.xml><?xml version="1.0" encoding="utf-8"?>
+<file path=ppt/slides/slide39.xml><?xml version="1.0" encoding="utf-8"?>
 <p:sld xmlns:a="http://schemas.openxmlformats.org/drawingml/2006/main" xmlns:r="http://schemas.openxmlformats.org/officeDocument/2006/relationships" xmlns:p="http://schemas.openxmlformats.org/presentationml/2006/main">
   <p:cSld>
     <p:spTree>
@@ -12812,237 +15917,6 @@
     <p:extLst>
       <p:ext uri="{BB962C8B-B14F-4D97-AF65-F5344CB8AC3E}">
         <p14:creationId xmlns:p14="http://schemas.microsoft.com/office/powerpoint/2010/main" val="1414630886"/>
-      </p:ext>
-    </p:extLst>
-  </p:cSld>
-  <p:clrMapOvr>
-    <a:masterClrMapping/>
-  </p:clrMapOvr>
-  <p:timing>
-    <p:tnLst>
-      <p:par>
-        <p:cTn xmlns:p14="http://schemas.microsoft.com/office/powerpoint/2010/main" id="1" dur="indefinite" restart="never" nodeType="tmRoot"/>
-      </p:par>
-    </p:tnLst>
-  </p:timing>
-</p:sld>
-</file>
-
-<file path=ppt/slides/slide35.xml><?xml version="1.0" encoding="utf-8"?>
-<p:sld xmlns:a="http://schemas.openxmlformats.org/drawingml/2006/main" xmlns:r="http://schemas.openxmlformats.org/officeDocument/2006/relationships" xmlns:p="http://schemas.openxmlformats.org/presentationml/2006/main">
-  <p:cSld>
-    <p:spTree>
-      <p:nvGrpSpPr>
-        <p:cNvPr id="1" name=""/>
-        <p:cNvGrpSpPr/>
-        <p:nvPr/>
-      </p:nvGrpSpPr>
-      <p:grpSpPr>
-        <a:xfrm>
-          <a:off x="0" y="0"/>
-          <a:ext cx="0" cy="0"/>
-          <a:chOff x="0" y="0"/>
-          <a:chExt cx="0" cy="0"/>
-        </a:xfrm>
-      </p:grpSpPr>
-      <p:sp>
-        <p:nvSpPr>
-          <p:cNvPr id="2" name="Title 1"/>
-          <p:cNvSpPr>
-            <a:spLocks noGrp="1"/>
-          </p:cNvSpPr>
-          <p:nvPr>
-            <p:ph type="title"/>
-          </p:nvPr>
-        </p:nvSpPr>
-        <p:spPr/>
-        <p:txBody>
-          <a:bodyPr/>
-          <a:lstStyle/>
-          <a:p>
-            <a:r>
-              <a:rPr lang="en-US" dirty="0" err="1" smtClean="0"/>
-              <a:t>Github</a:t>
-            </a:r>
-            <a:r>
-              <a:rPr lang="en-US" dirty="0" smtClean="0"/>
-              <a:t> repo or it didn’t happen</a:t>
-            </a:r>
-            <a:endParaRPr lang="en-US" dirty="0"/>
-          </a:p>
-        </p:txBody>
-      </p:sp>
-      <p:sp>
-        <p:nvSpPr>
-          <p:cNvPr id="4" name="Rectangle 3"/>
-          <p:cNvSpPr/>
-          <p:nvPr/>
-        </p:nvSpPr>
-        <p:spPr>
-          <a:xfrm>
-            <a:off x="0" y="2996952"/>
-            <a:ext cx="9144000" cy="1656184"/>
-          </a:xfrm>
-          <a:prstGeom prst="rect">
-            <a:avLst/>
-          </a:prstGeom>
-          <a:solidFill>
-            <a:srgbClr val="D5D0D6">
-              <a:alpha val="78039"/>
-            </a:srgbClr>
-          </a:solidFill>
-        </p:spPr>
-        <p:txBody>
-          <a:bodyPr vert="horz" lIns="91440" tIns="108000" rIns="91440" bIns="295200" rtlCol="0" anchor="ctr" anchorCtr="0">
-            <a:noAutofit/>
-          </a:bodyPr>
-          <a:lstStyle/>
-          <a:p>
-            <a:pPr algn="ctr" defTabSz="457200" eaLnBrk="1" hangingPunct="1">
-              <a:lnSpc>
-                <a:spcPct val="130000"/>
-              </a:lnSpc>
-              <a:spcBef>
-                <a:spcPct val="20000"/>
-              </a:spcBef>
-              <a:buFont typeface="Arial"/>
-              <a:buNone/>
-            </a:pPr>
-            <a:r>
-              <a:rPr lang="en-US" sz="4400" dirty="0">
-                <a:solidFill>
-                  <a:schemeClr val="bg1">
-                    <a:lumMod val="75000"/>
-                  </a:schemeClr>
-                </a:solidFill>
-                <a:latin typeface="Calluna Sans" pitchFamily="50" charset="0"/>
-                <a:ea typeface="+mn-ea"/>
-                <a:cs typeface="Arial"/>
-              </a:rPr>
-              <a:t>https://</a:t>
-            </a:r>
-            <a:r>
-              <a:rPr lang="en-US" sz="4400" dirty="0" err="1">
-                <a:solidFill>
-                  <a:schemeClr val="bg1">
-                    <a:lumMod val="75000"/>
-                  </a:schemeClr>
-                </a:solidFill>
-                <a:latin typeface="Calluna Sans" pitchFamily="50" charset="0"/>
-                <a:ea typeface="+mn-ea"/>
-                <a:cs typeface="Arial"/>
-              </a:rPr>
-              <a:t>github.com</a:t>
-            </a:r>
-            <a:r>
-              <a:rPr lang="en-US" sz="4400" dirty="0">
-                <a:solidFill>
-                  <a:schemeClr val="bg1">
-                    <a:lumMod val="75000"/>
-                  </a:schemeClr>
-                </a:solidFill>
-                <a:latin typeface="Calluna Sans" pitchFamily="50" charset="0"/>
-                <a:ea typeface="+mn-ea"/>
-                <a:cs typeface="Arial"/>
-              </a:rPr>
-              <a:t>/</a:t>
-            </a:r>
-            <a:r>
-              <a:rPr lang="en-US" sz="4400" dirty="0" err="1">
-                <a:solidFill>
-                  <a:schemeClr val="bg1">
-                    <a:lumMod val="75000"/>
-                  </a:schemeClr>
-                </a:solidFill>
-                <a:latin typeface="Calluna Sans" pitchFamily="50" charset="0"/>
-                <a:ea typeface="+mn-ea"/>
-                <a:cs typeface="Arial"/>
-              </a:rPr>
-              <a:t>oscarrenalias</a:t>
-            </a:r>
-            <a:r>
-              <a:rPr lang="en-US" sz="4400" dirty="0">
-                <a:solidFill>
-                  <a:schemeClr val="bg1">
-                    <a:lumMod val="75000"/>
-                  </a:schemeClr>
-                </a:solidFill>
-                <a:latin typeface="Calluna Sans" pitchFamily="50" charset="0"/>
-                <a:ea typeface="+mn-ea"/>
-                <a:cs typeface="Arial"/>
-              </a:rPr>
-              <a:t>/wjax-2012-play-async-apps</a:t>
-            </a:r>
-          </a:p>
-        </p:txBody>
-      </p:sp>
-    </p:spTree>
-    <p:extLst>
-      <p:ext uri="{BB962C8B-B14F-4D97-AF65-F5344CB8AC3E}">
-        <p14:creationId xmlns:p14="http://schemas.microsoft.com/office/powerpoint/2010/main" val="3897917046"/>
-      </p:ext>
-    </p:extLst>
-  </p:cSld>
-  <p:clrMapOvr>
-    <a:masterClrMapping/>
-  </p:clrMapOvr>
-</p:sld>
-</file>
-
-<file path=ppt/slides/slide36.xml><?xml version="1.0" encoding="utf-8"?>
-<p:sld xmlns:a="http://schemas.openxmlformats.org/drawingml/2006/main" xmlns:r="http://schemas.openxmlformats.org/officeDocument/2006/relationships" xmlns:p="http://schemas.openxmlformats.org/presentationml/2006/main">
-  <p:cSld>
-    <p:spTree>
-      <p:nvGrpSpPr>
-        <p:cNvPr id="1" name=""/>
-        <p:cNvGrpSpPr/>
-        <p:nvPr/>
-      </p:nvGrpSpPr>
-      <p:grpSpPr>
-        <a:xfrm>
-          <a:off x="0" y="0"/>
-          <a:ext cx="0" cy="0"/>
-          <a:chOff x="0" y="0"/>
-          <a:chExt cx="0" cy="0"/>
-        </a:xfrm>
-      </p:grpSpPr>
-      <p:sp>
-        <p:nvSpPr>
-          <p:cNvPr id="3" name="Content Placeholder 2"/>
-          <p:cNvSpPr>
-            <a:spLocks noGrp="1"/>
-          </p:cNvSpPr>
-          <p:nvPr>
-            <p:ph idx="1"/>
-          </p:nvPr>
-        </p:nvSpPr>
-        <p:spPr>
-          <a:xfrm>
-            <a:off x="457200" y="620688"/>
-            <a:ext cx="8229600" cy="5505475"/>
-          </a:xfrm>
-        </p:spPr>
-        <p:txBody>
-          <a:bodyPr anchor="ctr">
-            <a:normAutofit/>
-          </a:bodyPr>
-          <a:lstStyle/>
-          <a:p>
-            <a:pPr marL="0" indent="0" algn="ctr">
-              <a:buNone/>
-            </a:pPr>
-            <a:r>
-              <a:rPr lang="en-US" sz="13800" dirty="0" smtClean="0"/>
-              <a:t>Thank you</a:t>
-            </a:r>
-            <a:endParaRPr lang="en-US" sz="13800" dirty="0"/>
-          </a:p>
-        </p:txBody>
-      </p:sp>
-    </p:spTree>
-    <p:extLst>
-      <p:ext uri="{BB962C8B-B14F-4D97-AF65-F5344CB8AC3E}">
-        <p14:creationId xmlns:p14="http://schemas.microsoft.com/office/powerpoint/2010/main" val="4202409820"/>
       </p:ext>
     </p:extLst>
   </p:cSld>
@@ -13180,6 +16054,76 @@
     <p:extLst>
       <p:ext uri="{BB962C8B-B14F-4D97-AF65-F5344CB8AC3E}">
         <p14:creationId xmlns:p14="http://schemas.microsoft.com/office/powerpoint/2010/main" val="2069718531"/>
+      </p:ext>
+    </p:extLst>
+  </p:cSld>
+  <p:clrMapOvr>
+    <a:masterClrMapping/>
+  </p:clrMapOvr>
+  <p:timing>
+    <p:tnLst>
+      <p:par>
+        <p:cTn xmlns:p14="http://schemas.microsoft.com/office/powerpoint/2010/main" id="1" dur="indefinite" restart="never" nodeType="tmRoot"/>
+      </p:par>
+    </p:tnLst>
+  </p:timing>
+</p:sld>
+</file>
+
+<file path=ppt/slides/slide40.xml><?xml version="1.0" encoding="utf-8"?>
+<p:sld xmlns:a="http://schemas.openxmlformats.org/drawingml/2006/main" xmlns:r="http://schemas.openxmlformats.org/officeDocument/2006/relationships" xmlns:p="http://schemas.openxmlformats.org/presentationml/2006/main">
+  <p:cSld>
+    <p:spTree>
+      <p:nvGrpSpPr>
+        <p:cNvPr id="1" name=""/>
+        <p:cNvGrpSpPr/>
+        <p:nvPr/>
+      </p:nvGrpSpPr>
+      <p:grpSpPr>
+        <a:xfrm>
+          <a:off x="0" y="0"/>
+          <a:ext cx="0" cy="0"/>
+          <a:chOff x="0" y="0"/>
+          <a:chExt cx="0" cy="0"/>
+        </a:xfrm>
+      </p:grpSpPr>
+      <p:sp>
+        <p:nvSpPr>
+          <p:cNvPr id="3" name="Content Placeholder 2"/>
+          <p:cNvSpPr>
+            <a:spLocks noGrp="1"/>
+          </p:cNvSpPr>
+          <p:nvPr>
+            <p:ph idx="1"/>
+          </p:nvPr>
+        </p:nvSpPr>
+        <p:spPr>
+          <a:xfrm>
+            <a:off x="457200" y="620688"/>
+            <a:ext cx="8229600" cy="5505475"/>
+          </a:xfrm>
+        </p:spPr>
+        <p:txBody>
+          <a:bodyPr anchor="ctr">
+            <a:normAutofit/>
+          </a:bodyPr>
+          <a:lstStyle/>
+          <a:p>
+            <a:pPr marL="0" indent="0" algn="ctr">
+              <a:buNone/>
+            </a:pPr>
+            <a:r>
+              <a:rPr lang="en-US" sz="13800" dirty="0" smtClean="0"/>
+              <a:t>Thank you</a:t>
+            </a:r>
+            <a:endParaRPr lang="en-US" sz="13800" dirty="0"/>
+          </a:p>
+        </p:txBody>
+      </p:sp>
+    </p:spTree>
+    <p:extLst>
+      <p:ext uri="{BB962C8B-B14F-4D97-AF65-F5344CB8AC3E}">
+        <p14:creationId xmlns:p14="http://schemas.microsoft.com/office/powerpoint/2010/main" val="4202409820"/>
       </p:ext>
     </p:extLst>
   </p:cSld>

</xml_diff>